<commit_message>
updated hierarchy documentation in pptx file
</commit_message>
<xml_diff>
--- a/misc stuff/charts.pptx
+++ b/misc stuff/charts.pptx
@@ -2375,6 +2375,49 @@
         </a:p>
       </dgm:t>
     </dgm:pt>
+    <dgm:pt modelId="{E7FC5B26-5A56-48B3-8222-2C4E92D821D7}">
+      <dgm:prSet phldrT="[Text]"/>
+      <dgm:spPr>
+        <a:solidFill>
+          <a:schemeClr val="accent2">
+            <a:lumMod val="75000"/>
+          </a:schemeClr>
+        </a:solidFill>
+      </dgm:spPr>
+      <dgm:t>
+        <a:bodyPr/>
+        <a:lstStyle/>
+        <a:p>
+          <a:r>
+            <a:rPr lang="en-US" dirty="0"/>
+            <a:t>WorkBuilding</a:t>
+          </a:r>
+          <a:endParaRPr lang="LID4096" dirty="0"/>
+        </a:p>
+      </dgm:t>
+    </dgm:pt>
+    <dgm:pt modelId="{C655FC40-7A98-40AF-8EE8-11CA632B7F45}" type="parTrans" cxnId="{A02626D2-E2C7-4B7F-BB5A-A22953996F21}">
+      <dgm:prSet/>
+      <dgm:spPr/>
+      <dgm:t>
+        <a:bodyPr/>
+        <a:lstStyle/>
+        <a:p>
+          <a:endParaRPr lang="LID4096"/>
+        </a:p>
+      </dgm:t>
+    </dgm:pt>
+    <dgm:pt modelId="{09A6273D-2B22-4F31-9FFA-B0A79B860184}" type="sibTrans" cxnId="{A02626D2-E2C7-4B7F-BB5A-A22953996F21}">
+      <dgm:prSet/>
+      <dgm:spPr/>
+      <dgm:t>
+        <a:bodyPr/>
+        <a:lstStyle/>
+        <a:p>
+          <a:endParaRPr lang="LID4096"/>
+        </a:p>
+      </dgm:t>
+    </dgm:pt>
     <dgm:pt modelId="{B65D09B4-F10B-43E1-A30E-95A9CAB9BF6F}" type="pres">
       <dgm:prSet presAssocID="{C707CC34-02D2-4206-8DAF-921973BC0C77}" presName="mainComposite" presStyleCnt="0">
         <dgm:presLayoutVars>
@@ -2434,7 +2477,7 @@
       <dgm:spPr/>
     </dgm:pt>
     <dgm:pt modelId="{03C1E623-CBB3-4F8E-9E78-431E8BB7DEF5}" type="pres">
-      <dgm:prSet presAssocID="{55692953-68FF-4CFE-9C3A-2E2C5464A6DB}" presName="Name19" presStyleLbl="parChTrans1D3" presStyleIdx="0" presStyleCnt="8"/>
+      <dgm:prSet presAssocID="{55692953-68FF-4CFE-9C3A-2E2C5464A6DB}" presName="Name19" presStyleLbl="parChTrans1D3" presStyleIdx="0" presStyleCnt="6"/>
       <dgm:spPr/>
     </dgm:pt>
     <dgm:pt modelId="{E3F86558-1732-4EA8-BE7F-C23D60668AEC}" type="pres">
@@ -2442,7 +2485,7 @@
       <dgm:spPr/>
     </dgm:pt>
     <dgm:pt modelId="{61CF322C-8439-442D-8B34-B6054691CE9C}" type="pres">
-      <dgm:prSet presAssocID="{DAD463E0-47C0-40A4-A9A8-7F2A407A259F}" presName="level2Shape" presStyleLbl="node3" presStyleIdx="0" presStyleCnt="8"/>
+      <dgm:prSet presAssocID="{DAD463E0-47C0-40A4-A9A8-7F2A407A259F}" presName="level2Shape" presStyleLbl="node3" presStyleIdx="0" presStyleCnt="6"/>
       <dgm:spPr/>
     </dgm:pt>
     <dgm:pt modelId="{8EE05D43-4037-4851-8C80-81FD240D6F43}" type="pres">
@@ -2450,7 +2493,7 @@
       <dgm:spPr/>
     </dgm:pt>
     <dgm:pt modelId="{82E35868-D55A-4884-874A-AA901AFD731D}" type="pres">
-      <dgm:prSet presAssocID="{BF4CD824-05CF-4C00-B6B6-344A87CFB10E}" presName="Name19" presStyleLbl="parChTrans1D3" presStyleIdx="1" presStyleCnt="8"/>
+      <dgm:prSet presAssocID="{BF4CD824-05CF-4C00-B6B6-344A87CFB10E}" presName="Name19" presStyleLbl="parChTrans1D3" presStyleIdx="1" presStyleCnt="6"/>
       <dgm:spPr/>
     </dgm:pt>
     <dgm:pt modelId="{09E713CA-B1F6-44A6-8E31-6E0EF0139386}" type="pres">
@@ -2458,7 +2501,7 @@
       <dgm:spPr/>
     </dgm:pt>
     <dgm:pt modelId="{41E2ECE7-BA3C-413F-9870-446CAE2DC136}" type="pres">
-      <dgm:prSet presAssocID="{D505866C-B593-437C-B169-748D260677E0}" presName="level2Shape" presStyleLbl="node3" presStyleIdx="1" presStyleCnt="8"/>
+      <dgm:prSet presAssocID="{D505866C-B593-437C-B169-748D260677E0}" presName="level2Shape" presStyleLbl="node3" presStyleIdx="1" presStyleCnt="6"/>
       <dgm:spPr/>
     </dgm:pt>
     <dgm:pt modelId="{33FB9B52-42D7-426C-B9C5-6A56CA8FEA7F}" type="pres">
@@ -2466,7 +2509,7 @@
       <dgm:spPr/>
     </dgm:pt>
     <dgm:pt modelId="{4E38FE01-194E-466F-87CF-949943532C6D}" type="pres">
-      <dgm:prSet presAssocID="{C4145D6E-AB59-4A7C-9836-5AEB8FDCF3CA}" presName="Name19" presStyleLbl="parChTrans1D4" presStyleIdx="0" presStyleCnt="7"/>
+      <dgm:prSet presAssocID="{C4145D6E-AB59-4A7C-9836-5AEB8FDCF3CA}" presName="Name19" presStyleLbl="parChTrans1D4" presStyleIdx="0" presStyleCnt="10"/>
       <dgm:spPr/>
     </dgm:pt>
     <dgm:pt modelId="{8651C933-7F86-46CA-BACB-6BCF9EEA6712}" type="pres">
@@ -2474,7 +2517,7 @@
       <dgm:spPr/>
     </dgm:pt>
     <dgm:pt modelId="{7DA13BCD-E6BC-4FEF-AC88-1ABD56621546}" type="pres">
-      <dgm:prSet presAssocID="{04B253BA-67E4-4347-A4BA-B77FED133C5E}" presName="level2Shape" presStyleLbl="node4" presStyleIdx="0" presStyleCnt="7"/>
+      <dgm:prSet presAssocID="{04B253BA-67E4-4347-A4BA-B77FED133C5E}" presName="level2Shape" presStyleLbl="node4" presStyleIdx="0" presStyleCnt="10"/>
       <dgm:spPr/>
     </dgm:pt>
     <dgm:pt modelId="{2F742859-DF42-4298-A2F4-29FE2B56FCFE}" type="pres">
@@ -2482,7 +2525,7 @@
       <dgm:spPr/>
     </dgm:pt>
     <dgm:pt modelId="{55693C6D-10F9-4F64-ADE8-91DBD07ADD42}" type="pres">
-      <dgm:prSet presAssocID="{A1EF8496-7A96-41B7-ABA2-7960927DC000}" presName="Name19" presStyleLbl="parChTrans1D4" presStyleIdx="1" presStyleCnt="7"/>
+      <dgm:prSet presAssocID="{A1EF8496-7A96-41B7-ABA2-7960927DC000}" presName="Name19" presStyleLbl="parChTrans1D4" presStyleIdx="1" presStyleCnt="10"/>
       <dgm:spPr/>
     </dgm:pt>
     <dgm:pt modelId="{C980255A-82B5-4808-A7A2-178F2E0EA8AC}" type="pres">
@@ -2490,7 +2533,7 @@
       <dgm:spPr/>
     </dgm:pt>
     <dgm:pt modelId="{FE0BDF8F-B7BF-4C54-81D4-7393A0E3C6CF}" type="pres">
-      <dgm:prSet presAssocID="{4C20C150-1E51-4F09-BC5D-EBB1F791686D}" presName="level2Shape" presStyleLbl="node4" presStyleIdx="1" presStyleCnt="7"/>
+      <dgm:prSet presAssocID="{4C20C150-1E51-4F09-BC5D-EBB1F791686D}" presName="level2Shape" presStyleLbl="node4" presStyleIdx="1" presStyleCnt="10"/>
       <dgm:spPr/>
     </dgm:pt>
     <dgm:pt modelId="{2587A4FC-28A6-4A98-82E4-488DCD04DF27}" type="pres">
@@ -2498,7 +2541,7 @@
       <dgm:spPr/>
     </dgm:pt>
     <dgm:pt modelId="{7EADC087-4500-48DB-8562-2E1060FC40CB}" type="pres">
-      <dgm:prSet presAssocID="{F472896D-8AD9-4687-B850-8EB22275547B}" presName="Name19" presStyleLbl="parChTrans1D4" presStyleIdx="2" presStyleCnt="7"/>
+      <dgm:prSet presAssocID="{F472896D-8AD9-4687-B850-8EB22275547B}" presName="Name19" presStyleLbl="parChTrans1D4" presStyleIdx="2" presStyleCnt="10"/>
       <dgm:spPr/>
     </dgm:pt>
     <dgm:pt modelId="{3DDD973F-1DEE-499A-8C34-5F30653845FC}" type="pres">
@@ -2506,7 +2549,7 @@
       <dgm:spPr/>
     </dgm:pt>
     <dgm:pt modelId="{A49C93DF-9D18-4027-8585-15E23ECB4B00}" type="pres">
-      <dgm:prSet presAssocID="{ED38794F-F591-4E93-B17F-87415321378C}" presName="level2Shape" presStyleLbl="node4" presStyleIdx="2" presStyleCnt="7"/>
+      <dgm:prSet presAssocID="{ED38794F-F591-4E93-B17F-87415321378C}" presName="level2Shape" presStyleLbl="node4" presStyleIdx="2" presStyleCnt="10"/>
       <dgm:spPr/>
     </dgm:pt>
     <dgm:pt modelId="{C9B2102C-BD7D-4437-B3BF-1010EB88568A}" type="pres">
@@ -2514,7 +2557,7 @@
       <dgm:spPr/>
     </dgm:pt>
     <dgm:pt modelId="{DE2DFDF4-5F02-4E95-A59C-BD4F597DCF88}" type="pres">
-      <dgm:prSet presAssocID="{D0563501-1173-409B-BE16-24A5C8253377}" presName="Name19" presStyleLbl="parChTrans1D4" presStyleIdx="3" presStyleCnt="7"/>
+      <dgm:prSet presAssocID="{D0563501-1173-409B-BE16-24A5C8253377}" presName="Name19" presStyleLbl="parChTrans1D4" presStyleIdx="3" presStyleCnt="10"/>
       <dgm:spPr/>
     </dgm:pt>
     <dgm:pt modelId="{9CB1A375-704E-4B9B-A894-179D77B8552D}" type="pres">
@@ -2522,7 +2565,7 @@
       <dgm:spPr/>
     </dgm:pt>
     <dgm:pt modelId="{3A4E8DEE-6AF4-4D83-8C14-20E3F1731880}" type="pres">
-      <dgm:prSet presAssocID="{FEE12920-3112-447C-BC9E-97F41884D875}" presName="level2Shape" presStyleLbl="node4" presStyleIdx="3" presStyleCnt="7"/>
+      <dgm:prSet presAssocID="{FEE12920-3112-447C-BC9E-97F41884D875}" presName="level2Shape" presStyleLbl="node4" presStyleIdx="3" presStyleCnt="10"/>
       <dgm:spPr/>
     </dgm:pt>
     <dgm:pt modelId="{43978413-3D53-475D-B6C2-BD9FCC9AAC67}" type="pres">
@@ -2530,7 +2573,7 @@
       <dgm:spPr/>
     </dgm:pt>
     <dgm:pt modelId="{33920D70-850A-44BA-A1B3-941AA5FC2C17}" type="pres">
-      <dgm:prSet presAssocID="{CB73BE5D-624B-464B-BDE1-25E38A52C2B1}" presName="Name19" presStyleLbl="parChTrans1D4" presStyleIdx="4" presStyleCnt="7"/>
+      <dgm:prSet presAssocID="{CB73BE5D-624B-464B-BDE1-25E38A52C2B1}" presName="Name19" presStyleLbl="parChTrans1D4" presStyleIdx="4" presStyleCnt="10"/>
       <dgm:spPr/>
     </dgm:pt>
     <dgm:pt modelId="{0A5849B8-83E0-424C-A636-26D534677EE9}" type="pres">
@@ -2538,7 +2581,7 @@
       <dgm:spPr/>
     </dgm:pt>
     <dgm:pt modelId="{15A27B40-9101-4675-8BDF-7CA10B938AB9}" type="pres">
-      <dgm:prSet presAssocID="{0E71F402-DE2D-4851-806E-A5637112E586}" presName="level2Shape" presStyleLbl="node4" presStyleIdx="4" presStyleCnt="7"/>
+      <dgm:prSet presAssocID="{0E71F402-DE2D-4851-806E-A5637112E586}" presName="level2Shape" presStyleLbl="node4" presStyleIdx="4" presStyleCnt="10"/>
       <dgm:spPr/>
     </dgm:pt>
     <dgm:pt modelId="{24741CA7-92E6-46DB-8D62-D6083D64041B}" type="pres">
@@ -2546,7 +2589,7 @@
       <dgm:spPr/>
     </dgm:pt>
     <dgm:pt modelId="{4C92394A-3740-4441-A2A1-6AA3072B9C48}" type="pres">
-      <dgm:prSet presAssocID="{BD264E22-A408-4FA0-B85D-B75330B02049}" presName="Name19" presStyleLbl="parChTrans1D4" presStyleIdx="5" presStyleCnt="7"/>
+      <dgm:prSet presAssocID="{BD264E22-A408-4FA0-B85D-B75330B02049}" presName="Name19" presStyleLbl="parChTrans1D4" presStyleIdx="5" presStyleCnt="10"/>
       <dgm:spPr/>
     </dgm:pt>
     <dgm:pt modelId="{0E9FBFF4-F9A6-4C9C-B5DE-C98608508864}" type="pres">
@@ -2554,7 +2597,7 @@
       <dgm:spPr/>
     </dgm:pt>
     <dgm:pt modelId="{F738F083-9520-4B4C-B063-820EE2613BAA}" type="pres">
-      <dgm:prSet presAssocID="{953AE3BE-C009-48AE-AEA3-949EC8449372}" presName="level2Shape" presStyleLbl="node4" presStyleIdx="5" presStyleCnt="7"/>
+      <dgm:prSet presAssocID="{953AE3BE-C009-48AE-AEA3-949EC8449372}" presName="level2Shape" presStyleLbl="node4" presStyleIdx="5" presStyleCnt="10"/>
       <dgm:spPr/>
     </dgm:pt>
     <dgm:pt modelId="{38864C86-11F6-48D1-9490-D515C965FB49}" type="pres">
@@ -2562,7 +2605,7 @@
       <dgm:spPr/>
     </dgm:pt>
     <dgm:pt modelId="{B906C7BB-AADF-47D5-9079-CCA23B609F78}" type="pres">
-      <dgm:prSet presAssocID="{E5B38286-1B43-482F-9F35-80054A24DB02}" presName="Name19" presStyleLbl="parChTrans1D4" presStyleIdx="6" presStyleCnt="7"/>
+      <dgm:prSet presAssocID="{E5B38286-1B43-482F-9F35-80054A24DB02}" presName="Name19" presStyleLbl="parChTrans1D4" presStyleIdx="6" presStyleCnt="10"/>
       <dgm:spPr/>
     </dgm:pt>
     <dgm:pt modelId="{B8655D0E-11E6-4AB1-B2C0-3B31833EDC3D}" type="pres">
@@ -2570,7 +2613,7 @@
       <dgm:spPr/>
     </dgm:pt>
     <dgm:pt modelId="{E6FC1F5D-EA81-40F0-8F66-C6E67ED080E4}" type="pres">
-      <dgm:prSet presAssocID="{D14453E5-0411-4395-A2CB-6AEF5EE5413D}" presName="level2Shape" presStyleLbl="node4" presStyleIdx="6" presStyleCnt="7"/>
+      <dgm:prSet presAssocID="{D14453E5-0411-4395-A2CB-6AEF5EE5413D}" presName="level2Shape" presStyleLbl="node4" presStyleIdx="6" presStyleCnt="10"/>
       <dgm:spPr/>
     </dgm:pt>
     <dgm:pt modelId="{394CD271-5858-497A-9730-E3FA9BE4187A}" type="pres">
@@ -2593,8 +2636,72 @@
       <dgm:prSet presAssocID="{492EA1CE-F49A-487B-B52C-DD671590C4AB}" presName="hierChild3" presStyleCnt="0"/>
       <dgm:spPr/>
     </dgm:pt>
+    <dgm:pt modelId="{EC9AF500-AA54-457B-AF40-03CABD180705}" type="pres">
+      <dgm:prSet presAssocID="{C655FC40-7A98-40AF-8EE8-11CA632B7F45}" presName="Name19" presStyleLbl="parChTrans1D3" presStyleIdx="2" presStyleCnt="6"/>
+      <dgm:spPr/>
+    </dgm:pt>
+    <dgm:pt modelId="{A67BBD5B-24CD-4752-A9ED-20BCFB7F7E96}" type="pres">
+      <dgm:prSet presAssocID="{E7FC5B26-5A56-48B3-8222-2C4E92D821D7}" presName="Name21" presStyleCnt="0"/>
+      <dgm:spPr/>
+    </dgm:pt>
+    <dgm:pt modelId="{6576D9BD-CF79-4063-89C9-BA78692B564F}" type="pres">
+      <dgm:prSet presAssocID="{E7FC5B26-5A56-48B3-8222-2C4E92D821D7}" presName="level2Shape" presStyleLbl="node3" presStyleIdx="2" presStyleCnt="6"/>
+      <dgm:spPr/>
+    </dgm:pt>
+    <dgm:pt modelId="{E0EC8783-5391-4845-943E-A9D7736D3777}" type="pres">
+      <dgm:prSet presAssocID="{E7FC5B26-5A56-48B3-8222-2C4E92D821D7}" presName="hierChild3" presStyleCnt="0"/>
+      <dgm:spPr/>
+    </dgm:pt>
+    <dgm:pt modelId="{0BEB8184-B777-46E1-B921-8C0FDA01D082}" type="pres">
+      <dgm:prSet presAssocID="{D08BF6AC-545D-40BA-A645-B4DFFBC9DE4F}" presName="Name19" presStyleLbl="parChTrans1D4" presStyleIdx="7" presStyleCnt="10"/>
+      <dgm:spPr/>
+    </dgm:pt>
+    <dgm:pt modelId="{5ABB1E3C-39D4-48C4-81AA-B894A100E7EF}" type="pres">
+      <dgm:prSet presAssocID="{05B9EE2C-EC7B-4C1F-9DFA-94C1A1972B20}" presName="Name21" presStyleCnt="0"/>
+      <dgm:spPr/>
+    </dgm:pt>
+    <dgm:pt modelId="{BE05E9B3-C033-4E94-915C-57386F2FFFCF}" type="pres">
+      <dgm:prSet presAssocID="{05B9EE2C-EC7B-4C1F-9DFA-94C1A1972B20}" presName="level2Shape" presStyleLbl="node4" presStyleIdx="7" presStyleCnt="10"/>
+      <dgm:spPr/>
+    </dgm:pt>
+    <dgm:pt modelId="{141122EA-461F-4210-9F1D-C971CB393709}" type="pres">
+      <dgm:prSet presAssocID="{05B9EE2C-EC7B-4C1F-9DFA-94C1A1972B20}" presName="hierChild3" presStyleCnt="0"/>
+      <dgm:spPr/>
+    </dgm:pt>
+    <dgm:pt modelId="{8599F571-1C6C-4CB6-926A-7FCEE3F9118A}" type="pres">
+      <dgm:prSet presAssocID="{17E0CBBB-1109-4419-B435-579292F37DCC}" presName="Name19" presStyleLbl="parChTrans1D4" presStyleIdx="8" presStyleCnt="10"/>
+      <dgm:spPr/>
+    </dgm:pt>
+    <dgm:pt modelId="{4D32988C-B148-4CBE-BEC1-1852A1927666}" type="pres">
+      <dgm:prSet presAssocID="{26A6B070-DD19-442D-A81B-63595ECE5F8F}" presName="Name21" presStyleCnt="0"/>
+      <dgm:spPr/>
+    </dgm:pt>
+    <dgm:pt modelId="{8976D2E3-5B0F-4111-8A1F-3F406BBE1D4E}" type="pres">
+      <dgm:prSet presAssocID="{26A6B070-DD19-442D-A81B-63595ECE5F8F}" presName="level2Shape" presStyleLbl="node4" presStyleIdx="8" presStyleCnt="10"/>
+      <dgm:spPr/>
+    </dgm:pt>
+    <dgm:pt modelId="{A6DE3200-89FE-4B9A-B9B5-6FB9C35BE033}" type="pres">
+      <dgm:prSet presAssocID="{26A6B070-DD19-442D-A81B-63595ECE5F8F}" presName="hierChild3" presStyleCnt="0"/>
+      <dgm:spPr/>
+    </dgm:pt>
+    <dgm:pt modelId="{55BB6539-41D1-424D-B1C6-82B34F71F71D}" type="pres">
+      <dgm:prSet presAssocID="{EAD8C576-E5E6-4ECF-85E4-E3E031E5C280}" presName="Name19" presStyleLbl="parChTrans1D4" presStyleIdx="9" presStyleCnt="10"/>
+      <dgm:spPr/>
+    </dgm:pt>
+    <dgm:pt modelId="{587434E0-E26B-455E-B1B7-0139DA90895F}" type="pres">
+      <dgm:prSet presAssocID="{AC391FD8-BEF6-406B-8DDA-E258002D9D4A}" presName="Name21" presStyleCnt="0"/>
+      <dgm:spPr/>
+    </dgm:pt>
+    <dgm:pt modelId="{A4502926-B005-4510-A1B4-3AEAD9C4AE3C}" type="pres">
+      <dgm:prSet presAssocID="{AC391FD8-BEF6-406B-8DDA-E258002D9D4A}" presName="level2Shape" presStyleLbl="node4" presStyleIdx="9" presStyleCnt="10"/>
+      <dgm:spPr/>
+    </dgm:pt>
+    <dgm:pt modelId="{0C6EEE7F-80AA-4D1D-B91D-791C9E5ECE18}" type="pres">
+      <dgm:prSet presAssocID="{AC391FD8-BEF6-406B-8DDA-E258002D9D4A}" presName="hierChild3" presStyleCnt="0"/>
+      <dgm:spPr/>
+    </dgm:pt>
     <dgm:pt modelId="{59BD8D1D-DFE7-4E5D-9A33-F41207E85527}" type="pres">
-      <dgm:prSet presAssocID="{506280D3-E1D3-4FD1-882E-7D5A4B992B6E}" presName="Name19" presStyleLbl="parChTrans1D3" presStyleIdx="2" presStyleCnt="8"/>
+      <dgm:prSet presAssocID="{506280D3-E1D3-4FD1-882E-7D5A4B992B6E}" presName="Name19" presStyleLbl="parChTrans1D3" presStyleIdx="3" presStyleCnt="6"/>
       <dgm:spPr/>
     </dgm:pt>
     <dgm:pt modelId="{8F2ECBEA-934D-478A-94FF-E8582C8294AA}" type="pres">
@@ -2602,61 +2709,13 @@
       <dgm:spPr/>
     </dgm:pt>
     <dgm:pt modelId="{779B8017-965F-4ED7-A453-5B22C782DC0B}" type="pres">
-      <dgm:prSet presAssocID="{3564D136-ED9F-4211-A941-F8519B81B222}" presName="level2Shape" presStyleLbl="node3" presStyleIdx="2" presStyleCnt="8"/>
+      <dgm:prSet presAssocID="{3564D136-ED9F-4211-A941-F8519B81B222}" presName="level2Shape" presStyleLbl="node3" presStyleIdx="3" presStyleCnt="6"/>
       <dgm:spPr/>
     </dgm:pt>
     <dgm:pt modelId="{850B4E5C-4E7D-4E8E-B2FD-30C52E2B93AC}" type="pres">
       <dgm:prSet presAssocID="{3564D136-ED9F-4211-A941-F8519B81B222}" presName="hierChild3" presStyleCnt="0"/>
       <dgm:spPr/>
     </dgm:pt>
-    <dgm:pt modelId="{0BEB8184-B777-46E1-B921-8C0FDA01D082}" type="pres">
-      <dgm:prSet presAssocID="{D08BF6AC-545D-40BA-A645-B4DFFBC9DE4F}" presName="Name19" presStyleLbl="parChTrans1D3" presStyleIdx="3" presStyleCnt="8"/>
-      <dgm:spPr/>
-    </dgm:pt>
-    <dgm:pt modelId="{5ABB1E3C-39D4-48C4-81AA-B894A100E7EF}" type="pres">
-      <dgm:prSet presAssocID="{05B9EE2C-EC7B-4C1F-9DFA-94C1A1972B20}" presName="Name21" presStyleCnt="0"/>
-      <dgm:spPr/>
-    </dgm:pt>
-    <dgm:pt modelId="{BE05E9B3-C033-4E94-915C-57386F2FFFCF}" type="pres">
-      <dgm:prSet presAssocID="{05B9EE2C-EC7B-4C1F-9DFA-94C1A1972B20}" presName="level2Shape" presStyleLbl="node3" presStyleIdx="3" presStyleCnt="8"/>
-      <dgm:spPr/>
-    </dgm:pt>
-    <dgm:pt modelId="{141122EA-461F-4210-9F1D-C971CB393709}" type="pres">
-      <dgm:prSet presAssocID="{05B9EE2C-EC7B-4C1F-9DFA-94C1A1972B20}" presName="hierChild3" presStyleCnt="0"/>
-      <dgm:spPr/>
-    </dgm:pt>
-    <dgm:pt modelId="{8599F571-1C6C-4CB6-926A-7FCEE3F9118A}" type="pres">
-      <dgm:prSet presAssocID="{17E0CBBB-1109-4419-B435-579292F37DCC}" presName="Name19" presStyleLbl="parChTrans1D3" presStyleIdx="4" presStyleCnt="8"/>
-      <dgm:spPr/>
-    </dgm:pt>
-    <dgm:pt modelId="{4D32988C-B148-4CBE-BEC1-1852A1927666}" type="pres">
-      <dgm:prSet presAssocID="{26A6B070-DD19-442D-A81B-63595ECE5F8F}" presName="Name21" presStyleCnt="0"/>
-      <dgm:spPr/>
-    </dgm:pt>
-    <dgm:pt modelId="{8976D2E3-5B0F-4111-8A1F-3F406BBE1D4E}" type="pres">
-      <dgm:prSet presAssocID="{26A6B070-DD19-442D-A81B-63595ECE5F8F}" presName="level2Shape" presStyleLbl="node3" presStyleIdx="4" presStyleCnt="8"/>
-      <dgm:spPr/>
-    </dgm:pt>
-    <dgm:pt modelId="{A6DE3200-89FE-4B9A-B9B5-6FB9C35BE033}" type="pres">
-      <dgm:prSet presAssocID="{26A6B070-DD19-442D-A81B-63595ECE5F8F}" presName="hierChild3" presStyleCnt="0"/>
-      <dgm:spPr/>
-    </dgm:pt>
-    <dgm:pt modelId="{55BB6539-41D1-424D-B1C6-82B34F71F71D}" type="pres">
-      <dgm:prSet presAssocID="{EAD8C576-E5E6-4ECF-85E4-E3E031E5C280}" presName="Name19" presStyleLbl="parChTrans1D3" presStyleIdx="5" presStyleCnt="8"/>
-      <dgm:spPr/>
-    </dgm:pt>
-    <dgm:pt modelId="{587434E0-E26B-455E-B1B7-0139DA90895F}" type="pres">
-      <dgm:prSet presAssocID="{AC391FD8-BEF6-406B-8DDA-E258002D9D4A}" presName="Name21" presStyleCnt="0"/>
-      <dgm:spPr/>
-    </dgm:pt>
-    <dgm:pt modelId="{A4502926-B005-4510-A1B4-3AEAD9C4AE3C}" type="pres">
-      <dgm:prSet presAssocID="{AC391FD8-BEF6-406B-8DDA-E258002D9D4A}" presName="level2Shape" presStyleLbl="node3" presStyleIdx="5" presStyleCnt="8"/>
-      <dgm:spPr/>
-    </dgm:pt>
-    <dgm:pt modelId="{0C6EEE7F-80AA-4D1D-B91D-791C9E5ECE18}" type="pres">
-      <dgm:prSet presAssocID="{AC391FD8-BEF6-406B-8DDA-E258002D9D4A}" presName="hierChild3" presStyleCnt="0"/>
-      <dgm:spPr/>
-    </dgm:pt>
     <dgm:pt modelId="{3321C745-C943-48B5-A72D-18FDCA516C06}" type="pres">
       <dgm:prSet presAssocID="{ACEA61FB-115A-4192-8BC4-0FB2A5FEC36C}" presName="Name19" presStyleLbl="parChTrans1D2" presStyleIdx="2" presStyleCnt="3"/>
       <dgm:spPr/>
@@ -2674,7 +2733,7 @@
       <dgm:spPr/>
     </dgm:pt>
     <dgm:pt modelId="{150EA877-0DAA-44B7-B6CB-653578BFC5D5}" type="pres">
-      <dgm:prSet presAssocID="{68ABB548-5FD7-43E0-AAFE-46F683E79FE5}" presName="Name19" presStyleLbl="parChTrans1D3" presStyleIdx="6" presStyleCnt="8"/>
+      <dgm:prSet presAssocID="{68ABB548-5FD7-43E0-AAFE-46F683E79FE5}" presName="Name19" presStyleLbl="parChTrans1D3" presStyleIdx="4" presStyleCnt="6"/>
       <dgm:spPr/>
     </dgm:pt>
     <dgm:pt modelId="{4B27584E-4D85-48F7-A4DA-47AA771CE522}" type="pres">
@@ -2682,7 +2741,7 @@
       <dgm:spPr/>
     </dgm:pt>
     <dgm:pt modelId="{508B9431-792A-40C5-82BA-B280E3C19A47}" type="pres">
-      <dgm:prSet presAssocID="{7B197C8A-C41B-4D87-817A-FF50A4A1314C}" presName="level2Shape" presStyleLbl="node3" presStyleIdx="6" presStyleCnt="8"/>
+      <dgm:prSet presAssocID="{7B197C8A-C41B-4D87-817A-FF50A4A1314C}" presName="level2Shape" presStyleLbl="node3" presStyleIdx="4" presStyleCnt="6"/>
       <dgm:spPr/>
     </dgm:pt>
     <dgm:pt modelId="{7D52F927-8980-4BA4-B680-4331818347CD}" type="pres">
@@ -2690,7 +2749,7 @@
       <dgm:spPr/>
     </dgm:pt>
     <dgm:pt modelId="{2E751865-6AD6-4026-8323-96EE5CA8856A}" type="pres">
-      <dgm:prSet presAssocID="{B1C41E72-CD3E-45AC-AE7A-7DA1AA6273F7}" presName="Name19" presStyleLbl="parChTrans1D3" presStyleIdx="7" presStyleCnt="8"/>
+      <dgm:prSet presAssocID="{B1C41E72-CD3E-45AC-AE7A-7DA1AA6273F7}" presName="Name19" presStyleLbl="parChTrans1D3" presStyleIdx="5" presStyleCnt="6"/>
       <dgm:spPr/>
     </dgm:pt>
     <dgm:pt modelId="{C0CC30AC-479E-42AD-985C-90C9F42FD562}" type="pres">
@@ -2698,7 +2757,7 @@
       <dgm:spPr/>
     </dgm:pt>
     <dgm:pt modelId="{5154C260-018E-42D3-BBA3-EEDEBB120F5B}" type="pres">
-      <dgm:prSet presAssocID="{976EBA29-B2DB-4A0B-84EA-D29E64F2E9F9}" presName="level2Shape" presStyleLbl="node3" presStyleIdx="7" presStyleCnt="8"/>
+      <dgm:prSet presAssocID="{976EBA29-B2DB-4A0B-84EA-D29E64F2E9F9}" presName="level2Shape" presStyleLbl="node3" presStyleIdx="5" presStyleCnt="6"/>
       <dgm:spPr/>
     </dgm:pt>
     <dgm:pt modelId="{078D67A4-F9D6-4015-AA57-C207164BDE1E}" type="pres">
@@ -2711,141 +2770,148 @@
     </dgm:pt>
   </dgm:ptLst>
   <dgm:cxnLst>
-    <dgm:cxn modelId="{8FAFB111-16EE-4241-99C8-98265FA614ED}" type="presOf" srcId="{C4145D6E-AB59-4A7C-9836-5AEB8FDCF3CA}" destId="{4E38FE01-194E-466F-87CF-949943532C6D}" srcOrd="0" destOrd="0" presId="urn:microsoft.com/office/officeart/2005/8/layout/hierarchy6"/>
+    <dgm:cxn modelId="{5ACF5200-56AB-42B4-87B1-AC8BA4327496}" type="presOf" srcId="{C655FC40-7A98-40AF-8EE8-11CA632B7F45}" destId="{EC9AF500-AA54-457B-AF40-03CABD180705}" srcOrd="0" destOrd="0" presId="urn:microsoft.com/office/officeart/2005/8/layout/hierarchy6"/>
+    <dgm:cxn modelId="{3BB53202-1A4F-4B37-AB9D-402B643A1E3F}" type="presOf" srcId="{4C20C150-1E51-4F09-BC5D-EBB1F791686D}" destId="{FE0BDF8F-B7BF-4C54-81D4-7393A0E3C6CF}" srcOrd="0" destOrd="0" presId="urn:microsoft.com/office/officeart/2005/8/layout/hierarchy6"/>
+    <dgm:cxn modelId="{E1F9CC09-04F4-4C42-8A99-1FA445B31883}" type="presOf" srcId="{E7FC5B26-5A56-48B3-8222-2C4E92D821D7}" destId="{6576D9BD-CF79-4063-89C9-BA78692B564F}" srcOrd="0" destOrd="0" presId="urn:microsoft.com/office/officeart/2005/8/layout/hierarchy6"/>
     <dgm:cxn modelId="{DB4B8612-1C1C-49E9-8C64-80D46285CBE3}" srcId="{D4868FFD-771C-4CEC-92DD-0639FF96FFFB}" destId="{528B8B52-4B31-43FB-BB48-F4023318E6C1}" srcOrd="2" destOrd="0" parTransId="{ACEA61FB-115A-4192-8BC4-0FB2A5FEC36C}" sibTransId="{813EA3D2-2DE8-4CDC-82F1-FCC1C94FECE9}"/>
-    <dgm:cxn modelId="{4F219B1C-A721-46F2-BF84-52620C9F7E52}" type="presOf" srcId="{CB73BE5D-624B-464B-BDE1-25E38A52C2B1}" destId="{33920D70-850A-44BA-A1B3-941AA5FC2C17}" srcOrd="0" destOrd="0" presId="urn:microsoft.com/office/officeart/2005/8/layout/hierarchy6"/>
-    <dgm:cxn modelId="{370EC01E-AC93-4D3A-8647-4BABE5ED8DB6}" type="presOf" srcId="{528B8B52-4B31-43FB-BB48-F4023318E6C1}" destId="{52464C16-1B9F-46B5-9BF4-98069B452246}" srcOrd="0" destOrd="0" presId="urn:microsoft.com/office/officeart/2005/8/layout/hierarchy6"/>
-    <dgm:cxn modelId="{7291FE27-0A01-4E48-89AE-3EBBEB0D16AF}" type="presOf" srcId="{953AE3BE-C009-48AE-AEA3-949EC8449372}" destId="{F738F083-9520-4B4C-B063-820EE2613BAA}" srcOrd="0" destOrd="0" presId="urn:microsoft.com/office/officeart/2005/8/layout/hierarchy6"/>
-    <dgm:cxn modelId="{2670AC28-94ED-4081-8C11-68F27D924EEA}" type="presOf" srcId="{6FC2B031-D8FF-425F-AFA9-E2EA1DC321ED}" destId="{2F62BB5C-8B45-4C37-9E90-BD5EB4A72863}" srcOrd="0" destOrd="0" presId="urn:microsoft.com/office/officeart/2005/8/layout/hierarchy6"/>
-    <dgm:cxn modelId="{C93D472A-1AB2-4B79-9D05-67E43BAF7F90}" type="presOf" srcId="{ED38794F-F591-4E93-B17F-87415321378C}" destId="{A49C93DF-9D18-4027-8585-15E23ECB4B00}" srcOrd="0" destOrd="0" presId="urn:microsoft.com/office/officeart/2005/8/layout/hierarchy6"/>
+    <dgm:cxn modelId="{55348516-EA76-4C52-A8FF-54E9BC2A4FE7}" type="presOf" srcId="{CB73BE5D-624B-464B-BDE1-25E38A52C2B1}" destId="{33920D70-850A-44BA-A1B3-941AA5FC2C17}" srcOrd="0" destOrd="0" presId="urn:microsoft.com/office/officeart/2005/8/layout/hierarchy6"/>
+    <dgm:cxn modelId="{3C108523-4E65-433B-BDEF-0D3469797557}" type="presOf" srcId="{E5B38286-1B43-482F-9F35-80054A24DB02}" destId="{B906C7BB-AADF-47D5-9079-CCA23B609F78}" srcOrd="0" destOrd="0" presId="urn:microsoft.com/office/officeart/2005/8/layout/hierarchy6"/>
+    <dgm:cxn modelId="{66F4D624-1EB5-4290-9C30-5D8B51F889AE}" type="presOf" srcId="{26A6B070-DD19-442D-A81B-63595ECE5F8F}" destId="{8976D2E3-5B0F-4111-8A1F-3F406BBE1D4E}" srcOrd="0" destOrd="0" presId="urn:microsoft.com/office/officeart/2005/8/layout/hierarchy6"/>
     <dgm:cxn modelId="{AE00D12B-411D-4EE1-B8F5-3A6218D9EDE4}" srcId="{C707CC34-02D2-4206-8DAF-921973BC0C77}" destId="{D4868FFD-771C-4CEC-92DD-0639FF96FFFB}" srcOrd="0" destOrd="0" parTransId="{75670E8F-D9E3-4C43-AD53-701ACD6A4E6F}" sibTransId="{43F5AEFF-9929-4067-A473-7E1599122FC0}"/>
+    <dgm:cxn modelId="{795EB62C-08E0-4421-879C-B1750FD1DC68}" type="presOf" srcId="{17E0CBBB-1109-4419-B435-579292F37DCC}" destId="{8599F571-1C6C-4CB6-926A-7FCEE3F9118A}" srcOrd="0" destOrd="0" presId="urn:microsoft.com/office/officeart/2005/8/layout/hierarchy6"/>
     <dgm:cxn modelId="{932A452D-0992-42F0-A0D8-0B41D7A99D68}" srcId="{6FC2B031-D8FF-425F-AFA9-E2EA1DC321ED}" destId="{DAD463E0-47C0-40A4-A9A8-7F2A407A259F}" srcOrd="0" destOrd="0" parTransId="{55692953-68FF-4CFE-9C3A-2E2C5464A6DB}" sibTransId="{509CE145-5378-41B6-AC6B-26380D32F081}"/>
-    <dgm:cxn modelId="{B9CAC130-5F0E-4A1D-A6C7-5B57137F4F7E}" type="presOf" srcId="{6E327FFA-CC2C-4F26-8639-6A64BD26F688}" destId="{C0B605E1-7567-497D-8EA9-E2E3A37B6E28}" srcOrd="0" destOrd="0" presId="urn:microsoft.com/office/officeart/2005/8/layout/hierarchy6"/>
-    <dgm:cxn modelId="{66092533-1E36-413F-93EA-C425BD71E069}" type="presOf" srcId="{D0563501-1173-409B-BE16-24A5C8253377}" destId="{DE2DFDF4-5F02-4E95-A59C-BD4F597DCF88}" srcOrd="0" destOrd="0" presId="urn:microsoft.com/office/officeart/2005/8/layout/hierarchy6"/>
-    <dgm:cxn modelId="{20C16B36-01D0-4AE8-98D9-1386AA2A3F9D}" type="presOf" srcId="{A1EF8496-7A96-41B7-ABA2-7960927DC000}" destId="{55693C6D-10F9-4F64-ADE8-91DBD07ADD42}" srcOrd="0" destOrd="0" presId="urn:microsoft.com/office/officeart/2005/8/layout/hierarchy6"/>
-    <dgm:cxn modelId="{90D72638-519F-4806-800D-DD848FDD57A6}" srcId="{492EA1CE-F49A-487B-B52C-DD671590C4AB}" destId="{26A6B070-DD19-442D-A81B-63595ECE5F8F}" srcOrd="2" destOrd="0" parTransId="{17E0CBBB-1109-4419-B435-579292F37DCC}" sibTransId="{AA819FB1-7FE7-4668-90FC-9CC46988B202}"/>
-    <dgm:cxn modelId="{0B548D5B-8E65-453B-8251-592F5E983538}" type="presOf" srcId="{E5B38286-1B43-482F-9F35-80054A24DB02}" destId="{B906C7BB-AADF-47D5-9079-CCA23B609F78}" srcOrd="0" destOrd="0" presId="urn:microsoft.com/office/officeart/2005/8/layout/hierarchy6"/>
-    <dgm:cxn modelId="{BE8F9B5D-CC2D-48AC-BEE2-CE2459534738}" type="presOf" srcId="{AC391FD8-BEF6-406B-8DDA-E258002D9D4A}" destId="{A4502926-B005-4510-A1B4-3AEAD9C4AE3C}" srcOrd="0" destOrd="0" presId="urn:microsoft.com/office/officeart/2005/8/layout/hierarchy6"/>
-    <dgm:cxn modelId="{D435AD5E-BEF1-4932-AC38-44E866217B0D}" type="presOf" srcId="{3564D136-ED9F-4211-A941-F8519B81B222}" destId="{779B8017-965F-4ED7-A453-5B22C782DC0B}" srcOrd="0" destOrd="0" presId="urn:microsoft.com/office/officeart/2005/8/layout/hierarchy6"/>
-    <dgm:cxn modelId="{DB005562-4E67-43C9-BC57-799BA0777F40}" type="presOf" srcId="{D505866C-B593-437C-B169-748D260677E0}" destId="{41E2ECE7-BA3C-413F-9870-446CAE2DC136}" srcOrd="0" destOrd="0" presId="urn:microsoft.com/office/officeart/2005/8/layout/hierarchy6"/>
-    <dgm:cxn modelId="{D73FAF6A-713A-48F5-B631-36DEA141FAFD}" type="presOf" srcId="{DAD463E0-47C0-40A4-A9A8-7F2A407A259F}" destId="{61CF322C-8439-442D-8B34-B6054691CE9C}" srcOrd="0" destOrd="0" presId="urn:microsoft.com/office/officeart/2005/8/layout/hierarchy6"/>
+    <dgm:cxn modelId="{BD4CD82E-3225-4050-8A8D-4F055133CC3E}" type="presOf" srcId="{D08BF6AC-545D-40BA-A645-B4DFFBC9DE4F}" destId="{0BEB8184-B777-46E1-B921-8C0FDA01D082}" srcOrd="0" destOrd="0" presId="urn:microsoft.com/office/officeart/2005/8/layout/hierarchy6"/>
+    <dgm:cxn modelId="{4ACBBD34-CF55-45D9-B417-DA634ADEC892}" type="presOf" srcId="{D4868FFD-771C-4CEC-92DD-0639FF96FFFB}" destId="{D7B4A93B-3CA1-4BBC-9B81-8FFE546B1FF8}" srcOrd="0" destOrd="0" presId="urn:microsoft.com/office/officeart/2005/8/layout/hierarchy6"/>
+    <dgm:cxn modelId="{7DFC0D38-20E1-4B76-B804-AAA208E77DE4}" type="presOf" srcId="{506280D3-E1D3-4FD1-882E-7D5A4B992B6E}" destId="{59BD8D1D-DFE7-4E5D-9A33-F41207E85527}" srcOrd="0" destOrd="0" presId="urn:microsoft.com/office/officeart/2005/8/layout/hierarchy6"/>
+    <dgm:cxn modelId="{90D72638-519F-4806-800D-DD848FDD57A6}" srcId="{E7FC5B26-5A56-48B3-8222-2C4E92D821D7}" destId="{26A6B070-DD19-442D-A81B-63595ECE5F8F}" srcOrd="1" destOrd="0" parTransId="{17E0CBBB-1109-4419-B435-579292F37DCC}" sibTransId="{AA819FB1-7FE7-4668-90FC-9CC46988B202}"/>
+    <dgm:cxn modelId="{88B8A541-B0B5-48F3-BB59-C4DCAEA63F8A}" type="presOf" srcId="{DAD463E0-47C0-40A4-A9A8-7F2A407A259F}" destId="{61CF322C-8439-442D-8B34-B6054691CE9C}" srcOrd="0" destOrd="0" presId="urn:microsoft.com/office/officeart/2005/8/layout/hierarchy6"/>
+    <dgm:cxn modelId="{6AFE0F4A-A5F0-41BF-9693-69A7B0692575}" type="presOf" srcId="{55692953-68FF-4CFE-9C3A-2E2C5464A6DB}" destId="{03C1E623-CBB3-4F8E-9E78-431E8BB7DEF5}" srcOrd="0" destOrd="0" presId="urn:microsoft.com/office/officeart/2005/8/layout/hierarchy6"/>
     <dgm:cxn modelId="{CF48B54A-D002-480C-92F2-F73941783B8A}" srcId="{D4868FFD-771C-4CEC-92DD-0639FF96FFFB}" destId="{492EA1CE-F49A-487B-B52C-DD671590C4AB}" srcOrd="1" destOrd="0" parTransId="{B830D8E3-2924-418D-BDC6-658F37E80D27}" sibTransId="{E7E4CA06-CCE5-4038-B61A-1C1E30A103B5}"/>
-    <dgm:cxn modelId="{4A09FB4B-11F9-49D1-A78D-B971F16C0471}" type="presOf" srcId="{04B253BA-67E4-4347-A4BA-B77FED133C5E}" destId="{7DA13BCD-E6BC-4FEF-AC88-1ABD56621546}" srcOrd="0" destOrd="0" presId="urn:microsoft.com/office/officeart/2005/8/layout/hierarchy6"/>
-    <dgm:cxn modelId="{A62A0E4C-6E68-4A95-9E9A-D0A2FA081B58}" type="presOf" srcId="{26A6B070-DD19-442D-A81B-63595ECE5F8F}" destId="{8976D2E3-5B0F-4111-8A1F-3F406BBE1D4E}" srcOrd="0" destOrd="0" presId="urn:microsoft.com/office/officeart/2005/8/layout/hierarchy6"/>
-    <dgm:cxn modelId="{8BE2B86D-DC92-4F37-815B-4C61A3AC6085}" type="presOf" srcId="{17E0CBBB-1109-4419-B435-579292F37DCC}" destId="{8599F571-1C6C-4CB6-926A-7FCEE3F9118A}" srcOrd="0" destOrd="0" presId="urn:microsoft.com/office/officeart/2005/8/layout/hierarchy6"/>
-    <dgm:cxn modelId="{2996D34D-C943-43DD-81B3-402D6998F753}" type="presOf" srcId="{0E71F402-DE2D-4851-806E-A5637112E586}" destId="{15A27B40-9101-4675-8BDF-7CA10B938AB9}" srcOrd="0" destOrd="0" presId="urn:microsoft.com/office/officeart/2005/8/layout/hierarchy6"/>
-    <dgm:cxn modelId="{ABB39975-F56D-4EA1-BCAF-46372096F2F3}" type="presOf" srcId="{D4868FFD-771C-4CEC-92DD-0639FF96FFFB}" destId="{D7B4A93B-3CA1-4BBC-9B81-8FFE546B1FF8}" srcOrd="0" destOrd="0" presId="urn:microsoft.com/office/officeart/2005/8/layout/hierarchy6"/>
-    <dgm:cxn modelId="{1CA1D976-E841-4805-A3B3-BDE8608E363D}" type="presOf" srcId="{492EA1CE-F49A-487B-B52C-DD671590C4AB}" destId="{8CCC06FA-7AC0-4C7C-9710-7E32BD6B0ABB}" srcOrd="0" destOrd="0" presId="urn:microsoft.com/office/officeart/2005/8/layout/hierarchy6"/>
+    <dgm:cxn modelId="{42AA2D4F-955C-4CDE-9869-3F8AD51D4F20}" type="presOf" srcId="{6E327FFA-CC2C-4F26-8639-6A64BD26F688}" destId="{C0B605E1-7567-497D-8EA9-E2E3A37B6E28}" srcOrd="0" destOrd="0" presId="urn:microsoft.com/office/officeart/2005/8/layout/hierarchy6"/>
+    <dgm:cxn modelId="{5A28BC71-EA9E-448C-95B1-C7591AC33DCB}" type="presOf" srcId="{6FC2B031-D8FF-425F-AFA9-E2EA1DC321ED}" destId="{2F62BB5C-8B45-4C37-9E90-BD5EB4A72863}" srcOrd="0" destOrd="0" presId="urn:microsoft.com/office/officeart/2005/8/layout/hierarchy6"/>
+    <dgm:cxn modelId="{3B34B173-ACFF-424C-8E19-24D9761900B5}" type="presOf" srcId="{0E71F402-DE2D-4851-806E-A5637112E586}" destId="{15A27B40-9101-4675-8BDF-7CA10B938AB9}" srcOrd="0" destOrd="0" presId="urn:microsoft.com/office/officeart/2005/8/layout/hierarchy6"/>
+    <dgm:cxn modelId="{FB7CE076-67E1-4348-98BB-44F4F4E71B53}" type="presOf" srcId="{AC391FD8-BEF6-406B-8DDA-E258002D9D4A}" destId="{A4502926-B005-4510-A1B4-3AEAD9C4AE3C}" srcOrd="0" destOrd="0" presId="urn:microsoft.com/office/officeart/2005/8/layout/hierarchy6"/>
+    <dgm:cxn modelId="{FEB4FC56-F624-4980-BB56-430D9210D33E}" type="presOf" srcId="{D0563501-1173-409B-BE16-24A5C8253377}" destId="{DE2DFDF4-5F02-4E95-A59C-BD4F597DCF88}" srcOrd="0" destOrd="0" presId="urn:microsoft.com/office/officeart/2005/8/layout/hierarchy6"/>
     <dgm:cxn modelId="{B4728E57-4B35-4AC1-9607-FBE611983084}" srcId="{4C20C150-1E51-4F09-BC5D-EBB1F791686D}" destId="{ED38794F-F591-4E93-B17F-87415321378C}" srcOrd="0" destOrd="0" parTransId="{F472896D-8AD9-4687-B850-8EB22275547B}" sibTransId="{14DA5C50-2E22-4198-9D76-91AB3A697926}"/>
     <dgm:cxn modelId="{EA4CD957-E611-443C-8C90-002F3D3BF4D8}" srcId="{6FC2B031-D8FF-425F-AFA9-E2EA1DC321ED}" destId="{D505866C-B593-437C-B169-748D260677E0}" srcOrd="1" destOrd="0" parTransId="{BF4CD824-05CF-4C00-B6B6-344A87CFB10E}" sibTransId="{EB8261F9-0FF3-4A23-A6C2-B9C8198F9124}"/>
     <dgm:cxn modelId="{B6B87678-BC66-4ED4-A9ED-A5E5772FD4F7}" srcId="{D505866C-B593-437C-B169-748D260677E0}" destId="{4C20C150-1E51-4F09-BC5D-EBB1F791686D}" srcOrd="1" destOrd="0" parTransId="{A1EF8496-7A96-41B7-ABA2-7960927DC000}" sibTransId="{A5E7793B-FF2B-4B77-9665-6786D10DE626}"/>
-    <dgm:cxn modelId="{FD06828C-12AB-445D-A328-C4BCB475E8AF}" type="presOf" srcId="{05B9EE2C-EC7B-4C1F-9DFA-94C1A1972B20}" destId="{BE05E9B3-C033-4E94-915C-57386F2FFFCF}" srcOrd="0" destOrd="0" presId="urn:microsoft.com/office/officeart/2005/8/layout/hierarchy6"/>
-    <dgm:cxn modelId="{A8B89D90-D6F8-49DE-8643-D49AB7A01505}" type="presOf" srcId="{D14453E5-0411-4395-A2CB-6AEF5EE5413D}" destId="{E6FC1F5D-EA81-40F0-8F66-C6E67ED080E4}" srcOrd="0" destOrd="0" presId="urn:microsoft.com/office/officeart/2005/8/layout/hierarchy6"/>
-    <dgm:cxn modelId="{3B8F0991-024F-4F85-88B6-1BF619329C32}" type="presOf" srcId="{4C20C150-1E51-4F09-BC5D-EBB1F791686D}" destId="{FE0BDF8F-B7BF-4C54-81D4-7393A0E3C6CF}" srcOrd="0" destOrd="0" presId="urn:microsoft.com/office/officeart/2005/8/layout/hierarchy6"/>
-    <dgm:cxn modelId="{CCFC2E93-864B-4FF6-BC9F-1FBBA8913D05}" srcId="{492EA1CE-F49A-487B-B52C-DD671590C4AB}" destId="{AC391FD8-BEF6-406B-8DDA-E258002D9D4A}" srcOrd="3" destOrd="0" parTransId="{EAD8C576-E5E6-4ECF-85E4-E3E031E5C280}" sibTransId="{3C6B8237-8B77-4957-8F6C-3162E280EA9C}"/>
+    <dgm:cxn modelId="{7B081779-3225-4816-BAE3-32CDEB84C077}" type="presOf" srcId="{528B8B52-4B31-43FB-BB48-F4023318E6C1}" destId="{52464C16-1B9F-46B5-9BF4-98069B452246}" srcOrd="0" destOrd="0" presId="urn:microsoft.com/office/officeart/2005/8/layout/hierarchy6"/>
+    <dgm:cxn modelId="{487DF591-4114-4525-8D84-E9E06E183D84}" type="presOf" srcId="{ACEA61FB-115A-4192-8BC4-0FB2A5FEC36C}" destId="{3321C745-C943-48B5-A72D-18FDCA516C06}" srcOrd="0" destOrd="0" presId="urn:microsoft.com/office/officeart/2005/8/layout/hierarchy6"/>
+    <dgm:cxn modelId="{CCFC2E93-864B-4FF6-BC9F-1FBBA8913D05}" srcId="{E7FC5B26-5A56-48B3-8222-2C4E92D821D7}" destId="{AC391FD8-BEF6-406B-8DDA-E258002D9D4A}" srcOrd="2" destOrd="0" parTransId="{EAD8C576-E5E6-4ECF-85E4-E3E031E5C280}" sibTransId="{3C6B8237-8B77-4957-8F6C-3162E280EA9C}"/>
     <dgm:cxn modelId="{F1F38E93-B29C-4ABE-9CEA-A2DF4CB4F26B}" srcId="{4C20C150-1E51-4F09-BC5D-EBB1F791686D}" destId="{FEE12920-3112-447C-BC9E-97F41884D875}" srcOrd="1" destOrd="0" parTransId="{D0563501-1173-409B-BE16-24A5C8253377}" sibTransId="{30EF4F7B-1A8A-432B-9CBC-35D5E1E2B04A}"/>
-    <dgm:cxn modelId="{3BC1289D-7EE6-41F0-A598-916FA614B60F}" type="presOf" srcId="{55692953-68FF-4CFE-9C3A-2E2C5464A6DB}" destId="{03C1E623-CBB3-4F8E-9E78-431E8BB7DEF5}" srcOrd="0" destOrd="0" presId="urn:microsoft.com/office/officeart/2005/8/layout/hierarchy6"/>
-    <dgm:cxn modelId="{7C70E79E-331F-48E3-8C78-3616627F5792}" type="presOf" srcId="{D08BF6AC-545D-40BA-A645-B4DFFBC9DE4F}" destId="{0BEB8184-B777-46E1-B921-8C0FDA01D082}" srcOrd="0" destOrd="0" presId="urn:microsoft.com/office/officeart/2005/8/layout/hierarchy6"/>
-    <dgm:cxn modelId="{CA7E4BA4-F69D-4C58-9997-81BFE56BABF1}" type="presOf" srcId="{B830D8E3-2924-418D-BDC6-658F37E80D27}" destId="{81C9A1E9-D072-4DCA-B04B-417DFBE04C73}" srcOrd="0" destOrd="0" presId="urn:microsoft.com/office/officeart/2005/8/layout/hierarchy6"/>
-    <dgm:cxn modelId="{306176A8-D6DE-405E-AF7F-FCA8D949B6E9}" type="presOf" srcId="{976EBA29-B2DB-4A0B-84EA-D29E64F2E9F9}" destId="{5154C260-018E-42D3-BBA3-EEDEBB120F5B}" srcOrd="0" destOrd="0" presId="urn:microsoft.com/office/officeart/2005/8/layout/hierarchy6"/>
+    <dgm:cxn modelId="{280E3C96-A961-4606-8A58-2CAA375FBA75}" type="presOf" srcId="{B830D8E3-2924-418D-BDC6-658F37E80D27}" destId="{81C9A1E9-D072-4DCA-B04B-417DFBE04C73}" srcOrd="0" destOrd="0" presId="urn:microsoft.com/office/officeart/2005/8/layout/hierarchy6"/>
+    <dgm:cxn modelId="{0AC5B198-102D-458F-AB44-5381CE836C36}" type="presOf" srcId="{BD264E22-A408-4FA0-B85D-B75330B02049}" destId="{4C92394A-3740-4441-A2A1-6AA3072B9C48}" srcOrd="0" destOrd="0" presId="urn:microsoft.com/office/officeart/2005/8/layout/hierarchy6"/>
+    <dgm:cxn modelId="{9BDA45A1-B62A-484F-8F57-A0322B7D75CA}" type="presOf" srcId="{D505866C-B593-437C-B169-748D260677E0}" destId="{41E2ECE7-BA3C-413F-9870-446CAE2DC136}" srcOrd="0" destOrd="0" presId="urn:microsoft.com/office/officeart/2005/8/layout/hierarchy6"/>
     <dgm:cxn modelId="{17B9A6A9-90E0-41B1-9E85-916750195285}" srcId="{0E71F402-DE2D-4851-806E-A5637112E586}" destId="{953AE3BE-C009-48AE-AEA3-949EC8449372}" srcOrd="0" destOrd="0" parTransId="{BD264E22-A408-4FA0-B85D-B75330B02049}" sibTransId="{E4C25FF1-547E-4CB4-8D21-4B7C2BF96E02}"/>
+    <dgm:cxn modelId="{AAD67BAE-770C-4E1A-AF4F-53705878A7A1}" type="presOf" srcId="{BF4CD824-05CF-4C00-B6B6-344A87CFB10E}" destId="{82E35868-D55A-4884-874A-AA901AFD731D}" srcOrd="0" destOrd="0" presId="urn:microsoft.com/office/officeart/2005/8/layout/hierarchy6"/>
     <dgm:cxn modelId="{57AF7FB0-42CC-4AB6-A004-1B3810843CA0}" srcId="{D505866C-B593-437C-B169-748D260677E0}" destId="{04B253BA-67E4-4347-A4BA-B77FED133C5E}" srcOrd="0" destOrd="0" parTransId="{C4145D6E-AB59-4A7C-9836-5AEB8FDCF3CA}" sibTransId="{D958E8FD-23DF-4927-848B-9CAD5C1570D0}"/>
-    <dgm:cxn modelId="{00C944B7-FAAC-4419-A0E3-FED4A1AB8D29}" type="presOf" srcId="{B1C41E72-CD3E-45AC-AE7A-7DA1AA6273F7}" destId="{2E751865-6AD6-4026-8323-96EE5CA8856A}" srcOrd="0" destOrd="0" presId="urn:microsoft.com/office/officeart/2005/8/layout/hierarchy6"/>
+    <dgm:cxn modelId="{3AE534B3-FAB6-4E7F-9BDF-E32A67817D40}" type="presOf" srcId="{A1EF8496-7A96-41B7-ABA2-7960927DC000}" destId="{55693C6D-10F9-4F64-ADE8-91DBD07ADD42}" srcOrd="0" destOrd="0" presId="urn:microsoft.com/office/officeart/2005/8/layout/hierarchy6"/>
+    <dgm:cxn modelId="{1803DBBB-A6B9-41D6-9CFF-A15FBB52D414}" type="presOf" srcId="{05B9EE2C-EC7B-4C1F-9DFA-94C1A1972B20}" destId="{BE05E9B3-C033-4E94-915C-57386F2FFFCF}" srcOrd="0" destOrd="0" presId="urn:microsoft.com/office/officeart/2005/8/layout/hierarchy6"/>
     <dgm:cxn modelId="{297D9BBD-6229-4DA9-AE55-0DC773735059}" srcId="{D4868FFD-771C-4CEC-92DD-0639FF96FFFB}" destId="{6FC2B031-D8FF-425F-AFA9-E2EA1DC321ED}" srcOrd="0" destOrd="0" parTransId="{6E327FFA-CC2C-4F26-8639-6A64BD26F688}" sibTransId="{4657669F-34AE-472D-8A07-B07478EA8FCA}"/>
+    <dgm:cxn modelId="{8A63FEBE-AD53-49D6-BFF6-E28E4E4331ED}" type="presOf" srcId="{7B197C8A-C41B-4D87-817A-FF50A4A1314C}" destId="{508B9431-792A-40C5-82BA-B280E3C19A47}" srcOrd="0" destOrd="0" presId="urn:microsoft.com/office/officeart/2005/8/layout/hierarchy6"/>
     <dgm:cxn modelId="{043C09C1-AF7D-43AC-B07D-99BD61BC964B}" srcId="{528B8B52-4B31-43FB-BB48-F4023318E6C1}" destId="{7B197C8A-C41B-4D87-817A-FF50A4A1314C}" srcOrd="0" destOrd="0" parTransId="{68ABB548-5FD7-43E0-AAFE-46F683E79FE5}" sibTransId="{81AE5667-E8DB-4314-819B-6314D9F4ACFF}"/>
+    <dgm:cxn modelId="{70E918C2-4067-4B25-857D-DD0FAC9371ED}" type="presOf" srcId="{953AE3BE-C009-48AE-AEA3-949EC8449372}" destId="{F738F083-9520-4B4C-B063-820EE2613BAA}" srcOrd="0" destOrd="0" presId="urn:microsoft.com/office/officeart/2005/8/layout/hierarchy6"/>
     <dgm:cxn modelId="{FA0F1FC4-E480-4386-B061-6B5ED8BA2548}" srcId="{D505866C-B593-437C-B169-748D260677E0}" destId="{0E71F402-DE2D-4851-806E-A5637112E586}" srcOrd="2" destOrd="0" parTransId="{CB73BE5D-624B-464B-BDE1-25E38A52C2B1}" sibTransId="{6971004C-1A03-42A4-B4A1-44E2A7092A39}"/>
-    <dgm:cxn modelId="{55C040C4-AA39-4029-A4BE-1B840841466E}" type="presOf" srcId="{68ABB548-5FD7-43E0-AAFE-46F683E79FE5}" destId="{150EA877-0DAA-44B7-B6CB-653578BFC5D5}" srcOrd="0" destOrd="0" presId="urn:microsoft.com/office/officeart/2005/8/layout/hierarchy6"/>
-    <dgm:cxn modelId="{FD6121C5-7F08-42ED-AAEC-C9C98D6EBA9B}" type="presOf" srcId="{506280D3-E1D3-4FD1-882E-7D5A4B992B6E}" destId="{59BD8D1D-DFE7-4E5D-9A33-F41207E85527}" srcOrd="0" destOrd="0" presId="urn:microsoft.com/office/officeart/2005/8/layout/hierarchy6"/>
-    <dgm:cxn modelId="{FBF796C8-F3AE-4966-9861-8EBD314F40C0}" type="presOf" srcId="{BD264E22-A408-4FA0-B85D-B75330B02049}" destId="{4C92394A-3740-4441-A2A1-6AA3072B9C48}" srcOrd="0" destOrd="0" presId="urn:microsoft.com/office/officeart/2005/8/layout/hierarchy6"/>
     <dgm:cxn modelId="{BD61F4C8-EB4C-44FF-AE52-923D81726E1B}" srcId="{528B8B52-4B31-43FB-BB48-F4023318E6C1}" destId="{976EBA29-B2DB-4A0B-84EA-D29E64F2E9F9}" srcOrd="1" destOrd="0" parTransId="{B1C41E72-CD3E-45AC-AE7A-7DA1AA6273F7}" sibTransId="{5BAC3763-0FFE-49B9-8691-311317647914}"/>
-    <dgm:cxn modelId="{668B40C9-8799-4107-B1EB-41FB383009F4}" srcId="{492EA1CE-F49A-487B-B52C-DD671590C4AB}" destId="{05B9EE2C-EC7B-4C1F-9DFA-94C1A1972B20}" srcOrd="1" destOrd="0" parTransId="{D08BF6AC-545D-40BA-A645-B4DFFBC9DE4F}" sibTransId="{DA663B97-66EA-473F-AE7D-B03022BD8842}"/>
-    <dgm:cxn modelId="{F25AFFC9-C36D-4A7F-932C-8CF5D76FF561}" type="presOf" srcId="{ACEA61FB-115A-4192-8BC4-0FB2A5FEC36C}" destId="{3321C745-C943-48B5-A72D-18FDCA516C06}" srcOrd="0" destOrd="0" presId="urn:microsoft.com/office/officeart/2005/8/layout/hierarchy6"/>
-    <dgm:cxn modelId="{CE7EE1CB-C7F2-4FC2-B980-9F454F9C9F72}" type="presOf" srcId="{BF4CD824-05CF-4C00-B6B6-344A87CFB10E}" destId="{82E35868-D55A-4884-874A-AA901AFD731D}" srcOrd="0" destOrd="0" presId="urn:microsoft.com/office/officeart/2005/8/layout/hierarchy6"/>
-    <dgm:cxn modelId="{01FE26D0-BF83-40C1-9F0F-9027E3CC883A}" type="presOf" srcId="{EAD8C576-E5E6-4ECF-85E4-E3E031E5C280}" destId="{55BB6539-41D1-424D-B1C6-82B34F71F71D}" srcOrd="0" destOrd="0" presId="urn:microsoft.com/office/officeart/2005/8/layout/hierarchy6"/>
-    <dgm:cxn modelId="{F7D2EAD3-696A-4B7E-9D34-60256E500FAA}" type="presOf" srcId="{7B197C8A-C41B-4D87-817A-FF50A4A1314C}" destId="{508B9431-792A-40C5-82BA-B280E3C19A47}" srcOrd="0" destOrd="0" presId="urn:microsoft.com/office/officeart/2005/8/layout/hierarchy6"/>
-    <dgm:cxn modelId="{CEBE17D4-4FA7-489D-A609-3374781E07CA}" type="presOf" srcId="{F472896D-8AD9-4687-B850-8EB22275547B}" destId="{7EADC087-4500-48DB-8562-2E1060FC40CB}" srcOrd="0" destOrd="0" presId="urn:microsoft.com/office/officeart/2005/8/layout/hierarchy6"/>
-    <dgm:cxn modelId="{F83665DF-5433-45B3-B8EB-7DF16919E386}" srcId="{492EA1CE-F49A-487B-B52C-DD671590C4AB}" destId="{3564D136-ED9F-4211-A941-F8519B81B222}" srcOrd="0" destOrd="0" parTransId="{506280D3-E1D3-4FD1-882E-7D5A4B992B6E}" sibTransId="{D3F64358-8B89-48F5-B7D6-744BBEAD07B6}"/>
-    <dgm:cxn modelId="{B7347DE5-66A0-4293-9F31-1473C7BAB383}" type="presOf" srcId="{FEE12920-3112-447C-BC9E-97F41884D875}" destId="{3A4E8DEE-6AF4-4D83-8C14-20E3F1731880}" srcOrd="0" destOrd="0" presId="urn:microsoft.com/office/officeart/2005/8/layout/hierarchy6"/>
+    <dgm:cxn modelId="{668B40C9-8799-4107-B1EB-41FB383009F4}" srcId="{E7FC5B26-5A56-48B3-8222-2C4E92D821D7}" destId="{05B9EE2C-EC7B-4C1F-9DFA-94C1A1972B20}" srcOrd="0" destOrd="0" parTransId="{D08BF6AC-545D-40BA-A645-B4DFFBC9DE4F}" sibTransId="{DA663B97-66EA-473F-AE7D-B03022BD8842}"/>
+    <dgm:cxn modelId="{7F1AD2D1-12B1-4A4F-927A-198A7D1DBAFA}" type="presOf" srcId="{F472896D-8AD9-4687-B850-8EB22275547B}" destId="{7EADC087-4500-48DB-8562-2E1060FC40CB}" srcOrd="0" destOrd="0" presId="urn:microsoft.com/office/officeart/2005/8/layout/hierarchy6"/>
+    <dgm:cxn modelId="{A02626D2-E2C7-4B7F-BB5A-A22953996F21}" srcId="{492EA1CE-F49A-487B-B52C-DD671590C4AB}" destId="{E7FC5B26-5A56-48B3-8222-2C4E92D821D7}" srcOrd="0" destOrd="0" parTransId="{C655FC40-7A98-40AF-8EE8-11CA632B7F45}" sibTransId="{09A6273D-2B22-4F31-9FFA-B0A79B860184}"/>
+    <dgm:cxn modelId="{0F5BA6D2-CD70-4BF9-B82D-C877CEDB9752}" type="presOf" srcId="{976EBA29-B2DB-4A0B-84EA-D29E64F2E9F9}" destId="{5154C260-018E-42D3-BBA3-EEDEBB120F5B}" srcOrd="0" destOrd="0" presId="urn:microsoft.com/office/officeart/2005/8/layout/hierarchy6"/>
+    <dgm:cxn modelId="{DD4CDAD7-79A4-4F04-86E6-1C1B6993A333}" type="presOf" srcId="{B1C41E72-CD3E-45AC-AE7A-7DA1AA6273F7}" destId="{2E751865-6AD6-4026-8323-96EE5CA8856A}" srcOrd="0" destOrd="0" presId="urn:microsoft.com/office/officeart/2005/8/layout/hierarchy6"/>
+    <dgm:cxn modelId="{4253CEDB-06AE-4BDE-9899-3A789A9701B0}" type="presOf" srcId="{68ABB548-5FD7-43E0-AAFE-46F683E79FE5}" destId="{150EA877-0DAA-44B7-B6CB-653578BFC5D5}" srcOrd="0" destOrd="0" presId="urn:microsoft.com/office/officeart/2005/8/layout/hierarchy6"/>
+    <dgm:cxn modelId="{F83665DF-5433-45B3-B8EB-7DF16919E386}" srcId="{492EA1CE-F49A-487B-B52C-DD671590C4AB}" destId="{3564D136-ED9F-4211-A941-F8519B81B222}" srcOrd="1" destOrd="0" parTransId="{506280D3-E1D3-4FD1-882E-7D5A4B992B6E}" sibTransId="{D3F64358-8B89-48F5-B7D6-744BBEAD07B6}"/>
+    <dgm:cxn modelId="{48D4CDE3-B37D-47AA-A17C-F17DA188705A}" type="presOf" srcId="{3564D136-ED9F-4211-A941-F8519B81B222}" destId="{779B8017-965F-4ED7-A453-5B22C782DC0B}" srcOrd="0" destOrd="0" presId="urn:microsoft.com/office/officeart/2005/8/layout/hierarchy6"/>
+    <dgm:cxn modelId="{E106D5E7-5FFC-4D07-8F53-9BF8343B6B37}" type="presOf" srcId="{D14453E5-0411-4395-A2CB-6AEF5EE5413D}" destId="{E6FC1F5D-EA81-40F0-8F66-C6E67ED080E4}" srcOrd="0" destOrd="0" presId="urn:microsoft.com/office/officeart/2005/8/layout/hierarchy6"/>
+    <dgm:cxn modelId="{C5B2E8EC-F679-4E9F-9641-AA468C1D2AA4}" type="presOf" srcId="{492EA1CE-F49A-487B-B52C-DD671590C4AB}" destId="{8CCC06FA-7AC0-4C7C-9710-7E32BD6B0ABB}" srcOrd="0" destOrd="0" presId="urn:microsoft.com/office/officeart/2005/8/layout/hierarchy6"/>
+    <dgm:cxn modelId="{176582ED-DDD1-40DD-B897-DEF21CA6CA04}" type="presOf" srcId="{FEE12920-3112-447C-BC9E-97F41884D875}" destId="{3A4E8DEE-6AF4-4D83-8C14-20E3F1731880}" srcOrd="0" destOrd="0" presId="urn:microsoft.com/office/officeart/2005/8/layout/hierarchy6"/>
+    <dgm:cxn modelId="{2CA6DAED-AB1D-4513-9A0D-EBB3FF8F9963}" type="presOf" srcId="{04B253BA-67E4-4347-A4BA-B77FED133C5E}" destId="{7DA13BCD-E6BC-4FEF-AC88-1ABD56621546}" srcOrd="0" destOrd="0" presId="urn:microsoft.com/office/officeart/2005/8/layout/hierarchy6"/>
+    <dgm:cxn modelId="{2A358AEE-B351-478E-A136-9B58CF1D1B36}" type="presOf" srcId="{C4145D6E-AB59-4A7C-9836-5AEB8FDCF3CA}" destId="{4E38FE01-194E-466F-87CF-949943532C6D}" srcOrd="0" destOrd="0" presId="urn:microsoft.com/office/officeart/2005/8/layout/hierarchy6"/>
     <dgm:cxn modelId="{3E7BF2F0-9F4F-4A0D-8BDD-C905AA52188C}" srcId="{0E71F402-DE2D-4851-806E-A5637112E586}" destId="{D14453E5-0411-4395-A2CB-6AEF5EE5413D}" srcOrd="1" destOrd="0" parTransId="{E5B38286-1B43-482F-9F35-80054A24DB02}" sibTransId="{BB56391F-C46E-4870-8E9D-BF760535203C}"/>
+    <dgm:cxn modelId="{AB7758F8-3484-49BE-BEE0-655F9C8B18F3}" type="presOf" srcId="{ED38794F-F591-4E93-B17F-87415321378C}" destId="{A49C93DF-9D18-4027-8585-15E23ECB4B00}" srcOrd="0" destOrd="0" presId="urn:microsoft.com/office/officeart/2005/8/layout/hierarchy6"/>
+    <dgm:cxn modelId="{231722FA-C0EA-4E9E-A7C6-CBF59CE00A0D}" type="presOf" srcId="{EAD8C576-E5E6-4ECF-85E4-E3E031E5C280}" destId="{55BB6539-41D1-424D-B1C6-82B34F71F71D}" srcOrd="0" destOrd="0" presId="urn:microsoft.com/office/officeart/2005/8/layout/hierarchy6"/>
     <dgm:cxn modelId="{4BFD7FFC-755F-4F15-B34F-E545A0B01F29}" type="presOf" srcId="{C707CC34-02D2-4206-8DAF-921973BC0C77}" destId="{B65D09B4-F10B-43E1-A30E-95A9CAB9BF6F}" srcOrd="0" destOrd="0" presId="urn:microsoft.com/office/officeart/2005/8/layout/hierarchy6"/>
-    <dgm:cxn modelId="{DE8C47AE-8EE9-4F5E-B4BB-AAE811E9119D}" type="presParOf" srcId="{B65D09B4-F10B-43E1-A30E-95A9CAB9BF6F}" destId="{694F98E2-E8AF-4192-9B37-0F65930D5023}" srcOrd="0" destOrd="0" presId="urn:microsoft.com/office/officeart/2005/8/layout/hierarchy6"/>
-    <dgm:cxn modelId="{C6E38B40-BAB9-4A3D-8FA7-A153CF37FAF8}" type="presParOf" srcId="{694F98E2-E8AF-4192-9B37-0F65930D5023}" destId="{3C7EE044-B98F-488A-90B8-8B66738F93BF}" srcOrd="0" destOrd="0" presId="urn:microsoft.com/office/officeart/2005/8/layout/hierarchy6"/>
-    <dgm:cxn modelId="{73A4153C-30D1-41A5-9B5C-624F9E4413AD}" type="presParOf" srcId="{3C7EE044-B98F-488A-90B8-8B66738F93BF}" destId="{1A05544C-AFC2-4DEA-BF1D-7BAD93086380}" srcOrd="0" destOrd="0" presId="urn:microsoft.com/office/officeart/2005/8/layout/hierarchy6"/>
-    <dgm:cxn modelId="{B98A8807-9537-4FBB-A809-2C748DB807C8}" type="presParOf" srcId="{1A05544C-AFC2-4DEA-BF1D-7BAD93086380}" destId="{D7B4A93B-3CA1-4BBC-9B81-8FFE546B1FF8}" srcOrd="0" destOrd="0" presId="urn:microsoft.com/office/officeart/2005/8/layout/hierarchy6"/>
-    <dgm:cxn modelId="{2B67CCFB-AA5C-467E-8390-9F0B4BDCCB7F}" type="presParOf" srcId="{1A05544C-AFC2-4DEA-BF1D-7BAD93086380}" destId="{C6FA227F-5867-45BB-B60E-C6F3E5CA4431}" srcOrd="1" destOrd="0" presId="urn:microsoft.com/office/officeart/2005/8/layout/hierarchy6"/>
-    <dgm:cxn modelId="{0A6FC8EE-3708-4E34-8753-7772CB355FC0}" type="presParOf" srcId="{C6FA227F-5867-45BB-B60E-C6F3E5CA4431}" destId="{C0B605E1-7567-497D-8EA9-E2E3A37B6E28}" srcOrd="0" destOrd="0" presId="urn:microsoft.com/office/officeart/2005/8/layout/hierarchy6"/>
-    <dgm:cxn modelId="{FB733645-0843-426A-A760-D1EC9BBF3DE0}" type="presParOf" srcId="{C6FA227F-5867-45BB-B60E-C6F3E5CA4431}" destId="{6480D912-D605-422C-9337-8E804DF7CEE6}" srcOrd="1" destOrd="0" presId="urn:microsoft.com/office/officeart/2005/8/layout/hierarchy6"/>
-    <dgm:cxn modelId="{11CD3A10-0A3D-41D0-B892-F33DB703D26D}" type="presParOf" srcId="{6480D912-D605-422C-9337-8E804DF7CEE6}" destId="{2F62BB5C-8B45-4C37-9E90-BD5EB4A72863}" srcOrd="0" destOrd="0" presId="urn:microsoft.com/office/officeart/2005/8/layout/hierarchy6"/>
-    <dgm:cxn modelId="{7B7188CB-2E96-4ECA-A71B-77978CCF607C}" type="presParOf" srcId="{6480D912-D605-422C-9337-8E804DF7CEE6}" destId="{B9BD32EA-B69D-49F9-BFA1-D178FB0DDC5C}" srcOrd="1" destOrd="0" presId="urn:microsoft.com/office/officeart/2005/8/layout/hierarchy6"/>
-    <dgm:cxn modelId="{085AEF2F-FD6C-4020-95E7-379815E53837}" type="presParOf" srcId="{B9BD32EA-B69D-49F9-BFA1-D178FB0DDC5C}" destId="{03C1E623-CBB3-4F8E-9E78-431E8BB7DEF5}" srcOrd="0" destOrd="0" presId="urn:microsoft.com/office/officeart/2005/8/layout/hierarchy6"/>
-    <dgm:cxn modelId="{D8C29F1D-696E-4CCD-B52F-5E8CFFB9732D}" type="presParOf" srcId="{B9BD32EA-B69D-49F9-BFA1-D178FB0DDC5C}" destId="{E3F86558-1732-4EA8-BE7F-C23D60668AEC}" srcOrd="1" destOrd="0" presId="urn:microsoft.com/office/officeart/2005/8/layout/hierarchy6"/>
-    <dgm:cxn modelId="{64228147-6778-4FF1-B9CA-7B07A8D87ED3}" type="presParOf" srcId="{E3F86558-1732-4EA8-BE7F-C23D60668AEC}" destId="{61CF322C-8439-442D-8B34-B6054691CE9C}" srcOrd="0" destOrd="0" presId="urn:microsoft.com/office/officeart/2005/8/layout/hierarchy6"/>
-    <dgm:cxn modelId="{38359495-E255-42AF-B7EC-F480536FAC0C}" type="presParOf" srcId="{E3F86558-1732-4EA8-BE7F-C23D60668AEC}" destId="{8EE05D43-4037-4851-8C80-81FD240D6F43}" srcOrd="1" destOrd="0" presId="urn:microsoft.com/office/officeart/2005/8/layout/hierarchy6"/>
-    <dgm:cxn modelId="{6A719A0A-3E72-4203-B982-A3218BD600A6}" type="presParOf" srcId="{B9BD32EA-B69D-49F9-BFA1-D178FB0DDC5C}" destId="{82E35868-D55A-4884-874A-AA901AFD731D}" srcOrd="2" destOrd="0" presId="urn:microsoft.com/office/officeart/2005/8/layout/hierarchy6"/>
-    <dgm:cxn modelId="{9569E9A4-BA55-4940-B651-E52FDFED5B3C}" type="presParOf" srcId="{B9BD32EA-B69D-49F9-BFA1-D178FB0DDC5C}" destId="{09E713CA-B1F6-44A6-8E31-6E0EF0139386}" srcOrd="3" destOrd="0" presId="urn:microsoft.com/office/officeart/2005/8/layout/hierarchy6"/>
-    <dgm:cxn modelId="{94C473BD-5C78-44B6-84E2-39D926C05EEF}" type="presParOf" srcId="{09E713CA-B1F6-44A6-8E31-6E0EF0139386}" destId="{41E2ECE7-BA3C-413F-9870-446CAE2DC136}" srcOrd="0" destOrd="0" presId="urn:microsoft.com/office/officeart/2005/8/layout/hierarchy6"/>
-    <dgm:cxn modelId="{D6EED699-0ADC-44B7-8411-58DEB1BDE715}" type="presParOf" srcId="{09E713CA-B1F6-44A6-8E31-6E0EF0139386}" destId="{33FB9B52-42D7-426C-B9C5-6A56CA8FEA7F}" srcOrd="1" destOrd="0" presId="urn:microsoft.com/office/officeart/2005/8/layout/hierarchy6"/>
-    <dgm:cxn modelId="{5D2CCB5F-AF24-4592-B43C-0F7C6CF39415}" type="presParOf" srcId="{33FB9B52-42D7-426C-B9C5-6A56CA8FEA7F}" destId="{4E38FE01-194E-466F-87CF-949943532C6D}" srcOrd="0" destOrd="0" presId="urn:microsoft.com/office/officeart/2005/8/layout/hierarchy6"/>
-    <dgm:cxn modelId="{B74F34E7-5CC0-42A4-B403-A394A71A9BA5}" type="presParOf" srcId="{33FB9B52-42D7-426C-B9C5-6A56CA8FEA7F}" destId="{8651C933-7F86-46CA-BACB-6BCF9EEA6712}" srcOrd="1" destOrd="0" presId="urn:microsoft.com/office/officeart/2005/8/layout/hierarchy6"/>
-    <dgm:cxn modelId="{5AF6DE46-C1F3-4DE0-BA8E-213225D5338B}" type="presParOf" srcId="{8651C933-7F86-46CA-BACB-6BCF9EEA6712}" destId="{7DA13BCD-E6BC-4FEF-AC88-1ABD56621546}" srcOrd="0" destOrd="0" presId="urn:microsoft.com/office/officeart/2005/8/layout/hierarchy6"/>
-    <dgm:cxn modelId="{9FA09144-607C-4EBE-B48F-6EA8920BF345}" type="presParOf" srcId="{8651C933-7F86-46CA-BACB-6BCF9EEA6712}" destId="{2F742859-DF42-4298-A2F4-29FE2B56FCFE}" srcOrd="1" destOrd="0" presId="urn:microsoft.com/office/officeart/2005/8/layout/hierarchy6"/>
-    <dgm:cxn modelId="{927DB0C8-6DAC-404D-87A3-330765F682D3}" type="presParOf" srcId="{33FB9B52-42D7-426C-B9C5-6A56CA8FEA7F}" destId="{55693C6D-10F9-4F64-ADE8-91DBD07ADD42}" srcOrd="2" destOrd="0" presId="urn:microsoft.com/office/officeart/2005/8/layout/hierarchy6"/>
-    <dgm:cxn modelId="{366E928D-E820-492C-8BC1-06E5A1DE0672}" type="presParOf" srcId="{33FB9B52-42D7-426C-B9C5-6A56CA8FEA7F}" destId="{C980255A-82B5-4808-A7A2-178F2E0EA8AC}" srcOrd="3" destOrd="0" presId="urn:microsoft.com/office/officeart/2005/8/layout/hierarchy6"/>
-    <dgm:cxn modelId="{C78E522F-16A7-4AC4-974E-1FF4AB3550C6}" type="presParOf" srcId="{C980255A-82B5-4808-A7A2-178F2E0EA8AC}" destId="{FE0BDF8F-B7BF-4C54-81D4-7393A0E3C6CF}" srcOrd="0" destOrd="0" presId="urn:microsoft.com/office/officeart/2005/8/layout/hierarchy6"/>
-    <dgm:cxn modelId="{003EAD94-E5F4-482C-9B97-1AE32C5F5818}" type="presParOf" srcId="{C980255A-82B5-4808-A7A2-178F2E0EA8AC}" destId="{2587A4FC-28A6-4A98-82E4-488DCD04DF27}" srcOrd="1" destOrd="0" presId="urn:microsoft.com/office/officeart/2005/8/layout/hierarchy6"/>
-    <dgm:cxn modelId="{AD546A7B-181C-4E16-A4EA-BD622B5D9504}" type="presParOf" srcId="{2587A4FC-28A6-4A98-82E4-488DCD04DF27}" destId="{7EADC087-4500-48DB-8562-2E1060FC40CB}" srcOrd="0" destOrd="0" presId="urn:microsoft.com/office/officeart/2005/8/layout/hierarchy6"/>
-    <dgm:cxn modelId="{F0EA8A21-E562-42EE-924F-9781EFB64D33}" type="presParOf" srcId="{2587A4FC-28A6-4A98-82E4-488DCD04DF27}" destId="{3DDD973F-1DEE-499A-8C34-5F30653845FC}" srcOrd="1" destOrd="0" presId="urn:microsoft.com/office/officeart/2005/8/layout/hierarchy6"/>
-    <dgm:cxn modelId="{BC5914F8-9CF8-45F5-9BF0-D938C70306CA}" type="presParOf" srcId="{3DDD973F-1DEE-499A-8C34-5F30653845FC}" destId="{A49C93DF-9D18-4027-8585-15E23ECB4B00}" srcOrd="0" destOrd="0" presId="urn:microsoft.com/office/officeart/2005/8/layout/hierarchy6"/>
-    <dgm:cxn modelId="{C5200DEC-1F9A-46D9-8DC2-544F05940BE9}" type="presParOf" srcId="{3DDD973F-1DEE-499A-8C34-5F30653845FC}" destId="{C9B2102C-BD7D-4437-B3BF-1010EB88568A}" srcOrd="1" destOrd="0" presId="urn:microsoft.com/office/officeart/2005/8/layout/hierarchy6"/>
-    <dgm:cxn modelId="{B2AC49A4-EA8A-4587-8BB1-CD1CBCEE329B}" type="presParOf" srcId="{2587A4FC-28A6-4A98-82E4-488DCD04DF27}" destId="{DE2DFDF4-5F02-4E95-A59C-BD4F597DCF88}" srcOrd="2" destOrd="0" presId="urn:microsoft.com/office/officeart/2005/8/layout/hierarchy6"/>
-    <dgm:cxn modelId="{A34052A6-CBF6-48CB-89DD-4F0604E0390D}" type="presParOf" srcId="{2587A4FC-28A6-4A98-82E4-488DCD04DF27}" destId="{9CB1A375-704E-4B9B-A894-179D77B8552D}" srcOrd="3" destOrd="0" presId="urn:microsoft.com/office/officeart/2005/8/layout/hierarchy6"/>
-    <dgm:cxn modelId="{6F77FF55-CFA6-490A-A658-DA19E6645D3D}" type="presParOf" srcId="{9CB1A375-704E-4B9B-A894-179D77B8552D}" destId="{3A4E8DEE-6AF4-4D83-8C14-20E3F1731880}" srcOrd="0" destOrd="0" presId="urn:microsoft.com/office/officeart/2005/8/layout/hierarchy6"/>
-    <dgm:cxn modelId="{32843799-3E29-45BD-9501-93E4E6CC631A}" type="presParOf" srcId="{9CB1A375-704E-4B9B-A894-179D77B8552D}" destId="{43978413-3D53-475D-B6C2-BD9FCC9AAC67}" srcOrd="1" destOrd="0" presId="urn:microsoft.com/office/officeart/2005/8/layout/hierarchy6"/>
-    <dgm:cxn modelId="{60ACDF35-187E-46D2-B9EA-DC108F123F02}" type="presParOf" srcId="{33FB9B52-42D7-426C-B9C5-6A56CA8FEA7F}" destId="{33920D70-850A-44BA-A1B3-941AA5FC2C17}" srcOrd="4" destOrd="0" presId="urn:microsoft.com/office/officeart/2005/8/layout/hierarchy6"/>
-    <dgm:cxn modelId="{BA6CB77D-FF2F-4A92-B710-F839DA01F580}" type="presParOf" srcId="{33FB9B52-42D7-426C-B9C5-6A56CA8FEA7F}" destId="{0A5849B8-83E0-424C-A636-26D534677EE9}" srcOrd="5" destOrd="0" presId="urn:microsoft.com/office/officeart/2005/8/layout/hierarchy6"/>
-    <dgm:cxn modelId="{737B7A24-B088-4E3A-8636-287CD0F2B263}" type="presParOf" srcId="{0A5849B8-83E0-424C-A636-26D534677EE9}" destId="{15A27B40-9101-4675-8BDF-7CA10B938AB9}" srcOrd="0" destOrd="0" presId="urn:microsoft.com/office/officeart/2005/8/layout/hierarchy6"/>
-    <dgm:cxn modelId="{7A6770C2-9818-44FF-B43B-B0404A8B9C29}" type="presParOf" srcId="{0A5849B8-83E0-424C-A636-26D534677EE9}" destId="{24741CA7-92E6-46DB-8D62-D6083D64041B}" srcOrd="1" destOrd="0" presId="urn:microsoft.com/office/officeart/2005/8/layout/hierarchy6"/>
-    <dgm:cxn modelId="{DC97ADEC-55F5-4632-8D47-90AB47C25604}" type="presParOf" srcId="{24741CA7-92E6-46DB-8D62-D6083D64041B}" destId="{4C92394A-3740-4441-A2A1-6AA3072B9C48}" srcOrd="0" destOrd="0" presId="urn:microsoft.com/office/officeart/2005/8/layout/hierarchy6"/>
-    <dgm:cxn modelId="{4340522B-1FBE-4F45-8632-55B3FAB4141A}" type="presParOf" srcId="{24741CA7-92E6-46DB-8D62-D6083D64041B}" destId="{0E9FBFF4-F9A6-4C9C-B5DE-C98608508864}" srcOrd="1" destOrd="0" presId="urn:microsoft.com/office/officeart/2005/8/layout/hierarchy6"/>
-    <dgm:cxn modelId="{4C7A2C15-AA3A-4E7B-80F8-3B87B33C0F4D}" type="presParOf" srcId="{0E9FBFF4-F9A6-4C9C-B5DE-C98608508864}" destId="{F738F083-9520-4B4C-B063-820EE2613BAA}" srcOrd="0" destOrd="0" presId="urn:microsoft.com/office/officeart/2005/8/layout/hierarchy6"/>
-    <dgm:cxn modelId="{96FB0C04-E1D0-425E-BFB5-911EE2CF61A9}" type="presParOf" srcId="{0E9FBFF4-F9A6-4C9C-B5DE-C98608508864}" destId="{38864C86-11F6-48D1-9490-D515C965FB49}" srcOrd="1" destOrd="0" presId="urn:microsoft.com/office/officeart/2005/8/layout/hierarchy6"/>
-    <dgm:cxn modelId="{5F6267BB-FE44-486F-B844-31AFD149500F}" type="presParOf" srcId="{24741CA7-92E6-46DB-8D62-D6083D64041B}" destId="{B906C7BB-AADF-47D5-9079-CCA23B609F78}" srcOrd="2" destOrd="0" presId="urn:microsoft.com/office/officeart/2005/8/layout/hierarchy6"/>
-    <dgm:cxn modelId="{8B6AC305-E630-4D7D-B72C-A52A0BD5B448}" type="presParOf" srcId="{24741CA7-92E6-46DB-8D62-D6083D64041B}" destId="{B8655D0E-11E6-4AB1-B2C0-3B31833EDC3D}" srcOrd="3" destOrd="0" presId="urn:microsoft.com/office/officeart/2005/8/layout/hierarchy6"/>
-    <dgm:cxn modelId="{1BA463F4-734A-404E-A93B-E5B905D076AF}" type="presParOf" srcId="{B8655D0E-11E6-4AB1-B2C0-3B31833EDC3D}" destId="{E6FC1F5D-EA81-40F0-8F66-C6E67ED080E4}" srcOrd="0" destOrd="0" presId="urn:microsoft.com/office/officeart/2005/8/layout/hierarchy6"/>
-    <dgm:cxn modelId="{9CAA5447-517A-4025-9210-372EDA43B8CB}" type="presParOf" srcId="{B8655D0E-11E6-4AB1-B2C0-3B31833EDC3D}" destId="{394CD271-5858-497A-9730-E3FA9BE4187A}" srcOrd="1" destOrd="0" presId="urn:microsoft.com/office/officeart/2005/8/layout/hierarchy6"/>
-    <dgm:cxn modelId="{E0A065A5-C1BD-4F57-8575-7431B12089F4}" type="presParOf" srcId="{C6FA227F-5867-45BB-B60E-C6F3E5CA4431}" destId="{81C9A1E9-D072-4DCA-B04B-417DFBE04C73}" srcOrd="2" destOrd="0" presId="urn:microsoft.com/office/officeart/2005/8/layout/hierarchy6"/>
-    <dgm:cxn modelId="{895FA7C3-3B34-4C67-B394-FEB87F8C0E14}" type="presParOf" srcId="{C6FA227F-5867-45BB-B60E-C6F3E5CA4431}" destId="{C55C5E17-3AEB-433B-AD78-8742BA6588E9}" srcOrd="3" destOrd="0" presId="urn:microsoft.com/office/officeart/2005/8/layout/hierarchy6"/>
-    <dgm:cxn modelId="{2A25C832-6F80-42EF-9902-E4371F9C1A19}" type="presParOf" srcId="{C55C5E17-3AEB-433B-AD78-8742BA6588E9}" destId="{8CCC06FA-7AC0-4C7C-9710-7E32BD6B0ABB}" srcOrd="0" destOrd="0" presId="urn:microsoft.com/office/officeart/2005/8/layout/hierarchy6"/>
-    <dgm:cxn modelId="{33F9620A-BA36-4539-9DB6-8196EC7A0671}" type="presParOf" srcId="{C55C5E17-3AEB-433B-AD78-8742BA6588E9}" destId="{1A6A0FF2-3C9E-4406-BFF3-8187FAB38411}" srcOrd="1" destOrd="0" presId="urn:microsoft.com/office/officeart/2005/8/layout/hierarchy6"/>
-    <dgm:cxn modelId="{1F0EE0BD-AAD0-420C-9580-0A19CFDEBD3E}" type="presParOf" srcId="{1A6A0FF2-3C9E-4406-BFF3-8187FAB38411}" destId="{59BD8D1D-DFE7-4E5D-9A33-F41207E85527}" srcOrd="0" destOrd="0" presId="urn:microsoft.com/office/officeart/2005/8/layout/hierarchy6"/>
-    <dgm:cxn modelId="{AAF6B47F-ADE8-4687-B698-77A2706241F1}" type="presParOf" srcId="{1A6A0FF2-3C9E-4406-BFF3-8187FAB38411}" destId="{8F2ECBEA-934D-478A-94FF-E8582C8294AA}" srcOrd="1" destOrd="0" presId="urn:microsoft.com/office/officeart/2005/8/layout/hierarchy6"/>
-    <dgm:cxn modelId="{25B07E43-05F9-4490-AE13-9F75E5A2EF51}" type="presParOf" srcId="{8F2ECBEA-934D-478A-94FF-E8582C8294AA}" destId="{779B8017-965F-4ED7-A453-5B22C782DC0B}" srcOrd="0" destOrd="0" presId="urn:microsoft.com/office/officeart/2005/8/layout/hierarchy6"/>
-    <dgm:cxn modelId="{502EB93C-2816-4FF5-9A2A-3516FA0BB067}" type="presParOf" srcId="{8F2ECBEA-934D-478A-94FF-E8582C8294AA}" destId="{850B4E5C-4E7D-4E8E-B2FD-30C52E2B93AC}" srcOrd="1" destOrd="0" presId="urn:microsoft.com/office/officeart/2005/8/layout/hierarchy6"/>
-    <dgm:cxn modelId="{F3C2329C-49AD-49BA-A545-C1F2D819F204}" type="presParOf" srcId="{1A6A0FF2-3C9E-4406-BFF3-8187FAB38411}" destId="{0BEB8184-B777-46E1-B921-8C0FDA01D082}" srcOrd="2" destOrd="0" presId="urn:microsoft.com/office/officeart/2005/8/layout/hierarchy6"/>
-    <dgm:cxn modelId="{57497545-CF03-4176-B99C-91C0D1337E92}" type="presParOf" srcId="{1A6A0FF2-3C9E-4406-BFF3-8187FAB38411}" destId="{5ABB1E3C-39D4-48C4-81AA-B894A100E7EF}" srcOrd="3" destOrd="0" presId="urn:microsoft.com/office/officeart/2005/8/layout/hierarchy6"/>
-    <dgm:cxn modelId="{6C6C4513-E517-4C90-8F05-7FDA79D22880}" type="presParOf" srcId="{5ABB1E3C-39D4-48C4-81AA-B894A100E7EF}" destId="{BE05E9B3-C033-4E94-915C-57386F2FFFCF}" srcOrd="0" destOrd="0" presId="urn:microsoft.com/office/officeart/2005/8/layout/hierarchy6"/>
-    <dgm:cxn modelId="{275A67D9-A71A-4690-93C2-40388A8D50B3}" type="presParOf" srcId="{5ABB1E3C-39D4-48C4-81AA-B894A100E7EF}" destId="{141122EA-461F-4210-9F1D-C971CB393709}" srcOrd="1" destOrd="0" presId="urn:microsoft.com/office/officeart/2005/8/layout/hierarchy6"/>
-    <dgm:cxn modelId="{E2535686-FB7B-4AD6-98C3-FB20AE39DEB0}" type="presParOf" srcId="{1A6A0FF2-3C9E-4406-BFF3-8187FAB38411}" destId="{8599F571-1C6C-4CB6-926A-7FCEE3F9118A}" srcOrd="4" destOrd="0" presId="urn:microsoft.com/office/officeart/2005/8/layout/hierarchy6"/>
-    <dgm:cxn modelId="{98993C9A-51C4-4047-8394-00B9D48F1FE8}" type="presParOf" srcId="{1A6A0FF2-3C9E-4406-BFF3-8187FAB38411}" destId="{4D32988C-B148-4CBE-BEC1-1852A1927666}" srcOrd="5" destOrd="0" presId="urn:microsoft.com/office/officeart/2005/8/layout/hierarchy6"/>
-    <dgm:cxn modelId="{44636250-7C4A-4504-AFA2-7EC0F9753A00}" type="presParOf" srcId="{4D32988C-B148-4CBE-BEC1-1852A1927666}" destId="{8976D2E3-5B0F-4111-8A1F-3F406BBE1D4E}" srcOrd="0" destOrd="0" presId="urn:microsoft.com/office/officeart/2005/8/layout/hierarchy6"/>
-    <dgm:cxn modelId="{C656E8DB-2F99-4627-A4BF-4625FCE1DDD2}" type="presParOf" srcId="{4D32988C-B148-4CBE-BEC1-1852A1927666}" destId="{A6DE3200-89FE-4B9A-B9B5-6FB9C35BE033}" srcOrd="1" destOrd="0" presId="urn:microsoft.com/office/officeart/2005/8/layout/hierarchy6"/>
-    <dgm:cxn modelId="{9D7C177B-9663-4006-BABF-ADFDF48BEF04}" type="presParOf" srcId="{1A6A0FF2-3C9E-4406-BFF3-8187FAB38411}" destId="{55BB6539-41D1-424D-B1C6-82B34F71F71D}" srcOrd="6" destOrd="0" presId="urn:microsoft.com/office/officeart/2005/8/layout/hierarchy6"/>
-    <dgm:cxn modelId="{3E356594-12F4-4FC4-A982-77CC436160BE}" type="presParOf" srcId="{1A6A0FF2-3C9E-4406-BFF3-8187FAB38411}" destId="{587434E0-E26B-455E-B1B7-0139DA90895F}" srcOrd="7" destOrd="0" presId="urn:microsoft.com/office/officeart/2005/8/layout/hierarchy6"/>
-    <dgm:cxn modelId="{7D0BDC07-1374-4F18-B9DB-BE393ED45542}" type="presParOf" srcId="{587434E0-E26B-455E-B1B7-0139DA90895F}" destId="{A4502926-B005-4510-A1B4-3AEAD9C4AE3C}" srcOrd="0" destOrd="0" presId="urn:microsoft.com/office/officeart/2005/8/layout/hierarchy6"/>
-    <dgm:cxn modelId="{21234031-D0A6-4861-808A-7A83F396B0B2}" type="presParOf" srcId="{587434E0-E26B-455E-B1B7-0139DA90895F}" destId="{0C6EEE7F-80AA-4D1D-B91D-791C9E5ECE18}" srcOrd="1" destOrd="0" presId="urn:microsoft.com/office/officeart/2005/8/layout/hierarchy6"/>
-    <dgm:cxn modelId="{234E68E3-FCB8-4396-B17E-EF7223AE008E}" type="presParOf" srcId="{C6FA227F-5867-45BB-B60E-C6F3E5CA4431}" destId="{3321C745-C943-48B5-A72D-18FDCA516C06}" srcOrd="4" destOrd="0" presId="urn:microsoft.com/office/officeart/2005/8/layout/hierarchy6"/>
-    <dgm:cxn modelId="{A615FDC4-9B88-4C9D-B935-CCD65426B3A1}" type="presParOf" srcId="{C6FA227F-5867-45BB-B60E-C6F3E5CA4431}" destId="{8D14B38A-7BEE-42CF-A6EA-EF3DBB19ED4D}" srcOrd="5" destOrd="0" presId="urn:microsoft.com/office/officeart/2005/8/layout/hierarchy6"/>
-    <dgm:cxn modelId="{50B42EF0-BFF1-49EB-88BE-85F2841F90FF}" type="presParOf" srcId="{8D14B38A-7BEE-42CF-A6EA-EF3DBB19ED4D}" destId="{52464C16-1B9F-46B5-9BF4-98069B452246}" srcOrd="0" destOrd="0" presId="urn:microsoft.com/office/officeart/2005/8/layout/hierarchy6"/>
-    <dgm:cxn modelId="{E8EF2E26-F2D0-445F-863D-56C4E3562785}" type="presParOf" srcId="{8D14B38A-7BEE-42CF-A6EA-EF3DBB19ED4D}" destId="{0B7B135F-8C58-4F72-9B5A-50C25F233909}" srcOrd="1" destOrd="0" presId="urn:microsoft.com/office/officeart/2005/8/layout/hierarchy6"/>
-    <dgm:cxn modelId="{3392C7A9-8371-4579-81D8-2DAFF07FD267}" type="presParOf" srcId="{0B7B135F-8C58-4F72-9B5A-50C25F233909}" destId="{150EA877-0DAA-44B7-B6CB-653578BFC5D5}" srcOrd="0" destOrd="0" presId="urn:microsoft.com/office/officeart/2005/8/layout/hierarchy6"/>
-    <dgm:cxn modelId="{AB2BCD8E-E8DA-4E90-8DD4-954E8A67DEA7}" type="presParOf" srcId="{0B7B135F-8C58-4F72-9B5A-50C25F233909}" destId="{4B27584E-4D85-48F7-A4DA-47AA771CE522}" srcOrd="1" destOrd="0" presId="urn:microsoft.com/office/officeart/2005/8/layout/hierarchy6"/>
-    <dgm:cxn modelId="{8A32C400-B9D0-4583-8531-82690D4C2B74}" type="presParOf" srcId="{4B27584E-4D85-48F7-A4DA-47AA771CE522}" destId="{508B9431-792A-40C5-82BA-B280E3C19A47}" srcOrd="0" destOrd="0" presId="urn:microsoft.com/office/officeart/2005/8/layout/hierarchy6"/>
-    <dgm:cxn modelId="{0D430B4F-9B01-49E9-86C1-18EAA912C667}" type="presParOf" srcId="{4B27584E-4D85-48F7-A4DA-47AA771CE522}" destId="{7D52F927-8980-4BA4-B680-4331818347CD}" srcOrd="1" destOrd="0" presId="urn:microsoft.com/office/officeart/2005/8/layout/hierarchy6"/>
-    <dgm:cxn modelId="{CA3129F9-C37E-4ECD-A2BF-DE1ECF2EADEA}" type="presParOf" srcId="{0B7B135F-8C58-4F72-9B5A-50C25F233909}" destId="{2E751865-6AD6-4026-8323-96EE5CA8856A}" srcOrd="2" destOrd="0" presId="urn:microsoft.com/office/officeart/2005/8/layout/hierarchy6"/>
-    <dgm:cxn modelId="{21D69CA3-CFB9-4E1B-966C-BD585B1AEE08}" type="presParOf" srcId="{0B7B135F-8C58-4F72-9B5A-50C25F233909}" destId="{C0CC30AC-479E-42AD-985C-90C9F42FD562}" srcOrd="3" destOrd="0" presId="urn:microsoft.com/office/officeart/2005/8/layout/hierarchy6"/>
-    <dgm:cxn modelId="{025E7E25-C1B4-4FB4-8EDE-BF4C4E434FEF}" type="presParOf" srcId="{C0CC30AC-479E-42AD-985C-90C9F42FD562}" destId="{5154C260-018E-42D3-BBA3-EEDEBB120F5B}" srcOrd="0" destOrd="0" presId="urn:microsoft.com/office/officeart/2005/8/layout/hierarchy6"/>
-    <dgm:cxn modelId="{7F553817-7FAB-4A8E-A3D2-9E7B8C8999C9}" type="presParOf" srcId="{C0CC30AC-479E-42AD-985C-90C9F42FD562}" destId="{078D67A4-F9D6-4015-AA57-C207164BDE1E}" srcOrd="1" destOrd="0" presId="urn:microsoft.com/office/officeart/2005/8/layout/hierarchy6"/>
-    <dgm:cxn modelId="{632F8128-3824-4095-BBFA-2D32F088F2D4}" type="presParOf" srcId="{B65D09B4-F10B-43E1-A30E-95A9CAB9BF6F}" destId="{6D8894F9-B05E-4DF4-9FED-7A0DC7778CD5}" srcOrd="1" destOrd="0" presId="urn:microsoft.com/office/officeart/2005/8/layout/hierarchy6"/>
+    <dgm:cxn modelId="{5653B9DF-8C37-41BF-8E2D-45123AF6CD2A}" type="presParOf" srcId="{B65D09B4-F10B-43E1-A30E-95A9CAB9BF6F}" destId="{694F98E2-E8AF-4192-9B37-0F65930D5023}" srcOrd="0" destOrd="0" presId="urn:microsoft.com/office/officeart/2005/8/layout/hierarchy6"/>
+    <dgm:cxn modelId="{B3756891-93DC-48A5-AD63-0AA9EF471505}" type="presParOf" srcId="{694F98E2-E8AF-4192-9B37-0F65930D5023}" destId="{3C7EE044-B98F-488A-90B8-8B66738F93BF}" srcOrd="0" destOrd="0" presId="urn:microsoft.com/office/officeart/2005/8/layout/hierarchy6"/>
+    <dgm:cxn modelId="{86A685D3-DAE2-4B6F-A279-CEF6ED16CDF9}" type="presParOf" srcId="{3C7EE044-B98F-488A-90B8-8B66738F93BF}" destId="{1A05544C-AFC2-4DEA-BF1D-7BAD93086380}" srcOrd="0" destOrd="0" presId="urn:microsoft.com/office/officeart/2005/8/layout/hierarchy6"/>
+    <dgm:cxn modelId="{5D658E55-ED1F-4925-8782-7639C85A9AD1}" type="presParOf" srcId="{1A05544C-AFC2-4DEA-BF1D-7BAD93086380}" destId="{D7B4A93B-3CA1-4BBC-9B81-8FFE546B1FF8}" srcOrd="0" destOrd="0" presId="urn:microsoft.com/office/officeart/2005/8/layout/hierarchy6"/>
+    <dgm:cxn modelId="{D43FA0E1-5FE0-4DBE-80A9-2E74D4B7B40F}" type="presParOf" srcId="{1A05544C-AFC2-4DEA-BF1D-7BAD93086380}" destId="{C6FA227F-5867-45BB-B60E-C6F3E5CA4431}" srcOrd="1" destOrd="0" presId="urn:microsoft.com/office/officeart/2005/8/layout/hierarchy6"/>
+    <dgm:cxn modelId="{D2E1D61A-EFA7-476E-B2A4-516598F0486A}" type="presParOf" srcId="{C6FA227F-5867-45BB-B60E-C6F3E5CA4431}" destId="{C0B605E1-7567-497D-8EA9-E2E3A37B6E28}" srcOrd="0" destOrd="0" presId="urn:microsoft.com/office/officeart/2005/8/layout/hierarchy6"/>
+    <dgm:cxn modelId="{A073B3DB-5B19-4480-9470-D36F74A74A9D}" type="presParOf" srcId="{C6FA227F-5867-45BB-B60E-C6F3E5CA4431}" destId="{6480D912-D605-422C-9337-8E804DF7CEE6}" srcOrd="1" destOrd="0" presId="urn:microsoft.com/office/officeart/2005/8/layout/hierarchy6"/>
+    <dgm:cxn modelId="{BF73037A-21B6-4945-95AC-1E01A53D23D2}" type="presParOf" srcId="{6480D912-D605-422C-9337-8E804DF7CEE6}" destId="{2F62BB5C-8B45-4C37-9E90-BD5EB4A72863}" srcOrd="0" destOrd="0" presId="urn:microsoft.com/office/officeart/2005/8/layout/hierarchy6"/>
+    <dgm:cxn modelId="{136F48AC-5BED-44DB-8A7B-F5910B0111A7}" type="presParOf" srcId="{6480D912-D605-422C-9337-8E804DF7CEE6}" destId="{B9BD32EA-B69D-49F9-BFA1-D178FB0DDC5C}" srcOrd="1" destOrd="0" presId="urn:microsoft.com/office/officeart/2005/8/layout/hierarchy6"/>
+    <dgm:cxn modelId="{F476CDA4-551A-41C9-AD0C-59CD272C7539}" type="presParOf" srcId="{B9BD32EA-B69D-49F9-BFA1-D178FB0DDC5C}" destId="{03C1E623-CBB3-4F8E-9E78-431E8BB7DEF5}" srcOrd="0" destOrd="0" presId="urn:microsoft.com/office/officeart/2005/8/layout/hierarchy6"/>
+    <dgm:cxn modelId="{7E36D7A5-D128-4E54-B3B7-F6017769CDD3}" type="presParOf" srcId="{B9BD32EA-B69D-49F9-BFA1-D178FB0DDC5C}" destId="{E3F86558-1732-4EA8-BE7F-C23D60668AEC}" srcOrd="1" destOrd="0" presId="urn:microsoft.com/office/officeart/2005/8/layout/hierarchy6"/>
+    <dgm:cxn modelId="{CC3CAB16-1263-4EFC-AA14-1E6B4474FB13}" type="presParOf" srcId="{E3F86558-1732-4EA8-BE7F-C23D60668AEC}" destId="{61CF322C-8439-442D-8B34-B6054691CE9C}" srcOrd="0" destOrd="0" presId="urn:microsoft.com/office/officeart/2005/8/layout/hierarchy6"/>
+    <dgm:cxn modelId="{71DEB755-3721-4590-827E-5B5DA0161EA1}" type="presParOf" srcId="{E3F86558-1732-4EA8-BE7F-C23D60668AEC}" destId="{8EE05D43-4037-4851-8C80-81FD240D6F43}" srcOrd="1" destOrd="0" presId="urn:microsoft.com/office/officeart/2005/8/layout/hierarchy6"/>
+    <dgm:cxn modelId="{2E274DF7-47FB-4AD5-BCC9-620CC1C7A93B}" type="presParOf" srcId="{B9BD32EA-B69D-49F9-BFA1-D178FB0DDC5C}" destId="{82E35868-D55A-4884-874A-AA901AFD731D}" srcOrd="2" destOrd="0" presId="urn:microsoft.com/office/officeart/2005/8/layout/hierarchy6"/>
+    <dgm:cxn modelId="{6D927C5C-CE51-4C63-8DD3-8DF07D9C4D4D}" type="presParOf" srcId="{B9BD32EA-B69D-49F9-BFA1-D178FB0DDC5C}" destId="{09E713CA-B1F6-44A6-8E31-6E0EF0139386}" srcOrd="3" destOrd="0" presId="urn:microsoft.com/office/officeart/2005/8/layout/hierarchy6"/>
+    <dgm:cxn modelId="{B902C6A8-3FC1-435A-AB83-7DE2DC17A308}" type="presParOf" srcId="{09E713CA-B1F6-44A6-8E31-6E0EF0139386}" destId="{41E2ECE7-BA3C-413F-9870-446CAE2DC136}" srcOrd="0" destOrd="0" presId="urn:microsoft.com/office/officeart/2005/8/layout/hierarchy6"/>
+    <dgm:cxn modelId="{784F0B35-2425-4FB1-9515-A9E2AA26023C}" type="presParOf" srcId="{09E713CA-B1F6-44A6-8E31-6E0EF0139386}" destId="{33FB9B52-42D7-426C-B9C5-6A56CA8FEA7F}" srcOrd="1" destOrd="0" presId="urn:microsoft.com/office/officeart/2005/8/layout/hierarchy6"/>
+    <dgm:cxn modelId="{C5AF667A-5A2E-4678-A017-0F60AC47E88C}" type="presParOf" srcId="{33FB9B52-42D7-426C-B9C5-6A56CA8FEA7F}" destId="{4E38FE01-194E-466F-87CF-949943532C6D}" srcOrd="0" destOrd="0" presId="urn:microsoft.com/office/officeart/2005/8/layout/hierarchy6"/>
+    <dgm:cxn modelId="{DFF73251-911D-4E8F-A519-B953A5867475}" type="presParOf" srcId="{33FB9B52-42D7-426C-B9C5-6A56CA8FEA7F}" destId="{8651C933-7F86-46CA-BACB-6BCF9EEA6712}" srcOrd="1" destOrd="0" presId="urn:microsoft.com/office/officeart/2005/8/layout/hierarchy6"/>
+    <dgm:cxn modelId="{C59BC798-6CFB-4679-A145-E3849DF34F72}" type="presParOf" srcId="{8651C933-7F86-46CA-BACB-6BCF9EEA6712}" destId="{7DA13BCD-E6BC-4FEF-AC88-1ABD56621546}" srcOrd="0" destOrd="0" presId="urn:microsoft.com/office/officeart/2005/8/layout/hierarchy6"/>
+    <dgm:cxn modelId="{637F6BE6-A8AC-4CB0-80BD-A148CC39FC40}" type="presParOf" srcId="{8651C933-7F86-46CA-BACB-6BCF9EEA6712}" destId="{2F742859-DF42-4298-A2F4-29FE2B56FCFE}" srcOrd="1" destOrd="0" presId="urn:microsoft.com/office/officeart/2005/8/layout/hierarchy6"/>
+    <dgm:cxn modelId="{EE37A47F-70E4-4F56-88D9-31A931C380D2}" type="presParOf" srcId="{33FB9B52-42D7-426C-B9C5-6A56CA8FEA7F}" destId="{55693C6D-10F9-4F64-ADE8-91DBD07ADD42}" srcOrd="2" destOrd="0" presId="urn:microsoft.com/office/officeart/2005/8/layout/hierarchy6"/>
+    <dgm:cxn modelId="{9C72EF5E-FF9F-4C38-A562-A549BB500A4C}" type="presParOf" srcId="{33FB9B52-42D7-426C-B9C5-6A56CA8FEA7F}" destId="{C980255A-82B5-4808-A7A2-178F2E0EA8AC}" srcOrd="3" destOrd="0" presId="urn:microsoft.com/office/officeart/2005/8/layout/hierarchy6"/>
+    <dgm:cxn modelId="{087054E7-B985-46C2-9E6F-D9F1FB964DB5}" type="presParOf" srcId="{C980255A-82B5-4808-A7A2-178F2E0EA8AC}" destId="{FE0BDF8F-B7BF-4C54-81D4-7393A0E3C6CF}" srcOrd="0" destOrd="0" presId="urn:microsoft.com/office/officeart/2005/8/layout/hierarchy6"/>
+    <dgm:cxn modelId="{03BB2278-6115-4AB2-A155-6B1A0666B635}" type="presParOf" srcId="{C980255A-82B5-4808-A7A2-178F2E0EA8AC}" destId="{2587A4FC-28A6-4A98-82E4-488DCD04DF27}" srcOrd="1" destOrd="0" presId="urn:microsoft.com/office/officeart/2005/8/layout/hierarchy6"/>
+    <dgm:cxn modelId="{7CD6E95B-FBC6-4C93-A7B5-D2DE99148EAB}" type="presParOf" srcId="{2587A4FC-28A6-4A98-82E4-488DCD04DF27}" destId="{7EADC087-4500-48DB-8562-2E1060FC40CB}" srcOrd="0" destOrd="0" presId="urn:microsoft.com/office/officeart/2005/8/layout/hierarchy6"/>
+    <dgm:cxn modelId="{41DD1CB2-0825-49C2-A053-655CC45B8E71}" type="presParOf" srcId="{2587A4FC-28A6-4A98-82E4-488DCD04DF27}" destId="{3DDD973F-1DEE-499A-8C34-5F30653845FC}" srcOrd="1" destOrd="0" presId="urn:microsoft.com/office/officeart/2005/8/layout/hierarchy6"/>
+    <dgm:cxn modelId="{E5773C88-5BDD-4C16-9A7D-0295F9D48481}" type="presParOf" srcId="{3DDD973F-1DEE-499A-8C34-5F30653845FC}" destId="{A49C93DF-9D18-4027-8585-15E23ECB4B00}" srcOrd="0" destOrd="0" presId="urn:microsoft.com/office/officeart/2005/8/layout/hierarchy6"/>
+    <dgm:cxn modelId="{076A3F0C-7191-43AB-BC34-2ED91E2F3D05}" type="presParOf" srcId="{3DDD973F-1DEE-499A-8C34-5F30653845FC}" destId="{C9B2102C-BD7D-4437-B3BF-1010EB88568A}" srcOrd="1" destOrd="0" presId="urn:microsoft.com/office/officeart/2005/8/layout/hierarchy6"/>
+    <dgm:cxn modelId="{A5D2376F-67F9-4561-9E1B-966315901B05}" type="presParOf" srcId="{2587A4FC-28A6-4A98-82E4-488DCD04DF27}" destId="{DE2DFDF4-5F02-4E95-A59C-BD4F597DCF88}" srcOrd="2" destOrd="0" presId="urn:microsoft.com/office/officeart/2005/8/layout/hierarchy6"/>
+    <dgm:cxn modelId="{65FD3D0B-5BFD-4960-B659-EB7BEBC5AD70}" type="presParOf" srcId="{2587A4FC-28A6-4A98-82E4-488DCD04DF27}" destId="{9CB1A375-704E-4B9B-A894-179D77B8552D}" srcOrd="3" destOrd="0" presId="urn:microsoft.com/office/officeart/2005/8/layout/hierarchy6"/>
+    <dgm:cxn modelId="{F64AE05B-1E4C-4C2D-92E1-D4092FEDC897}" type="presParOf" srcId="{9CB1A375-704E-4B9B-A894-179D77B8552D}" destId="{3A4E8DEE-6AF4-4D83-8C14-20E3F1731880}" srcOrd="0" destOrd="0" presId="urn:microsoft.com/office/officeart/2005/8/layout/hierarchy6"/>
+    <dgm:cxn modelId="{BA0C3606-058B-470A-8B2F-65E7D49E1EA6}" type="presParOf" srcId="{9CB1A375-704E-4B9B-A894-179D77B8552D}" destId="{43978413-3D53-475D-B6C2-BD9FCC9AAC67}" srcOrd="1" destOrd="0" presId="urn:microsoft.com/office/officeart/2005/8/layout/hierarchy6"/>
+    <dgm:cxn modelId="{9BED624B-9810-4FFD-B45B-8BC6F458E17D}" type="presParOf" srcId="{33FB9B52-42D7-426C-B9C5-6A56CA8FEA7F}" destId="{33920D70-850A-44BA-A1B3-941AA5FC2C17}" srcOrd="4" destOrd="0" presId="urn:microsoft.com/office/officeart/2005/8/layout/hierarchy6"/>
+    <dgm:cxn modelId="{7EEB7B7D-7EE4-4BBD-9F4E-BE613A48DEA3}" type="presParOf" srcId="{33FB9B52-42D7-426C-B9C5-6A56CA8FEA7F}" destId="{0A5849B8-83E0-424C-A636-26D534677EE9}" srcOrd="5" destOrd="0" presId="urn:microsoft.com/office/officeart/2005/8/layout/hierarchy6"/>
+    <dgm:cxn modelId="{9B09D8AD-9175-48CB-9EA7-E202953A5606}" type="presParOf" srcId="{0A5849B8-83E0-424C-A636-26D534677EE9}" destId="{15A27B40-9101-4675-8BDF-7CA10B938AB9}" srcOrd="0" destOrd="0" presId="urn:microsoft.com/office/officeart/2005/8/layout/hierarchy6"/>
+    <dgm:cxn modelId="{8BA9C660-B9EC-4E43-9D99-FFEB1825A3A4}" type="presParOf" srcId="{0A5849B8-83E0-424C-A636-26D534677EE9}" destId="{24741CA7-92E6-46DB-8D62-D6083D64041B}" srcOrd="1" destOrd="0" presId="urn:microsoft.com/office/officeart/2005/8/layout/hierarchy6"/>
+    <dgm:cxn modelId="{87512689-5724-4147-ADE9-6880F5029032}" type="presParOf" srcId="{24741CA7-92E6-46DB-8D62-D6083D64041B}" destId="{4C92394A-3740-4441-A2A1-6AA3072B9C48}" srcOrd="0" destOrd="0" presId="urn:microsoft.com/office/officeart/2005/8/layout/hierarchy6"/>
+    <dgm:cxn modelId="{4D9BBF36-DA67-4139-8255-9AB42C484157}" type="presParOf" srcId="{24741CA7-92E6-46DB-8D62-D6083D64041B}" destId="{0E9FBFF4-F9A6-4C9C-B5DE-C98608508864}" srcOrd="1" destOrd="0" presId="urn:microsoft.com/office/officeart/2005/8/layout/hierarchy6"/>
+    <dgm:cxn modelId="{605657D7-07FD-4AC1-959C-EE8DD4422593}" type="presParOf" srcId="{0E9FBFF4-F9A6-4C9C-B5DE-C98608508864}" destId="{F738F083-9520-4B4C-B063-820EE2613BAA}" srcOrd="0" destOrd="0" presId="urn:microsoft.com/office/officeart/2005/8/layout/hierarchy6"/>
+    <dgm:cxn modelId="{DE29B80C-5296-4DE9-B667-6CCEDB357671}" type="presParOf" srcId="{0E9FBFF4-F9A6-4C9C-B5DE-C98608508864}" destId="{38864C86-11F6-48D1-9490-D515C965FB49}" srcOrd="1" destOrd="0" presId="urn:microsoft.com/office/officeart/2005/8/layout/hierarchy6"/>
+    <dgm:cxn modelId="{5C0BEDB0-B344-4582-B810-35BDEF370EE0}" type="presParOf" srcId="{24741CA7-92E6-46DB-8D62-D6083D64041B}" destId="{B906C7BB-AADF-47D5-9079-CCA23B609F78}" srcOrd="2" destOrd="0" presId="urn:microsoft.com/office/officeart/2005/8/layout/hierarchy6"/>
+    <dgm:cxn modelId="{5700B636-6EE5-4797-AA45-A7585FDE9107}" type="presParOf" srcId="{24741CA7-92E6-46DB-8D62-D6083D64041B}" destId="{B8655D0E-11E6-4AB1-B2C0-3B31833EDC3D}" srcOrd="3" destOrd="0" presId="urn:microsoft.com/office/officeart/2005/8/layout/hierarchy6"/>
+    <dgm:cxn modelId="{6A9FC6D9-5126-4907-B511-891760B21BF9}" type="presParOf" srcId="{B8655D0E-11E6-4AB1-B2C0-3B31833EDC3D}" destId="{E6FC1F5D-EA81-40F0-8F66-C6E67ED080E4}" srcOrd="0" destOrd="0" presId="urn:microsoft.com/office/officeart/2005/8/layout/hierarchy6"/>
+    <dgm:cxn modelId="{7204D2BE-7EDE-4743-8883-740A198A9203}" type="presParOf" srcId="{B8655D0E-11E6-4AB1-B2C0-3B31833EDC3D}" destId="{394CD271-5858-497A-9730-E3FA9BE4187A}" srcOrd="1" destOrd="0" presId="urn:microsoft.com/office/officeart/2005/8/layout/hierarchy6"/>
+    <dgm:cxn modelId="{57BE5D26-1F0E-499A-8B17-8BE43386AE4D}" type="presParOf" srcId="{C6FA227F-5867-45BB-B60E-C6F3E5CA4431}" destId="{81C9A1E9-D072-4DCA-B04B-417DFBE04C73}" srcOrd="2" destOrd="0" presId="urn:microsoft.com/office/officeart/2005/8/layout/hierarchy6"/>
+    <dgm:cxn modelId="{B39EF680-C08D-47EA-8524-9893CA3502EB}" type="presParOf" srcId="{C6FA227F-5867-45BB-B60E-C6F3E5CA4431}" destId="{C55C5E17-3AEB-433B-AD78-8742BA6588E9}" srcOrd="3" destOrd="0" presId="urn:microsoft.com/office/officeart/2005/8/layout/hierarchy6"/>
+    <dgm:cxn modelId="{32BDEA44-85F6-4ACC-8C64-4A59E3CD65C8}" type="presParOf" srcId="{C55C5E17-3AEB-433B-AD78-8742BA6588E9}" destId="{8CCC06FA-7AC0-4C7C-9710-7E32BD6B0ABB}" srcOrd="0" destOrd="0" presId="urn:microsoft.com/office/officeart/2005/8/layout/hierarchy6"/>
+    <dgm:cxn modelId="{A56E95FC-D321-476C-A574-67B3FE52903F}" type="presParOf" srcId="{C55C5E17-3AEB-433B-AD78-8742BA6588E9}" destId="{1A6A0FF2-3C9E-4406-BFF3-8187FAB38411}" srcOrd="1" destOrd="0" presId="urn:microsoft.com/office/officeart/2005/8/layout/hierarchy6"/>
+    <dgm:cxn modelId="{4DDB88FF-8CD8-4817-9730-C15F9BF5BBBE}" type="presParOf" srcId="{1A6A0FF2-3C9E-4406-BFF3-8187FAB38411}" destId="{EC9AF500-AA54-457B-AF40-03CABD180705}" srcOrd="0" destOrd="0" presId="urn:microsoft.com/office/officeart/2005/8/layout/hierarchy6"/>
+    <dgm:cxn modelId="{29299859-7DDD-4B51-8374-41D2D63BC85A}" type="presParOf" srcId="{1A6A0FF2-3C9E-4406-BFF3-8187FAB38411}" destId="{A67BBD5B-24CD-4752-A9ED-20BCFB7F7E96}" srcOrd="1" destOrd="0" presId="urn:microsoft.com/office/officeart/2005/8/layout/hierarchy6"/>
+    <dgm:cxn modelId="{0CF8C814-9E57-458A-9041-253338F1B908}" type="presParOf" srcId="{A67BBD5B-24CD-4752-A9ED-20BCFB7F7E96}" destId="{6576D9BD-CF79-4063-89C9-BA78692B564F}" srcOrd="0" destOrd="0" presId="urn:microsoft.com/office/officeart/2005/8/layout/hierarchy6"/>
+    <dgm:cxn modelId="{47ED9E25-55FC-4B9E-8A3C-D5EBCF9414DC}" type="presParOf" srcId="{A67BBD5B-24CD-4752-A9ED-20BCFB7F7E96}" destId="{E0EC8783-5391-4845-943E-A9D7736D3777}" srcOrd="1" destOrd="0" presId="urn:microsoft.com/office/officeart/2005/8/layout/hierarchy6"/>
+    <dgm:cxn modelId="{1C95E6F2-634D-4E01-90F5-F2F4E03D6719}" type="presParOf" srcId="{E0EC8783-5391-4845-943E-A9D7736D3777}" destId="{0BEB8184-B777-46E1-B921-8C0FDA01D082}" srcOrd="0" destOrd="0" presId="urn:microsoft.com/office/officeart/2005/8/layout/hierarchy6"/>
+    <dgm:cxn modelId="{501EC769-5446-40CB-8B71-394A96788D93}" type="presParOf" srcId="{E0EC8783-5391-4845-943E-A9D7736D3777}" destId="{5ABB1E3C-39D4-48C4-81AA-B894A100E7EF}" srcOrd="1" destOrd="0" presId="urn:microsoft.com/office/officeart/2005/8/layout/hierarchy6"/>
+    <dgm:cxn modelId="{B8AEABC3-E66D-40AB-8EF4-595687625B03}" type="presParOf" srcId="{5ABB1E3C-39D4-48C4-81AA-B894A100E7EF}" destId="{BE05E9B3-C033-4E94-915C-57386F2FFFCF}" srcOrd="0" destOrd="0" presId="urn:microsoft.com/office/officeart/2005/8/layout/hierarchy6"/>
+    <dgm:cxn modelId="{A989A367-9F5C-45B8-B58B-CC2D06C347FF}" type="presParOf" srcId="{5ABB1E3C-39D4-48C4-81AA-B894A100E7EF}" destId="{141122EA-461F-4210-9F1D-C971CB393709}" srcOrd="1" destOrd="0" presId="urn:microsoft.com/office/officeart/2005/8/layout/hierarchy6"/>
+    <dgm:cxn modelId="{A3E5E699-6A2A-499E-BEAE-92C94A7E2424}" type="presParOf" srcId="{E0EC8783-5391-4845-943E-A9D7736D3777}" destId="{8599F571-1C6C-4CB6-926A-7FCEE3F9118A}" srcOrd="2" destOrd="0" presId="urn:microsoft.com/office/officeart/2005/8/layout/hierarchy6"/>
+    <dgm:cxn modelId="{3677349B-A5B1-4CAA-A872-7C9C0D4C31F7}" type="presParOf" srcId="{E0EC8783-5391-4845-943E-A9D7736D3777}" destId="{4D32988C-B148-4CBE-BEC1-1852A1927666}" srcOrd="3" destOrd="0" presId="urn:microsoft.com/office/officeart/2005/8/layout/hierarchy6"/>
+    <dgm:cxn modelId="{24C48AAD-1CD1-4FEF-809F-249CCF17022A}" type="presParOf" srcId="{4D32988C-B148-4CBE-BEC1-1852A1927666}" destId="{8976D2E3-5B0F-4111-8A1F-3F406BBE1D4E}" srcOrd="0" destOrd="0" presId="urn:microsoft.com/office/officeart/2005/8/layout/hierarchy6"/>
+    <dgm:cxn modelId="{33895B39-3252-4E22-BA60-C84952918F10}" type="presParOf" srcId="{4D32988C-B148-4CBE-BEC1-1852A1927666}" destId="{A6DE3200-89FE-4B9A-B9B5-6FB9C35BE033}" srcOrd="1" destOrd="0" presId="urn:microsoft.com/office/officeart/2005/8/layout/hierarchy6"/>
+    <dgm:cxn modelId="{34B99100-4662-48AF-91A4-84EE6533F6B7}" type="presParOf" srcId="{E0EC8783-5391-4845-943E-A9D7736D3777}" destId="{55BB6539-41D1-424D-B1C6-82B34F71F71D}" srcOrd="4" destOrd="0" presId="urn:microsoft.com/office/officeart/2005/8/layout/hierarchy6"/>
+    <dgm:cxn modelId="{82799E0D-E5E8-4D87-8DCE-61BDCBA1E64F}" type="presParOf" srcId="{E0EC8783-5391-4845-943E-A9D7736D3777}" destId="{587434E0-E26B-455E-B1B7-0139DA90895F}" srcOrd="5" destOrd="0" presId="urn:microsoft.com/office/officeart/2005/8/layout/hierarchy6"/>
+    <dgm:cxn modelId="{695E6F86-721D-4D98-9EE9-69EB922FF7BE}" type="presParOf" srcId="{587434E0-E26B-455E-B1B7-0139DA90895F}" destId="{A4502926-B005-4510-A1B4-3AEAD9C4AE3C}" srcOrd="0" destOrd="0" presId="urn:microsoft.com/office/officeart/2005/8/layout/hierarchy6"/>
+    <dgm:cxn modelId="{6E987BD5-6D6B-4165-97B5-DA87477ABDCF}" type="presParOf" srcId="{587434E0-E26B-455E-B1B7-0139DA90895F}" destId="{0C6EEE7F-80AA-4D1D-B91D-791C9E5ECE18}" srcOrd="1" destOrd="0" presId="urn:microsoft.com/office/officeart/2005/8/layout/hierarchy6"/>
+    <dgm:cxn modelId="{3E08435C-E9B0-4526-8C84-514B8FE18409}" type="presParOf" srcId="{1A6A0FF2-3C9E-4406-BFF3-8187FAB38411}" destId="{59BD8D1D-DFE7-4E5D-9A33-F41207E85527}" srcOrd="2" destOrd="0" presId="urn:microsoft.com/office/officeart/2005/8/layout/hierarchy6"/>
+    <dgm:cxn modelId="{519A2B80-D7A8-4029-8478-874501FA7288}" type="presParOf" srcId="{1A6A0FF2-3C9E-4406-BFF3-8187FAB38411}" destId="{8F2ECBEA-934D-478A-94FF-E8582C8294AA}" srcOrd="3" destOrd="0" presId="urn:microsoft.com/office/officeart/2005/8/layout/hierarchy6"/>
+    <dgm:cxn modelId="{38B36BB3-1106-465D-BFF2-7EDAF93A9244}" type="presParOf" srcId="{8F2ECBEA-934D-478A-94FF-E8582C8294AA}" destId="{779B8017-965F-4ED7-A453-5B22C782DC0B}" srcOrd="0" destOrd="0" presId="urn:microsoft.com/office/officeart/2005/8/layout/hierarchy6"/>
+    <dgm:cxn modelId="{27A43019-D080-46D4-A381-540AA7EB6D02}" type="presParOf" srcId="{8F2ECBEA-934D-478A-94FF-E8582C8294AA}" destId="{850B4E5C-4E7D-4E8E-B2FD-30C52E2B93AC}" srcOrd="1" destOrd="0" presId="urn:microsoft.com/office/officeart/2005/8/layout/hierarchy6"/>
+    <dgm:cxn modelId="{04D8A14C-75B5-4F06-A301-21DEDCC88A26}" type="presParOf" srcId="{C6FA227F-5867-45BB-B60E-C6F3E5CA4431}" destId="{3321C745-C943-48B5-A72D-18FDCA516C06}" srcOrd="4" destOrd="0" presId="urn:microsoft.com/office/officeart/2005/8/layout/hierarchy6"/>
+    <dgm:cxn modelId="{CCB333B0-41ED-4FD9-9441-8246EC5B31E8}" type="presParOf" srcId="{C6FA227F-5867-45BB-B60E-C6F3E5CA4431}" destId="{8D14B38A-7BEE-42CF-A6EA-EF3DBB19ED4D}" srcOrd="5" destOrd="0" presId="urn:microsoft.com/office/officeart/2005/8/layout/hierarchy6"/>
+    <dgm:cxn modelId="{74A295F6-8D9C-42D5-8A32-E7FA4F1ACC5B}" type="presParOf" srcId="{8D14B38A-7BEE-42CF-A6EA-EF3DBB19ED4D}" destId="{52464C16-1B9F-46B5-9BF4-98069B452246}" srcOrd="0" destOrd="0" presId="urn:microsoft.com/office/officeart/2005/8/layout/hierarchy6"/>
+    <dgm:cxn modelId="{B4FC96EC-C961-46CE-BCD2-44877B2F39E8}" type="presParOf" srcId="{8D14B38A-7BEE-42CF-A6EA-EF3DBB19ED4D}" destId="{0B7B135F-8C58-4F72-9B5A-50C25F233909}" srcOrd="1" destOrd="0" presId="urn:microsoft.com/office/officeart/2005/8/layout/hierarchy6"/>
+    <dgm:cxn modelId="{FF727472-DA3A-4CDD-BCA7-3AF5E6995443}" type="presParOf" srcId="{0B7B135F-8C58-4F72-9B5A-50C25F233909}" destId="{150EA877-0DAA-44B7-B6CB-653578BFC5D5}" srcOrd="0" destOrd="0" presId="urn:microsoft.com/office/officeart/2005/8/layout/hierarchy6"/>
+    <dgm:cxn modelId="{491B7A54-9D20-408F-85CC-6355D3E254F4}" type="presParOf" srcId="{0B7B135F-8C58-4F72-9B5A-50C25F233909}" destId="{4B27584E-4D85-48F7-A4DA-47AA771CE522}" srcOrd="1" destOrd="0" presId="urn:microsoft.com/office/officeart/2005/8/layout/hierarchy6"/>
+    <dgm:cxn modelId="{9CA2384B-6EC2-432B-98D8-996523F39EC6}" type="presParOf" srcId="{4B27584E-4D85-48F7-A4DA-47AA771CE522}" destId="{508B9431-792A-40C5-82BA-B280E3C19A47}" srcOrd="0" destOrd="0" presId="urn:microsoft.com/office/officeart/2005/8/layout/hierarchy6"/>
+    <dgm:cxn modelId="{8075773F-D0DD-43EC-8CEA-79B55E01A714}" type="presParOf" srcId="{4B27584E-4D85-48F7-A4DA-47AA771CE522}" destId="{7D52F927-8980-4BA4-B680-4331818347CD}" srcOrd="1" destOrd="0" presId="urn:microsoft.com/office/officeart/2005/8/layout/hierarchy6"/>
+    <dgm:cxn modelId="{E3848DBA-A5A5-41DF-81AA-92A2BE1AD952}" type="presParOf" srcId="{0B7B135F-8C58-4F72-9B5A-50C25F233909}" destId="{2E751865-6AD6-4026-8323-96EE5CA8856A}" srcOrd="2" destOrd="0" presId="urn:microsoft.com/office/officeart/2005/8/layout/hierarchy6"/>
+    <dgm:cxn modelId="{39BC72D5-0FE9-4C10-8596-5DED3F0645B1}" type="presParOf" srcId="{0B7B135F-8C58-4F72-9B5A-50C25F233909}" destId="{C0CC30AC-479E-42AD-985C-90C9F42FD562}" srcOrd="3" destOrd="0" presId="urn:microsoft.com/office/officeart/2005/8/layout/hierarchy6"/>
+    <dgm:cxn modelId="{879DCB81-A534-413F-83BF-2368B3D12470}" type="presParOf" srcId="{C0CC30AC-479E-42AD-985C-90C9F42FD562}" destId="{5154C260-018E-42D3-BBA3-EEDEBB120F5B}" srcOrd="0" destOrd="0" presId="urn:microsoft.com/office/officeart/2005/8/layout/hierarchy6"/>
+    <dgm:cxn modelId="{AFE52094-6AA6-402A-849F-F5A669D6A2A4}" type="presParOf" srcId="{C0CC30AC-479E-42AD-985C-90C9F42FD562}" destId="{078D67A4-F9D6-4015-AA57-C207164BDE1E}" srcOrd="1" destOrd="0" presId="urn:microsoft.com/office/officeart/2005/8/layout/hierarchy6"/>
+    <dgm:cxn modelId="{54CD6D81-46DA-4492-AF07-5F874129B77E}" type="presParOf" srcId="{B65D09B4-F10B-43E1-A30E-95A9CAB9BF6F}" destId="{6D8894F9-B05E-4DF4-9FED-7A0DC7778CD5}" srcOrd="1" destOrd="0" presId="urn:microsoft.com/office/officeart/2005/8/layout/hierarchy6"/>
   </dgm:cxnLst>
   <dgm:bg/>
   <dgm:whole/>
@@ -3769,8 +3835,8 @@
       </dsp:nvSpPr>
       <dsp:spPr>
         <a:xfrm>
-          <a:off x="5653210" y="924195"/>
-          <a:ext cx="1087087" cy="724724"/>
+          <a:off x="5664195" y="1062293"/>
+          <a:ext cx="1024315" cy="682877"/>
         </a:xfrm>
         <a:prstGeom prst="roundRect">
           <a:avLst>
@@ -3811,12 +3877,12 @@
         </a:fontRef>
       </dsp:style>
       <dsp:txBody>
-        <a:bodyPr spcFirstLastPara="0" vert="horz" wrap="square" lIns="68580" tIns="68580" rIns="68580" bIns="68580" numCol="1" spcCol="1270" anchor="ctr" anchorCtr="0">
+        <a:bodyPr spcFirstLastPara="0" vert="horz" wrap="square" lIns="45720" tIns="45720" rIns="45720" bIns="45720" numCol="1" spcCol="1270" anchor="ctr" anchorCtr="0">
           <a:noAutofit/>
         </a:bodyPr>
         <a:lstStyle/>
         <a:p>
-          <a:pPr marL="0" lvl="0" indent="0" algn="ctr" defTabSz="800100">
+          <a:pPr marL="0" lvl="0" indent="0" algn="ctr" defTabSz="533400">
             <a:lnSpc>
               <a:spcPct val="90000"/>
             </a:lnSpc>
@@ -3829,15 +3895,15 @@
             <a:buNone/>
           </a:pPr>
           <a:r>
-            <a:rPr lang="en-US" sz="1800" kern="1200" dirty="0"/>
+            <a:rPr lang="en-US" sz="1200" kern="1200" dirty="0"/>
             <a:t>Entity</a:t>
           </a:r>
-          <a:endParaRPr lang="LID4096" sz="1800" kern="1200" dirty="0"/>
+          <a:endParaRPr lang="LID4096" sz="1200" kern="1200" dirty="0"/>
         </a:p>
       </dsp:txBody>
       <dsp:txXfrm>
-        <a:off x="5674436" y="945421"/>
-        <a:ext cx="1044635" cy="682272"/>
+        <a:off x="5684196" y="1082294"/>
+        <a:ext cx="984313" cy="642875"/>
       </dsp:txXfrm>
     </dsp:sp>
     <dsp:sp modelId="{C0B605E1-7567-497D-8EA9-E2E3A37B6E28}">
@@ -3847,8 +3913,8 @@
       </dsp:nvSpPr>
       <dsp:spPr>
         <a:xfrm>
-          <a:off x="1957113" y="1648920"/>
-          <a:ext cx="4239640" cy="289889"/>
+          <a:off x="1848619" y="1745170"/>
+          <a:ext cx="4327734" cy="273150"/>
         </a:xfrm>
         <a:custGeom>
           <a:avLst/>
@@ -3859,16 +3925,16 @@
           <a:pathLst>
             <a:path>
               <a:moveTo>
-                <a:pt x="4239640" y="0"/>
+                <a:pt x="4327734" y="0"/>
               </a:moveTo>
               <a:lnTo>
-                <a:pt x="4239640" y="144944"/>
+                <a:pt x="4327734" y="136575"/>
               </a:lnTo>
               <a:lnTo>
-                <a:pt x="0" y="144944"/>
+                <a:pt x="0" y="136575"/>
               </a:lnTo>
               <a:lnTo>
-                <a:pt x="0" y="289889"/>
+                <a:pt x="0" y="273150"/>
               </a:lnTo>
             </a:path>
           </a:pathLst>
@@ -3909,8 +3975,8 @@
       </dsp:nvSpPr>
       <dsp:spPr>
         <a:xfrm>
-          <a:off x="1413570" y="1938810"/>
-          <a:ext cx="1087087" cy="724724"/>
+          <a:off x="1336461" y="2018321"/>
+          <a:ext cx="1024315" cy="682877"/>
         </a:xfrm>
         <a:prstGeom prst="roundRect">
           <a:avLst>
@@ -3951,12 +4017,12 @@
         </a:fontRef>
       </dsp:style>
       <dsp:txBody>
-        <a:bodyPr spcFirstLastPara="0" vert="horz" wrap="square" lIns="68580" tIns="68580" rIns="68580" bIns="68580" numCol="1" spcCol="1270" anchor="ctr" anchorCtr="0">
+        <a:bodyPr spcFirstLastPara="0" vert="horz" wrap="square" lIns="45720" tIns="45720" rIns="45720" bIns="45720" numCol="1" spcCol="1270" anchor="ctr" anchorCtr="0">
           <a:noAutofit/>
         </a:bodyPr>
         <a:lstStyle/>
         <a:p>
-          <a:pPr marL="0" lvl="0" indent="0" algn="ctr" defTabSz="800100">
+          <a:pPr marL="0" lvl="0" indent="0" algn="ctr" defTabSz="533400">
             <a:lnSpc>
               <a:spcPct val="90000"/>
             </a:lnSpc>
@@ -3969,15 +4035,15 @@
             <a:buNone/>
           </a:pPr>
           <a:r>
-            <a:rPr lang="en-US" sz="1800" kern="1200" dirty="0"/>
+            <a:rPr lang="en-US" sz="1200" kern="1200" dirty="0"/>
             <a:t>Unit</a:t>
           </a:r>
-          <a:endParaRPr lang="LID4096" sz="1800" kern="1200" dirty="0"/>
+          <a:endParaRPr lang="LID4096" sz="1200" kern="1200" dirty="0"/>
         </a:p>
       </dsp:txBody>
       <dsp:txXfrm>
-        <a:off x="1434796" y="1960036"/>
-        <a:ext cx="1044635" cy="682272"/>
+        <a:off x="1356462" y="2038322"/>
+        <a:ext cx="984313" cy="642875"/>
       </dsp:txXfrm>
     </dsp:sp>
     <dsp:sp modelId="{03C1E623-CBB3-4F8E-9E78-431E8BB7DEF5}">
@@ -3987,8 +4053,8 @@
       </dsp:nvSpPr>
       <dsp:spPr>
         <a:xfrm>
-          <a:off x="1250507" y="2663535"/>
-          <a:ext cx="706606" cy="289889"/>
+          <a:off x="1182813" y="2701198"/>
+          <a:ext cx="665805" cy="273150"/>
         </a:xfrm>
         <a:custGeom>
           <a:avLst/>
@@ -3999,16 +4065,16 @@
           <a:pathLst>
             <a:path>
               <a:moveTo>
-                <a:pt x="706606" y="0"/>
+                <a:pt x="665805" y="0"/>
               </a:moveTo>
               <a:lnTo>
-                <a:pt x="706606" y="144944"/>
+                <a:pt x="665805" y="136575"/>
               </a:lnTo>
               <a:lnTo>
-                <a:pt x="0" y="144944"/>
+                <a:pt x="0" y="136575"/>
               </a:lnTo>
               <a:lnTo>
-                <a:pt x="0" y="289889"/>
+                <a:pt x="0" y="273150"/>
               </a:lnTo>
             </a:path>
           </a:pathLst>
@@ -4049,8 +4115,8 @@
       </dsp:nvSpPr>
       <dsp:spPr>
         <a:xfrm>
-          <a:off x="706963" y="2953425"/>
-          <a:ext cx="1087087" cy="724724"/>
+          <a:off x="670655" y="2974349"/>
+          <a:ext cx="1024315" cy="682877"/>
         </a:xfrm>
         <a:prstGeom prst="roundRect">
           <a:avLst>
@@ -4094,12 +4160,12 @@
         </a:fontRef>
       </dsp:style>
       <dsp:txBody>
-        <a:bodyPr spcFirstLastPara="0" vert="horz" wrap="square" lIns="68580" tIns="68580" rIns="68580" bIns="68580" numCol="1" spcCol="1270" anchor="ctr" anchorCtr="0">
+        <a:bodyPr spcFirstLastPara="0" vert="horz" wrap="square" lIns="45720" tIns="45720" rIns="45720" bIns="45720" numCol="1" spcCol="1270" anchor="ctr" anchorCtr="0">
           <a:noAutofit/>
         </a:bodyPr>
         <a:lstStyle/>
         <a:p>
-          <a:pPr marL="0" lvl="0" indent="0" algn="ctr" defTabSz="800100">
+          <a:pPr marL="0" lvl="0" indent="0" algn="ctr" defTabSz="533400">
             <a:lnSpc>
               <a:spcPct val="90000"/>
             </a:lnSpc>
@@ -4112,15 +4178,15 @@
             <a:buNone/>
           </a:pPr>
           <a:r>
-            <a:rPr lang="en-US" sz="1800" kern="1200" dirty="0"/>
+            <a:rPr lang="en-US" sz="1200" kern="1200" dirty="0"/>
             <a:t>Turret</a:t>
           </a:r>
-          <a:endParaRPr lang="LID4096" sz="1800" kern="1200" dirty="0"/>
+          <a:endParaRPr lang="LID4096" sz="1200" kern="1200" dirty="0"/>
         </a:p>
       </dsp:txBody>
       <dsp:txXfrm>
-        <a:off x="728189" y="2974651"/>
-        <a:ext cx="1044635" cy="682272"/>
+        <a:off x="690656" y="2994350"/>
+        <a:ext cx="984313" cy="642875"/>
       </dsp:txXfrm>
     </dsp:sp>
     <dsp:sp modelId="{82E35868-D55A-4884-874A-AA901AFD731D}">
@@ -4130,8 +4196,8 @@
       </dsp:nvSpPr>
       <dsp:spPr>
         <a:xfrm>
-          <a:off x="1957113" y="2663535"/>
-          <a:ext cx="706606" cy="289889"/>
+          <a:off x="1848619" y="2701198"/>
+          <a:ext cx="665805" cy="273150"/>
         </a:xfrm>
         <a:custGeom>
           <a:avLst/>
@@ -4145,13 +4211,13 @@
                 <a:pt x="0" y="0"/>
               </a:moveTo>
               <a:lnTo>
-                <a:pt x="0" y="144944"/>
+                <a:pt x="0" y="136575"/>
               </a:lnTo>
               <a:lnTo>
-                <a:pt x="706606" y="144944"/>
+                <a:pt x="665805" y="136575"/>
               </a:lnTo>
               <a:lnTo>
-                <a:pt x="706606" y="289889"/>
+                <a:pt x="665805" y="273150"/>
               </a:lnTo>
             </a:path>
           </a:pathLst>
@@ -4192,8 +4258,8 @@
       </dsp:nvSpPr>
       <dsp:spPr>
         <a:xfrm>
-          <a:off x="2120176" y="2953425"/>
-          <a:ext cx="1087087" cy="724724"/>
+          <a:off x="2002266" y="2974349"/>
+          <a:ext cx="1024315" cy="682877"/>
         </a:xfrm>
         <a:prstGeom prst="roundRect">
           <a:avLst>
@@ -4234,12 +4300,12 @@
         </a:fontRef>
       </dsp:style>
       <dsp:txBody>
-        <a:bodyPr spcFirstLastPara="0" vert="horz" wrap="square" lIns="68580" tIns="68580" rIns="68580" bIns="68580" numCol="1" spcCol="1270" anchor="ctr" anchorCtr="0">
+        <a:bodyPr spcFirstLastPara="0" vert="horz" wrap="square" lIns="45720" tIns="45720" rIns="45720" bIns="45720" numCol="1" spcCol="1270" anchor="ctr" anchorCtr="0">
           <a:noAutofit/>
         </a:bodyPr>
         <a:lstStyle/>
         <a:p>
-          <a:pPr marL="0" lvl="0" indent="0" algn="ctr" defTabSz="800100">
+          <a:pPr marL="0" lvl="0" indent="0" algn="ctr" defTabSz="533400">
             <a:lnSpc>
               <a:spcPct val="90000"/>
             </a:lnSpc>
@@ -4252,15 +4318,15 @@
             <a:buNone/>
           </a:pPr>
           <a:r>
-            <a:rPr lang="en-US" sz="1800" kern="1200" dirty="0"/>
+            <a:rPr lang="en-US" sz="1200" kern="1200" dirty="0"/>
             <a:t>Animated</a:t>
           </a:r>
-          <a:endParaRPr lang="LID4096" sz="1800" kern="1200" dirty="0"/>
+          <a:endParaRPr lang="LID4096" sz="1200" kern="1200" dirty="0"/>
         </a:p>
       </dsp:txBody>
       <dsp:txXfrm>
-        <a:off x="2141402" y="2974651"/>
-        <a:ext cx="1044635" cy="682272"/>
+        <a:off x="2022267" y="2994350"/>
+        <a:ext cx="984313" cy="642875"/>
       </dsp:txXfrm>
     </dsp:sp>
     <dsp:sp modelId="{4E38FE01-194E-466F-87CF-949943532C6D}">
@@ -4270,8 +4336,8 @@
       </dsp:nvSpPr>
       <dsp:spPr>
         <a:xfrm>
-          <a:off x="543900" y="3678150"/>
-          <a:ext cx="2119820" cy="289889"/>
+          <a:off x="517008" y="3657226"/>
+          <a:ext cx="1997415" cy="273150"/>
         </a:xfrm>
         <a:custGeom>
           <a:avLst/>
@@ -4282,16 +4348,16 @@
           <a:pathLst>
             <a:path>
               <a:moveTo>
-                <a:pt x="2119820" y="0"/>
+                <a:pt x="1997415" y="0"/>
               </a:moveTo>
               <a:lnTo>
-                <a:pt x="2119820" y="144944"/>
+                <a:pt x="1997415" y="136575"/>
               </a:lnTo>
               <a:lnTo>
-                <a:pt x="0" y="144944"/>
+                <a:pt x="0" y="136575"/>
               </a:lnTo>
               <a:lnTo>
-                <a:pt x="0" y="289889"/>
+                <a:pt x="0" y="273150"/>
               </a:lnTo>
             </a:path>
           </a:pathLst>
@@ -4332,8 +4398,8 @@
       </dsp:nvSpPr>
       <dsp:spPr>
         <a:xfrm>
-          <a:off x="356" y="3968040"/>
-          <a:ext cx="1087087" cy="724724"/>
+          <a:off x="4850" y="3930377"/>
+          <a:ext cx="1024315" cy="682877"/>
         </a:xfrm>
         <a:prstGeom prst="roundRect">
           <a:avLst>
@@ -4377,12 +4443,12 @@
         </a:fontRef>
       </dsp:style>
       <dsp:txBody>
-        <a:bodyPr spcFirstLastPara="0" vert="horz" wrap="square" lIns="68580" tIns="68580" rIns="68580" bIns="68580" numCol="1" spcCol="1270" anchor="ctr" anchorCtr="0">
+        <a:bodyPr spcFirstLastPara="0" vert="horz" wrap="square" lIns="45720" tIns="45720" rIns="45720" bIns="45720" numCol="1" spcCol="1270" anchor="ctr" anchorCtr="0">
           <a:noAutofit/>
         </a:bodyPr>
         <a:lstStyle/>
         <a:p>
-          <a:pPr marL="0" lvl="0" indent="0" algn="ctr" defTabSz="800100">
+          <a:pPr marL="0" lvl="0" indent="0" algn="ctr" defTabSz="533400">
             <a:lnSpc>
               <a:spcPct val="90000"/>
             </a:lnSpc>
@@ -4395,15 +4461,15 @@
             <a:buNone/>
           </a:pPr>
           <a:r>
-            <a:rPr lang="en-US" sz="1800" kern="1200" dirty="0"/>
+            <a:rPr lang="en-US" sz="1200" kern="1200" dirty="0"/>
             <a:t>Settler</a:t>
           </a:r>
-          <a:endParaRPr lang="LID4096" sz="1800" kern="1200" dirty="0"/>
+          <a:endParaRPr lang="LID4096" sz="1200" kern="1200" dirty="0"/>
         </a:p>
       </dsp:txBody>
       <dsp:txXfrm>
-        <a:off x="21582" y="3989266"/>
-        <a:ext cx="1044635" cy="682272"/>
+        <a:off x="24851" y="3950378"/>
+        <a:ext cx="984313" cy="642875"/>
       </dsp:txXfrm>
     </dsp:sp>
     <dsp:sp modelId="{55693C6D-10F9-4F64-ADE8-91DBD07ADD42}">
@@ -4413,8 +4479,8 @@
       </dsp:nvSpPr>
       <dsp:spPr>
         <a:xfrm>
-          <a:off x="1957113" y="3678150"/>
-          <a:ext cx="706606" cy="289889"/>
+          <a:off x="1848619" y="3657226"/>
+          <a:ext cx="665805" cy="273150"/>
         </a:xfrm>
         <a:custGeom>
           <a:avLst/>
@@ -4425,16 +4491,16 @@
           <a:pathLst>
             <a:path>
               <a:moveTo>
-                <a:pt x="706606" y="0"/>
+                <a:pt x="665805" y="0"/>
               </a:moveTo>
               <a:lnTo>
-                <a:pt x="706606" y="144944"/>
+                <a:pt x="665805" y="136575"/>
               </a:lnTo>
               <a:lnTo>
-                <a:pt x="0" y="144944"/>
+                <a:pt x="0" y="136575"/>
               </a:lnTo>
               <a:lnTo>
-                <a:pt x="0" y="289889"/>
+                <a:pt x="0" y="273150"/>
               </a:lnTo>
             </a:path>
           </a:pathLst>
@@ -4475,8 +4541,8 @@
       </dsp:nvSpPr>
       <dsp:spPr>
         <a:xfrm>
-          <a:off x="1413570" y="3968040"/>
-          <a:ext cx="1087087" cy="724724"/>
+          <a:off x="1336461" y="3930377"/>
+          <a:ext cx="1024315" cy="682877"/>
         </a:xfrm>
         <a:prstGeom prst="roundRect">
           <a:avLst>
@@ -4517,12 +4583,12 @@
         </a:fontRef>
       </dsp:style>
       <dsp:txBody>
-        <a:bodyPr spcFirstLastPara="0" vert="horz" wrap="square" lIns="68580" tIns="68580" rIns="68580" bIns="68580" numCol="1" spcCol="1270" anchor="ctr" anchorCtr="0">
+        <a:bodyPr spcFirstLastPara="0" vert="horz" wrap="square" lIns="45720" tIns="45720" rIns="45720" bIns="45720" numCol="1" spcCol="1270" anchor="ctr" anchorCtr="0">
           <a:noAutofit/>
         </a:bodyPr>
         <a:lstStyle/>
         <a:p>
-          <a:pPr marL="0" lvl="0" indent="0" algn="ctr" defTabSz="800100">
+          <a:pPr marL="0" lvl="0" indent="0" algn="ctr" defTabSz="533400">
             <a:lnSpc>
               <a:spcPct val="90000"/>
             </a:lnSpc>
@@ -4535,15 +4601,15 @@
             <a:buNone/>
           </a:pPr>
           <a:r>
-            <a:rPr lang="en-US" sz="1800" kern="1200" dirty="0"/>
+            <a:rPr lang="en-US" sz="1200" kern="1200" dirty="0"/>
             <a:t>Monster</a:t>
           </a:r>
-          <a:endParaRPr lang="LID4096" sz="1800" kern="1200" dirty="0"/>
+          <a:endParaRPr lang="LID4096" sz="1200" kern="1200" dirty="0"/>
         </a:p>
       </dsp:txBody>
       <dsp:txXfrm>
-        <a:off x="1434796" y="3989266"/>
-        <a:ext cx="1044635" cy="682272"/>
+        <a:off x="1356462" y="3950378"/>
+        <a:ext cx="984313" cy="642875"/>
       </dsp:txXfrm>
     </dsp:sp>
     <dsp:sp modelId="{7EADC087-4500-48DB-8562-2E1060FC40CB}">
@@ -4553,8 +4619,8 @@
       </dsp:nvSpPr>
       <dsp:spPr>
         <a:xfrm>
-          <a:off x="1250507" y="4692765"/>
-          <a:ext cx="706606" cy="289889"/>
+          <a:off x="1182813" y="4613254"/>
+          <a:ext cx="665805" cy="273150"/>
         </a:xfrm>
         <a:custGeom>
           <a:avLst/>
@@ -4565,16 +4631,16 @@
           <a:pathLst>
             <a:path>
               <a:moveTo>
-                <a:pt x="706606" y="0"/>
+                <a:pt x="665805" y="0"/>
               </a:moveTo>
               <a:lnTo>
-                <a:pt x="706606" y="144944"/>
+                <a:pt x="665805" y="136575"/>
               </a:lnTo>
               <a:lnTo>
-                <a:pt x="0" y="144944"/>
+                <a:pt x="0" y="136575"/>
               </a:lnTo>
               <a:lnTo>
-                <a:pt x="0" y="289889"/>
+                <a:pt x="0" y="273150"/>
               </a:lnTo>
             </a:path>
           </a:pathLst>
@@ -4615,8 +4681,8 @@
       </dsp:nvSpPr>
       <dsp:spPr>
         <a:xfrm>
-          <a:off x="706963" y="4982655"/>
-          <a:ext cx="1087087" cy="724724"/>
+          <a:off x="670655" y="4886405"/>
+          <a:ext cx="1024315" cy="682877"/>
         </a:xfrm>
         <a:prstGeom prst="roundRect">
           <a:avLst>
@@ -4660,12 +4726,12 @@
         </a:fontRef>
       </dsp:style>
       <dsp:txBody>
-        <a:bodyPr spcFirstLastPara="0" vert="horz" wrap="square" lIns="68580" tIns="68580" rIns="68580" bIns="68580" numCol="1" spcCol="1270" anchor="ctr" anchorCtr="0">
+        <a:bodyPr spcFirstLastPara="0" vert="horz" wrap="square" lIns="45720" tIns="45720" rIns="45720" bIns="45720" numCol="1" spcCol="1270" anchor="ctr" anchorCtr="0">
           <a:noAutofit/>
         </a:bodyPr>
         <a:lstStyle/>
         <a:p>
-          <a:pPr marL="0" lvl="0" indent="0" algn="ctr" defTabSz="800100">
+          <a:pPr marL="0" lvl="0" indent="0" algn="ctr" defTabSz="533400">
             <a:lnSpc>
               <a:spcPct val="90000"/>
             </a:lnSpc>
@@ -4678,15 +4744,15 @@
             <a:buNone/>
           </a:pPr>
           <a:r>
-            <a:rPr lang="en-US" sz="1800" kern="1200" dirty="0" err="1"/>
+            <a:rPr lang="en-US" sz="1200" kern="1200" dirty="0" err="1"/>
             <a:t>Radroach</a:t>
           </a:r>
-          <a:endParaRPr lang="LID4096" sz="1800" kern="1200" dirty="0"/>
+          <a:endParaRPr lang="LID4096" sz="1200" kern="1200" dirty="0"/>
         </a:p>
       </dsp:txBody>
       <dsp:txXfrm>
-        <a:off x="728189" y="5003881"/>
-        <a:ext cx="1044635" cy="682272"/>
+        <a:off x="690656" y="4906406"/>
+        <a:ext cx="984313" cy="642875"/>
       </dsp:txXfrm>
     </dsp:sp>
     <dsp:sp modelId="{DE2DFDF4-5F02-4E95-A59C-BD4F597DCF88}">
@@ -4696,8 +4762,8 @@
       </dsp:nvSpPr>
       <dsp:spPr>
         <a:xfrm>
-          <a:off x="1957113" y="4692765"/>
-          <a:ext cx="706606" cy="289889"/>
+          <a:off x="1848619" y="4613254"/>
+          <a:ext cx="665805" cy="273150"/>
         </a:xfrm>
         <a:custGeom>
           <a:avLst/>
@@ -4711,13 +4777,13 @@
                 <a:pt x="0" y="0"/>
               </a:moveTo>
               <a:lnTo>
-                <a:pt x="0" y="144944"/>
+                <a:pt x="0" y="136575"/>
               </a:lnTo>
               <a:lnTo>
-                <a:pt x="706606" y="144944"/>
+                <a:pt x="665805" y="136575"/>
               </a:lnTo>
               <a:lnTo>
-                <a:pt x="706606" y="289889"/>
+                <a:pt x="665805" y="273150"/>
               </a:lnTo>
             </a:path>
           </a:pathLst>
@@ -4758,8 +4824,8 @@
       </dsp:nvSpPr>
       <dsp:spPr>
         <a:xfrm>
-          <a:off x="2120176" y="4982655"/>
-          <a:ext cx="1087087" cy="724724"/>
+          <a:off x="2002266" y="4886405"/>
+          <a:ext cx="1024315" cy="682877"/>
         </a:xfrm>
         <a:prstGeom prst="roundRect">
           <a:avLst>
@@ -4803,12 +4869,12 @@
         </a:fontRef>
       </dsp:style>
       <dsp:txBody>
-        <a:bodyPr spcFirstLastPara="0" vert="horz" wrap="square" lIns="68580" tIns="68580" rIns="68580" bIns="68580" numCol="1" spcCol="1270" anchor="ctr" anchorCtr="0">
+        <a:bodyPr spcFirstLastPara="0" vert="horz" wrap="square" lIns="45720" tIns="45720" rIns="45720" bIns="45720" numCol="1" spcCol="1270" anchor="ctr" anchorCtr="0">
           <a:noAutofit/>
         </a:bodyPr>
         <a:lstStyle/>
         <a:p>
-          <a:pPr marL="0" lvl="0" indent="0" algn="ctr" defTabSz="800100">
+          <a:pPr marL="0" lvl="0" indent="0" algn="ctr" defTabSz="533400">
             <a:lnSpc>
               <a:spcPct val="90000"/>
             </a:lnSpc>
@@ -4821,15 +4887,15 @@
             <a:buNone/>
           </a:pPr>
           <a:r>
-            <a:rPr lang="en-US" sz="1800" kern="1200" dirty="0" err="1"/>
+            <a:rPr lang="en-US" sz="1200" kern="1200" dirty="0" err="1"/>
             <a:t>Molerat</a:t>
           </a:r>
-          <a:endParaRPr lang="LID4096" sz="1800" kern="1200" dirty="0"/>
+          <a:endParaRPr lang="LID4096" sz="1200" kern="1200" dirty="0"/>
         </a:p>
       </dsp:txBody>
       <dsp:txXfrm>
-        <a:off x="2141402" y="5003881"/>
-        <a:ext cx="1044635" cy="682272"/>
+        <a:off x="2022267" y="4906406"/>
+        <a:ext cx="984313" cy="642875"/>
       </dsp:txXfrm>
     </dsp:sp>
     <dsp:sp modelId="{33920D70-850A-44BA-A1B3-941AA5FC2C17}">
@@ -4839,8 +4905,8 @@
       </dsp:nvSpPr>
       <dsp:spPr>
         <a:xfrm>
-          <a:off x="2663720" y="3678150"/>
-          <a:ext cx="2119820" cy="289889"/>
+          <a:off x="2514424" y="3657226"/>
+          <a:ext cx="1997415" cy="273150"/>
         </a:xfrm>
         <a:custGeom>
           <a:avLst/>
@@ -4854,13 +4920,13 @@
                 <a:pt x="0" y="0"/>
               </a:moveTo>
               <a:lnTo>
-                <a:pt x="0" y="144944"/>
+                <a:pt x="0" y="136575"/>
               </a:lnTo>
               <a:lnTo>
-                <a:pt x="2119820" y="144944"/>
+                <a:pt x="1997415" y="136575"/>
               </a:lnTo>
               <a:lnTo>
-                <a:pt x="2119820" y="289889"/>
+                <a:pt x="1997415" y="273150"/>
               </a:lnTo>
             </a:path>
           </a:pathLst>
@@ -4901,8 +4967,8 @@
       </dsp:nvSpPr>
       <dsp:spPr>
         <a:xfrm>
-          <a:off x="4239997" y="3968040"/>
-          <a:ext cx="1087087" cy="724724"/>
+          <a:off x="3999682" y="3930377"/>
+          <a:ext cx="1024315" cy="682877"/>
         </a:xfrm>
         <a:prstGeom prst="roundRect">
           <a:avLst>
@@ -4943,12 +5009,12 @@
         </a:fontRef>
       </dsp:style>
       <dsp:txBody>
-        <a:bodyPr spcFirstLastPara="0" vert="horz" wrap="square" lIns="68580" tIns="68580" rIns="68580" bIns="68580" numCol="1" spcCol="1270" anchor="ctr" anchorCtr="0">
+        <a:bodyPr spcFirstLastPara="0" vert="horz" wrap="square" lIns="45720" tIns="45720" rIns="45720" bIns="45720" numCol="1" spcCol="1270" anchor="ctr" anchorCtr="0">
           <a:noAutofit/>
         </a:bodyPr>
         <a:lstStyle/>
         <a:p>
-          <a:pPr marL="0" lvl="0" indent="0" algn="ctr" defTabSz="800100">
+          <a:pPr marL="0" lvl="0" indent="0" algn="ctr" defTabSz="533400">
             <a:lnSpc>
               <a:spcPct val="90000"/>
             </a:lnSpc>
@@ -4961,15 +5027,15 @@
             <a:buNone/>
           </a:pPr>
           <a:r>
-            <a:rPr lang="en-US" sz="1800" kern="1200" dirty="0"/>
+            <a:rPr lang="en-US" sz="1200" kern="1200" dirty="0"/>
             <a:t>Cattle</a:t>
           </a:r>
-          <a:endParaRPr lang="LID4096" sz="1800" kern="1200" dirty="0"/>
+          <a:endParaRPr lang="LID4096" sz="1200" kern="1200" dirty="0"/>
         </a:p>
       </dsp:txBody>
       <dsp:txXfrm>
-        <a:off x="4261223" y="3989266"/>
-        <a:ext cx="1044635" cy="682272"/>
+        <a:off x="4019683" y="3950378"/>
+        <a:ext cx="984313" cy="642875"/>
       </dsp:txXfrm>
     </dsp:sp>
     <dsp:sp modelId="{4C92394A-3740-4441-A2A1-6AA3072B9C48}">
@@ -4979,8 +5045,8 @@
       </dsp:nvSpPr>
       <dsp:spPr>
         <a:xfrm>
-          <a:off x="4076934" y="4692765"/>
-          <a:ext cx="706606" cy="289889"/>
+          <a:off x="3846035" y="4613254"/>
+          <a:ext cx="665805" cy="273150"/>
         </a:xfrm>
         <a:custGeom>
           <a:avLst/>
@@ -4991,16 +5057,16 @@
           <a:pathLst>
             <a:path>
               <a:moveTo>
-                <a:pt x="706606" y="0"/>
+                <a:pt x="665805" y="0"/>
               </a:moveTo>
               <a:lnTo>
-                <a:pt x="706606" y="144944"/>
+                <a:pt x="665805" y="136575"/>
               </a:lnTo>
               <a:lnTo>
-                <a:pt x="0" y="144944"/>
+                <a:pt x="0" y="136575"/>
               </a:lnTo>
               <a:lnTo>
-                <a:pt x="0" y="289889"/>
+                <a:pt x="0" y="273150"/>
               </a:lnTo>
             </a:path>
           </a:pathLst>
@@ -5041,8 +5107,8 @@
       </dsp:nvSpPr>
       <dsp:spPr>
         <a:xfrm>
-          <a:off x="3533390" y="4982655"/>
-          <a:ext cx="1087087" cy="724724"/>
+          <a:off x="3333877" y="4886405"/>
+          <a:ext cx="1024315" cy="682877"/>
         </a:xfrm>
         <a:prstGeom prst="roundRect">
           <a:avLst>
@@ -5086,12 +5152,12 @@
         </a:fontRef>
       </dsp:style>
       <dsp:txBody>
-        <a:bodyPr spcFirstLastPara="0" vert="horz" wrap="square" lIns="68580" tIns="68580" rIns="68580" bIns="68580" numCol="1" spcCol="1270" anchor="ctr" anchorCtr="0">
+        <a:bodyPr spcFirstLastPara="0" vert="horz" wrap="square" lIns="45720" tIns="45720" rIns="45720" bIns="45720" numCol="1" spcCol="1270" anchor="ctr" anchorCtr="0">
           <a:noAutofit/>
         </a:bodyPr>
         <a:lstStyle/>
         <a:p>
-          <a:pPr marL="0" lvl="0" indent="0" algn="ctr" defTabSz="800100">
+          <a:pPr marL="0" lvl="0" indent="0" algn="ctr" defTabSz="533400">
             <a:lnSpc>
               <a:spcPct val="90000"/>
             </a:lnSpc>
@@ -5104,15 +5170,15 @@
             <a:buNone/>
           </a:pPr>
           <a:r>
-            <a:rPr lang="en-US" sz="1800" kern="1200" dirty="0"/>
+            <a:rPr lang="en-US" sz="1200" kern="1200" dirty="0"/>
             <a:t>Brahmin</a:t>
           </a:r>
-          <a:endParaRPr lang="LID4096" sz="1800" kern="1200" dirty="0"/>
+          <a:endParaRPr lang="LID4096" sz="1200" kern="1200" dirty="0"/>
         </a:p>
       </dsp:txBody>
       <dsp:txXfrm>
-        <a:off x="3554616" y="5003881"/>
-        <a:ext cx="1044635" cy="682272"/>
+        <a:off x="3353878" y="4906406"/>
+        <a:ext cx="984313" cy="642875"/>
       </dsp:txXfrm>
     </dsp:sp>
     <dsp:sp modelId="{B906C7BB-AADF-47D5-9079-CCA23B609F78}">
@@ -5122,8 +5188,8 @@
       </dsp:nvSpPr>
       <dsp:spPr>
         <a:xfrm>
-          <a:off x="4783540" y="4692765"/>
-          <a:ext cx="706606" cy="289889"/>
+          <a:off x="4511840" y="4613254"/>
+          <a:ext cx="665805" cy="273150"/>
         </a:xfrm>
         <a:custGeom>
           <a:avLst/>
@@ -5137,13 +5203,13 @@
                 <a:pt x="0" y="0"/>
               </a:moveTo>
               <a:lnTo>
-                <a:pt x="0" y="144944"/>
+                <a:pt x="0" y="136575"/>
               </a:lnTo>
               <a:lnTo>
-                <a:pt x="706606" y="144944"/>
+                <a:pt x="665805" y="136575"/>
               </a:lnTo>
               <a:lnTo>
-                <a:pt x="706606" y="289889"/>
+                <a:pt x="665805" y="273150"/>
               </a:lnTo>
             </a:path>
           </a:pathLst>
@@ -5184,8 +5250,8 @@
       </dsp:nvSpPr>
       <dsp:spPr>
         <a:xfrm>
-          <a:off x="4946603" y="4982655"/>
-          <a:ext cx="1087087" cy="724724"/>
+          <a:off x="4665487" y="4886405"/>
+          <a:ext cx="1024315" cy="682877"/>
         </a:xfrm>
         <a:prstGeom prst="roundRect">
           <a:avLst>
@@ -5229,12 +5295,12 @@
         </a:fontRef>
       </dsp:style>
       <dsp:txBody>
-        <a:bodyPr spcFirstLastPara="0" vert="horz" wrap="square" lIns="68580" tIns="68580" rIns="68580" bIns="68580" numCol="1" spcCol="1270" anchor="ctr" anchorCtr="0">
+        <a:bodyPr spcFirstLastPara="0" vert="horz" wrap="square" lIns="45720" tIns="45720" rIns="45720" bIns="45720" numCol="1" spcCol="1270" anchor="ctr" anchorCtr="0">
           <a:noAutofit/>
         </a:bodyPr>
         <a:lstStyle/>
         <a:p>
-          <a:pPr marL="0" lvl="0" indent="0" algn="ctr" defTabSz="800100">
+          <a:pPr marL="0" lvl="0" indent="0" algn="ctr" defTabSz="533400">
             <a:lnSpc>
               <a:spcPct val="90000"/>
             </a:lnSpc>
@@ -5247,15 +5313,15 @@
             <a:buNone/>
           </a:pPr>
           <a:r>
-            <a:rPr lang="en-US" sz="1800" kern="1200" dirty="0" err="1"/>
+            <a:rPr lang="en-US" sz="1200" kern="1200" dirty="0" err="1"/>
             <a:t>Radstag</a:t>
           </a:r>
-          <a:endParaRPr lang="LID4096" sz="1800" kern="1200" dirty="0"/>
+          <a:endParaRPr lang="LID4096" sz="1200" kern="1200" dirty="0"/>
         </a:p>
       </dsp:txBody>
       <dsp:txXfrm>
-        <a:off x="4967829" y="5003881"/>
-        <a:ext cx="1044635" cy="682272"/>
+        <a:off x="4685488" y="4906406"/>
+        <a:ext cx="984313" cy="642875"/>
       </dsp:txXfrm>
     </dsp:sp>
     <dsp:sp modelId="{81C9A1E9-D072-4DCA-B04B-417DFBE04C73}">
@@ -5265,8 +5331,8 @@
       </dsp:nvSpPr>
       <dsp:spPr>
         <a:xfrm>
-          <a:off x="6151034" y="1648920"/>
-          <a:ext cx="91440" cy="289889"/>
+          <a:off x="6176353" y="1745170"/>
+          <a:ext cx="1664513" cy="273150"/>
         </a:xfrm>
         <a:custGeom>
           <a:avLst/>
@@ -5277,10 +5343,16 @@
           <a:pathLst>
             <a:path>
               <a:moveTo>
-                <a:pt x="45720" y="0"/>
+                <a:pt x="0" y="0"/>
               </a:moveTo>
               <a:lnTo>
-                <a:pt x="45720" y="289889"/>
+                <a:pt x="0" y="136575"/>
+              </a:lnTo>
+              <a:lnTo>
+                <a:pt x="1664513" y="136575"/>
+              </a:lnTo>
+              <a:lnTo>
+                <a:pt x="1664513" y="273150"/>
               </a:lnTo>
             </a:path>
           </a:pathLst>
@@ -5321,8 +5393,8 @@
       </dsp:nvSpPr>
       <dsp:spPr>
         <a:xfrm>
-          <a:off x="5653210" y="1938810"/>
-          <a:ext cx="1087087" cy="724724"/>
+          <a:off x="7328709" y="2018321"/>
+          <a:ext cx="1024315" cy="682877"/>
         </a:xfrm>
         <a:prstGeom prst="roundRect">
           <a:avLst>
@@ -5363,12 +5435,12 @@
         </a:fontRef>
       </dsp:style>
       <dsp:txBody>
-        <a:bodyPr spcFirstLastPara="0" vert="horz" wrap="square" lIns="68580" tIns="68580" rIns="68580" bIns="68580" numCol="1" spcCol="1270" anchor="ctr" anchorCtr="0">
+        <a:bodyPr spcFirstLastPara="0" vert="horz" wrap="square" lIns="45720" tIns="45720" rIns="45720" bIns="45720" numCol="1" spcCol="1270" anchor="ctr" anchorCtr="0">
           <a:noAutofit/>
         </a:bodyPr>
         <a:lstStyle/>
         <a:p>
-          <a:pPr marL="0" lvl="0" indent="0" algn="ctr" defTabSz="800100">
+          <a:pPr marL="0" lvl="0" indent="0" algn="ctr" defTabSz="533400">
             <a:lnSpc>
               <a:spcPct val="90000"/>
             </a:lnSpc>
@@ -5381,26 +5453,26 @@
             <a:buNone/>
           </a:pPr>
           <a:r>
-            <a:rPr lang="en-US" sz="1800" kern="1200" dirty="0"/>
+            <a:rPr lang="en-US" sz="1200" kern="1200" dirty="0"/>
             <a:t>Building</a:t>
           </a:r>
-          <a:endParaRPr lang="LID4096" sz="1800" kern="1200" dirty="0"/>
+          <a:endParaRPr lang="LID4096" sz="1200" kern="1200" dirty="0"/>
         </a:p>
       </dsp:txBody>
       <dsp:txXfrm>
-        <a:off x="5674436" y="1960036"/>
-        <a:ext cx="1044635" cy="682272"/>
+        <a:off x="7348710" y="2038322"/>
+        <a:ext cx="984313" cy="642875"/>
       </dsp:txXfrm>
     </dsp:sp>
-    <dsp:sp modelId="{59BD8D1D-DFE7-4E5D-9A33-F41207E85527}">
+    <dsp:sp modelId="{EC9AF500-AA54-457B-AF40-03CABD180705}">
       <dsp:nvSpPr>
         <dsp:cNvPr id="0" name=""/>
         <dsp:cNvSpPr/>
       </dsp:nvSpPr>
       <dsp:spPr>
         <a:xfrm>
-          <a:off x="4076934" y="2663535"/>
-          <a:ext cx="2119820" cy="289889"/>
+          <a:off x="7175061" y="2701198"/>
+          <a:ext cx="665805" cy="273150"/>
         </a:xfrm>
         <a:custGeom>
           <a:avLst/>
@@ -5411,16 +5483,16 @@
           <a:pathLst>
             <a:path>
               <a:moveTo>
-                <a:pt x="2119820" y="0"/>
+                <a:pt x="665805" y="0"/>
               </a:moveTo>
               <a:lnTo>
-                <a:pt x="2119820" y="144944"/>
+                <a:pt x="665805" y="136575"/>
               </a:lnTo>
               <a:lnTo>
-                <a:pt x="0" y="144944"/>
+                <a:pt x="0" y="136575"/>
               </a:lnTo>
               <a:lnTo>
-                <a:pt x="0" y="289889"/>
+                <a:pt x="0" y="273150"/>
               </a:lnTo>
             </a:path>
           </a:pathLst>
@@ -5454,15 +5526,155 @@
         <a:fontRef idx="minor"/>
       </dsp:style>
     </dsp:sp>
-    <dsp:sp modelId="{779B8017-965F-4ED7-A453-5B22C782DC0B}">
+    <dsp:sp modelId="{6576D9BD-CF79-4063-89C9-BA78692B564F}">
       <dsp:nvSpPr>
         <dsp:cNvPr id="0" name=""/>
         <dsp:cNvSpPr/>
       </dsp:nvSpPr>
       <dsp:spPr>
         <a:xfrm>
-          <a:off x="3533390" y="2953425"/>
-          <a:ext cx="1087087" cy="724724"/>
+          <a:off x="6662903" y="2974349"/>
+          <a:ext cx="1024315" cy="682877"/>
+        </a:xfrm>
+        <a:prstGeom prst="roundRect">
+          <a:avLst>
+            <a:gd name="adj" fmla="val 10000"/>
+          </a:avLst>
+        </a:prstGeom>
+        <a:solidFill>
+          <a:schemeClr val="accent2">
+            <a:lumMod val="75000"/>
+          </a:schemeClr>
+        </a:solidFill>
+        <a:ln w="12700" cap="flat" cmpd="sng" algn="ctr">
+          <a:solidFill>
+            <a:schemeClr val="lt2">
+              <a:hueOff val="0"/>
+              <a:satOff val="0"/>
+              <a:lumOff val="0"/>
+              <a:alphaOff val="0"/>
+            </a:schemeClr>
+          </a:solidFill>
+          <a:prstDash val="solid"/>
+          <a:miter lim="800000"/>
+        </a:ln>
+        <a:effectLst/>
+      </dsp:spPr>
+      <dsp:style>
+        <a:lnRef idx="2">
+          <a:scrgbClr r="0" g="0" b="0"/>
+        </a:lnRef>
+        <a:fillRef idx="1">
+          <a:scrgbClr r="0" g="0" b="0"/>
+        </a:fillRef>
+        <a:effectRef idx="0">
+          <a:scrgbClr r="0" g="0" b="0"/>
+        </a:effectRef>
+        <a:fontRef idx="minor">
+          <a:schemeClr val="lt1"/>
+        </a:fontRef>
+      </dsp:style>
+      <dsp:txBody>
+        <a:bodyPr spcFirstLastPara="0" vert="horz" wrap="square" lIns="45720" tIns="45720" rIns="45720" bIns="45720" numCol="1" spcCol="1270" anchor="ctr" anchorCtr="0">
+          <a:noAutofit/>
+        </a:bodyPr>
+        <a:lstStyle/>
+        <a:p>
+          <a:pPr marL="0" lvl="0" indent="0" algn="ctr" defTabSz="533400">
+            <a:lnSpc>
+              <a:spcPct val="90000"/>
+            </a:lnSpc>
+            <a:spcBef>
+              <a:spcPct val="0"/>
+            </a:spcBef>
+            <a:spcAft>
+              <a:spcPct val="35000"/>
+            </a:spcAft>
+            <a:buNone/>
+          </a:pPr>
+          <a:r>
+            <a:rPr lang="en-US" sz="1200" kern="1200" dirty="0"/>
+            <a:t>WorkBuilding</a:t>
+          </a:r>
+          <a:endParaRPr lang="LID4096" sz="1200" kern="1200" dirty="0"/>
+        </a:p>
+      </dsp:txBody>
+      <dsp:txXfrm>
+        <a:off x="6682904" y="2994350"/>
+        <a:ext cx="984313" cy="642875"/>
+      </dsp:txXfrm>
+    </dsp:sp>
+    <dsp:sp modelId="{0BEB8184-B777-46E1-B921-8C0FDA01D082}">
+      <dsp:nvSpPr>
+        <dsp:cNvPr id="0" name=""/>
+        <dsp:cNvSpPr/>
+      </dsp:nvSpPr>
+      <dsp:spPr>
+        <a:xfrm>
+          <a:off x="5843451" y="3657226"/>
+          <a:ext cx="1331610" cy="273150"/>
+        </a:xfrm>
+        <a:custGeom>
+          <a:avLst/>
+          <a:gdLst/>
+          <a:ahLst/>
+          <a:cxnLst/>
+          <a:rect l="0" t="0" r="0" b="0"/>
+          <a:pathLst>
+            <a:path>
+              <a:moveTo>
+                <a:pt x="1331610" y="0"/>
+              </a:moveTo>
+              <a:lnTo>
+                <a:pt x="1331610" y="136575"/>
+              </a:lnTo>
+              <a:lnTo>
+                <a:pt x="0" y="136575"/>
+              </a:lnTo>
+              <a:lnTo>
+                <a:pt x="0" y="273150"/>
+              </a:lnTo>
+            </a:path>
+          </a:pathLst>
+        </a:custGeom>
+        <a:noFill/>
+        <a:ln w="12700" cap="flat" cmpd="sng" algn="ctr">
+          <a:solidFill>
+            <a:schemeClr val="dk2">
+              <a:shade val="80000"/>
+              <a:hueOff val="0"/>
+              <a:satOff val="0"/>
+              <a:lumOff val="0"/>
+              <a:alphaOff val="0"/>
+            </a:schemeClr>
+          </a:solidFill>
+          <a:prstDash val="solid"/>
+          <a:miter lim="800000"/>
+        </a:ln>
+        <a:effectLst/>
+      </dsp:spPr>
+      <dsp:style>
+        <a:lnRef idx="2">
+          <a:scrgbClr r="0" g="0" b="0"/>
+        </a:lnRef>
+        <a:fillRef idx="0">
+          <a:scrgbClr r="0" g="0" b="0"/>
+        </a:fillRef>
+        <a:effectRef idx="0">
+          <a:scrgbClr r="0" g="0" b="0"/>
+        </a:effectRef>
+        <a:fontRef idx="minor"/>
+      </dsp:style>
+    </dsp:sp>
+    <dsp:sp modelId="{BE05E9B3-C033-4E94-915C-57386F2FFFCF}">
+      <dsp:nvSpPr>
+        <dsp:cNvPr id="0" name=""/>
+        <dsp:cNvSpPr/>
+      </dsp:nvSpPr>
+      <dsp:spPr>
+        <a:xfrm>
+          <a:off x="5331293" y="3930377"/>
+          <a:ext cx="1024315" cy="682877"/>
         </a:xfrm>
         <a:prstGeom prst="roundRect">
           <a:avLst>
@@ -5506,12 +5718,12 @@
         </a:fontRef>
       </dsp:style>
       <dsp:txBody>
-        <a:bodyPr spcFirstLastPara="0" vert="horz" wrap="square" lIns="68580" tIns="68580" rIns="68580" bIns="68580" numCol="1" spcCol="1270" anchor="ctr" anchorCtr="0">
+        <a:bodyPr spcFirstLastPara="0" vert="horz" wrap="square" lIns="45720" tIns="45720" rIns="45720" bIns="45720" numCol="1" spcCol="1270" anchor="ctr" anchorCtr="0">
           <a:noAutofit/>
         </a:bodyPr>
         <a:lstStyle/>
         <a:p>
-          <a:pPr marL="0" lvl="0" indent="0" algn="ctr" defTabSz="800100">
+          <a:pPr marL="0" lvl="0" indent="0" algn="ctr" defTabSz="533400">
             <a:lnSpc>
               <a:spcPct val="90000"/>
             </a:lnSpc>
@@ -5524,26 +5736,26 @@
             <a:buNone/>
           </a:pPr>
           <a:r>
-            <a:rPr lang="en-US" sz="1800" kern="1200" dirty="0"/>
-            <a:t>Wall</a:t>
+            <a:rPr lang="en-US" sz="1200" kern="1200" dirty="0"/>
+            <a:t>Guard Tower</a:t>
           </a:r>
-          <a:endParaRPr lang="LID4096" sz="1800" kern="1200" dirty="0"/>
+          <a:endParaRPr lang="LID4096" sz="1200" kern="1200" dirty="0"/>
         </a:p>
       </dsp:txBody>
       <dsp:txXfrm>
-        <a:off x="3554616" y="2974651"/>
-        <a:ext cx="1044635" cy="682272"/>
+        <a:off x="5351294" y="3950378"/>
+        <a:ext cx="984313" cy="642875"/>
       </dsp:txXfrm>
     </dsp:sp>
-    <dsp:sp modelId="{0BEB8184-B777-46E1-B921-8C0FDA01D082}">
+    <dsp:sp modelId="{8599F571-1C6C-4CB6-926A-7FCEE3F9118A}">
       <dsp:nvSpPr>
         <dsp:cNvPr id="0" name=""/>
         <dsp:cNvSpPr/>
       </dsp:nvSpPr>
       <dsp:spPr>
         <a:xfrm>
-          <a:off x="5490147" y="2663535"/>
-          <a:ext cx="706606" cy="289889"/>
+          <a:off x="7129341" y="3657226"/>
+          <a:ext cx="91440" cy="273150"/>
         </a:xfrm>
         <a:custGeom>
           <a:avLst/>
@@ -5554,16 +5766,10 @@
           <a:pathLst>
             <a:path>
               <a:moveTo>
-                <a:pt x="706606" y="0"/>
+                <a:pt x="45720" y="0"/>
               </a:moveTo>
               <a:lnTo>
-                <a:pt x="706606" y="144944"/>
-              </a:lnTo>
-              <a:lnTo>
-                <a:pt x="0" y="144944"/>
-              </a:lnTo>
-              <a:lnTo>
-                <a:pt x="0" y="289889"/>
+                <a:pt x="45720" y="273150"/>
               </a:lnTo>
             </a:path>
           </a:pathLst>
@@ -5597,15 +5803,15 @@
         <a:fontRef idx="minor"/>
       </dsp:style>
     </dsp:sp>
-    <dsp:sp modelId="{BE05E9B3-C033-4E94-915C-57386F2FFFCF}">
+    <dsp:sp modelId="{8976D2E3-5B0F-4111-8A1F-3F406BBE1D4E}">
       <dsp:nvSpPr>
         <dsp:cNvPr id="0" name=""/>
         <dsp:cNvSpPr/>
       </dsp:nvSpPr>
       <dsp:spPr>
         <a:xfrm>
-          <a:off x="4946603" y="2953425"/>
-          <a:ext cx="1087087" cy="724724"/>
+          <a:off x="6662903" y="3930377"/>
+          <a:ext cx="1024315" cy="682877"/>
         </a:xfrm>
         <a:prstGeom prst="roundRect">
           <a:avLst>
@@ -5649,12 +5855,12 @@
         </a:fontRef>
       </dsp:style>
       <dsp:txBody>
-        <a:bodyPr spcFirstLastPara="0" vert="horz" wrap="square" lIns="68580" tIns="68580" rIns="68580" bIns="68580" numCol="1" spcCol="1270" anchor="ctr" anchorCtr="0">
+        <a:bodyPr spcFirstLastPara="0" vert="horz" wrap="square" lIns="45720" tIns="45720" rIns="45720" bIns="45720" numCol="1" spcCol="1270" anchor="ctr" anchorCtr="0">
           <a:noAutofit/>
         </a:bodyPr>
         <a:lstStyle/>
         <a:p>
-          <a:pPr marL="0" lvl="0" indent="0" algn="ctr" defTabSz="800100">
+          <a:pPr marL="0" lvl="0" indent="0" algn="ctr" defTabSz="533400">
             <a:lnSpc>
               <a:spcPct val="90000"/>
             </a:lnSpc>
@@ -5667,26 +5873,26 @@
             <a:buNone/>
           </a:pPr>
           <a:r>
-            <a:rPr lang="en-US" sz="1800" kern="1200" dirty="0"/>
-            <a:t>Guard Tower</a:t>
+            <a:rPr lang="en-US" sz="1200" kern="1200" dirty="0"/>
+            <a:t>Shed</a:t>
           </a:r>
-          <a:endParaRPr lang="LID4096" sz="1800" kern="1200" dirty="0"/>
+          <a:endParaRPr lang="LID4096" sz="1200" kern="1200" dirty="0"/>
         </a:p>
       </dsp:txBody>
       <dsp:txXfrm>
-        <a:off x="4967829" y="2974651"/>
-        <a:ext cx="1044635" cy="682272"/>
+        <a:off x="6682904" y="3950378"/>
+        <a:ext cx="984313" cy="642875"/>
       </dsp:txXfrm>
     </dsp:sp>
-    <dsp:sp modelId="{8599F571-1C6C-4CB6-926A-7FCEE3F9118A}">
+    <dsp:sp modelId="{55BB6539-41D1-424D-B1C6-82B34F71F71D}">
       <dsp:nvSpPr>
         <dsp:cNvPr id="0" name=""/>
         <dsp:cNvSpPr/>
       </dsp:nvSpPr>
       <dsp:spPr>
         <a:xfrm>
-          <a:off x="6196754" y="2663535"/>
-          <a:ext cx="706606" cy="289889"/>
+          <a:off x="7175061" y="3657226"/>
+          <a:ext cx="1331610" cy="273150"/>
         </a:xfrm>
         <a:custGeom>
           <a:avLst/>
@@ -5700,13 +5906,13 @@
                 <a:pt x="0" y="0"/>
               </a:moveTo>
               <a:lnTo>
-                <a:pt x="0" y="144944"/>
+                <a:pt x="0" y="136575"/>
               </a:lnTo>
               <a:lnTo>
-                <a:pt x="706606" y="144944"/>
+                <a:pt x="1331610" y="136575"/>
               </a:lnTo>
               <a:lnTo>
-                <a:pt x="706606" y="289889"/>
+                <a:pt x="1331610" y="273150"/>
               </a:lnTo>
             </a:path>
           </a:pathLst>
@@ -5740,15 +5946,15 @@
         <a:fontRef idx="minor"/>
       </dsp:style>
     </dsp:sp>
-    <dsp:sp modelId="{8976D2E3-5B0F-4111-8A1F-3F406BBE1D4E}">
+    <dsp:sp modelId="{A4502926-B005-4510-A1B4-3AEAD9C4AE3C}">
       <dsp:nvSpPr>
         <dsp:cNvPr id="0" name=""/>
         <dsp:cNvSpPr/>
       </dsp:nvSpPr>
       <dsp:spPr>
         <a:xfrm>
-          <a:off x="6359817" y="2953425"/>
-          <a:ext cx="1087087" cy="724724"/>
+          <a:off x="7994514" y="3930377"/>
+          <a:ext cx="1024315" cy="682877"/>
         </a:xfrm>
         <a:prstGeom prst="roundRect">
           <a:avLst>
@@ -5792,12 +5998,12 @@
         </a:fontRef>
       </dsp:style>
       <dsp:txBody>
-        <a:bodyPr spcFirstLastPara="0" vert="horz" wrap="square" lIns="68580" tIns="68580" rIns="68580" bIns="68580" numCol="1" spcCol="1270" anchor="ctr" anchorCtr="0">
+        <a:bodyPr spcFirstLastPara="0" vert="horz" wrap="square" lIns="45720" tIns="45720" rIns="45720" bIns="45720" numCol="1" spcCol="1270" anchor="ctr" anchorCtr="0">
           <a:noAutofit/>
         </a:bodyPr>
         <a:lstStyle/>
         <a:p>
-          <a:pPr marL="0" lvl="0" indent="0" algn="ctr" defTabSz="800100">
+          <a:pPr marL="0" lvl="0" indent="0" algn="ctr" defTabSz="533400">
             <a:lnSpc>
               <a:spcPct val="90000"/>
             </a:lnSpc>
@@ -5810,26 +6016,26 @@
             <a:buNone/>
           </a:pPr>
           <a:r>
-            <a:rPr lang="en-US" sz="1800" kern="1200" dirty="0"/>
-            <a:t>Shed</a:t>
+            <a:rPr lang="en-US" sz="1200" kern="1200" dirty="0"/>
+            <a:t>Kitchen</a:t>
           </a:r>
-          <a:endParaRPr lang="LID4096" sz="1800" kern="1200" dirty="0"/>
+          <a:endParaRPr lang="LID4096" sz="1200" kern="1200" dirty="0"/>
         </a:p>
       </dsp:txBody>
       <dsp:txXfrm>
-        <a:off x="6381043" y="2974651"/>
-        <a:ext cx="1044635" cy="682272"/>
+        <a:off x="8014515" y="3950378"/>
+        <a:ext cx="984313" cy="642875"/>
       </dsp:txXfrm>
     </dsp:sp>
-    <dsp:sp modelId="{55BB6539-41D1-424D-B1C6-82B34F71F71D}">
+    <dsp:sp modelId="{59BD8D1D-DFE7-4E5D-9A33-F41207E85527}">
       <dsp:nvSpPr>
         <dsp:cNvPr id="0" name=""/>
         <dsp:cNvSpPr/>
       </dsp:nvSpPr>
       <dsp:spPr>
         <a:xfrm>
-          <a:off x="6196754" y="2663535"/>
-          <a:ext cx="2119820" cy="289889"/>
+          <a:off x="7840866" y="2701198"/>
+          <a:ext cx="665805" cy="273150"/>
         </a:xfrm>
         <a:custGeom>
           <a:avLst/>
@@ -5843,13 +6049,13 @@
                 <a:pt x="0" y="0"/>
               </a:moveTo>
               <a:lnTo>
-                <a:pt x="0" y="144944"/>
+                <a:pt x="0" y="136575"/>
               </a:lnTo>
               <a:lnTo>
-                <a:pt x="2119820" y="144944"/>
+                <a:pt x="665805" y="136575"/>
               </a:lnTo>
               <a:lnTo>
-                <a:pt x="2119820" y="289889"/>
+                <a:pt x="665805" y="273150"/>
               </a:lnTo>
             </a:path>
           </a:pathLst>
@@ -5883,15 +6089,15 @@
         <a:fontRef idx="minor"/>
       </dsp:style>
     </dsp:sp>
-    <dsp:sp modelId="{A4502926-B005-4510-A1B4-3AEAD9C4AE3C}">
+    <dsp:sp modelId="{779B8017-965F-4ED7-A453-5B22C782DC0B}">
       <dsp:nvSpPr>
         <dsp:cNvPr id="0" name=""/>
         <dsp:cNvSpPr/>
       </dsp:nvSpPr>
       <dsp:spPr>
         <a:xfrm>
-          <a:off x="7773030" y="2953425"/>
-          <a:ext cx="1087087" cy="724724"/>
+          <a:off x="7994514" y="2974349"/>
+          <a:ext cx="1024315" cy="682877"/>
         </a:xfrm>
         <a:prstGeom prst="roundRect">
           <a:avLst>
@@ -5935,12 +6141,12 @@
         </a:fontRef>
       </dsp:style>
       <dsp:txBody>
-        <a:bodyPr spcFirstLastPara="0" vert="horz" wrap="square" lIns="68580" tIns="68580" rIns="68580" bIns="68580" numCol="1" spcCol="1270" anchor="ctr" anchorCtr="0">
+        <a:bodyPr spcFirstLastPara="0" vert="horz" wrap="square" lIns="45720" tIns="45720" rIns="45720" bIns="45720" numCol="1" spcCol="1270" anchor="ctr" anchorCtr="0">
           <a:noAutofit/>
         </a:bodyPr>
         <a:lstStyle/>
         <a:p>
-          <a:pPr marL="0" lvl="0" indent="0" algn="ctr" defTabSz="800100">
+          <a:pPr marL="0" lvl="0" indent="0" algn="ctr" defTabSz="533400">
             <a:lnSpc>
               <a:spcPct val="90000"/>
             </a:lnSpc>
@@ -5953,15 +6159,15 @@
             <a:buNone/>
           </a:pPr>
           <a:r>
-            <a:rPr lang="en-US" sz="1800" kern="1200" dirty="0"/>
-            <a:t>Kitchen</a:t>
+            <a:rPr lang="en-US" sz="1200" kern="1200" dirty="0"/>
+            <a:t>Wall</a:t>
           </a:r>
-          <a:endParaRPr lang="LID4096" sz="1800" kern="1200" dirty="0"/>
+          <a:endParaRPr lang="LID4096" sz="1200" kern="1200" dirty="0"/>
         </a:p>
       </dsp:txBody>
       <dsp:txXfrm>
-        <a:off x="7794256" y="2974651"/>
-        <a:ext cx="1044635" cy="682272"/>
+        <a:off x="8014515" y="2994350"/>
+        <a:ext cx="984313" cy="642875"/>
       </dsp:txXfrm>
     </dsp:sp>
     <dsp:sp modelId="{3321C745-C943-48B5-A72D-18FDCA516C06}">
@@ -5971,8 +6177,8 @@
       </dsp:nvSpPr>
       <dsp:spPr>
         <a:xfrm>
-          <a:off x="6196754" y="1648920"/>
-          <a:ext cx="4239640" cy="289889"/>
+          <a:off x="6176353" y="1745170"/>
+          <a:ext cx="4327734" cy="273150"/>
         </a:xfrm>
         <a:custGeom>
           <a:avLst/>
@@ -5986,13 +6192,13 @@
                 <a:pt x="0" y="0"/>
               </a:moveTo>
               <a:lnTo>
-                <a:pt x="0" y="144944"/>
+                <a:pt x="0" y="136575"/>
               </a:lnTo>
               <a:lnTo>
-                <a:pt x="4239640" y="144944"/>
+                <a:pt x="4327734" y="136575"/>
               </a:lnTo>
               <a:lnTo>
-                <a:pt x="4239640" y="289889"/>
+                <a:pt x="4327734" y="273150"/>
               </a:lnTo>
             </a:path>
           </a:pathLst>
@@ -6033,8 +6239,8 @@
       </dsp:nvSpPr>
       <dsp:spPr>
         <a:xfrm>
-          <a:off x="9892851" y="1938810"/>
-          <a:ext cx="1087087" cy="724724"/>
+          <a:off x="9991930" y="2018321"/>
+          <a:ext cx="1024315" cy="682877"/>
         </a:xfrm>
         <a:prstGeom prst="roundRect">
           <a:avLst>
@@ -6075,12 +6281,12 @@
         </a:fontRef>
       </dsp:style>
       <dsp:txBody>
-        <a:bodyPr spcFirstLastPara="0" vert="horz" wrap="square" lIns="68580" tIns="68580" rIns="68580" bIns="68580" numCol="1" spcCol="1270" anchor="ctr" anchorCtr="0">
+        <a:bodyPr spcFirstLastPara="0" vert="horz" wrap="square" lIns="45720" tIns="45720" rIns="45720" bIns="45720" numCol="1" spcCol="1270" anchor="ctr" anchorCtr="0">
           <a:noAutofit/>
         </a:bodyPr>
         <a:lstStyle/>
         <a:p>
-          <a:pPr marL="0" lvl="0" indent="0" algn="ctr" defTabSz="800100">
+          <a:pPr marL="0" lvl="0" indent="0" algn="ctr" defTabSz="533400">
             <a:lnSpc>
               <a:spcPct val="90000"/>
             </a:lnSpc>
@@ -6093,15 +6299,15 @@
             <a:buNone/>
           </a:pPr>
           <a:r>
-            <a:rPr lang="en-US" sz="1800" kern="1200" dirty="0"/>
+            <a:rPr lang="en-US" sz="1200" kern="1200" dirty="0"/>
             <a:t>Resource</a:t>
           </a:r>
-          <a:endParaRPr lang="LID4096" sz="1800" kern="1200" dirty="0"/>
+          <a:endParaRPr lang="LID4096" sz="1200" kern="1200" dirty="0"/>
         </a:p>
       </dsp:txBody>
       <dsp:txXfrm>
-        <a:off x="9914077" y="1960036"/>
-        <a:ext cx="1044635" cy="682272"/>
+        <a:off x="10011931" y="2038322"/>
+        <a:ext cx="984313" cy="642875"/>
       </dsp:txXfrm>
     </dsp:sp>
     <dsp:sp modelId="{150EA877-0DAA-44B7-B6CB-653578BFC5D5}">
@@ -6111,8 +6317,8 @@
       </dsp:nvSpPr>
       <dsp:spPr>
         <a:xfrm>
-          <a:off x="9729788" y="2663535"/>
-          <a:ext cx="706606" cy="289889"/>
+          <a:off x="9838282" y="2701198"/>
+          <a:ext cx="665805" cy="273150"/>
         </a:xfrm>
         <a:custGeom>
           <a:avLst/>
@@ -6123,16 +6329,16 @@
           <a:pathLst>
             <a:path>
               <a:moveTo>
-                <a:pt x="706606" y="0"/>
+                <a:pt x="665805" y="0"/>
               </a:moveTo>
               <a:lnTo>
-                <a:pt x="706606" y="144944"/>
+                <a:pt x="665805" y="136575"/>
               </a:lnTo>
               <a:lnTo>
-                <a:pt x="0" y="144944"/>
+                <a:pt x="0" y="136575"/>
               </a:lnTo>
               <a:lnTo>
-                <a:pt x="0" y="289889"/>
+                <a:pt x="0" y="273150"/>
               </a:lnTo>
             </a:path>
           </a:pathLst>
@@ -6173,8 +6379,8 @@
       </dsp:nvSpPr>
       <dsp:spPr>
         <a:xfrm>
-          <a:off x="9186244" y="2953425"/>
-          <a:ext cx="1087087" cy="724724"/>
+          <a:off x="9326124" y="2974349"/>
+          <a:ext cx="1024315" cy="682877"/>
         </a:xfrm>
         <a:prstGeom prst="roundRect">
           <a:avLst>
@@ -6218,12 +6424,12 @@
         </a:fontRef>
       </dsp:style>
       <dsp:txBody>
-        <a:bodyPr spcFirstLastPara="0" vert="horz" wrap="square" lIns="68580" tIns="68580" rIns="68580" bIns="68580" numCol="1" spcCol="1270" anchor="ctr" anchorCtr="0">
+        <a:bodyPr spcFirstLastPara="0" vert="horz" wrap="square" lIns="45720" tIns="45720" rIns="45720" bIns="45720" numCol="1" spcCol="1270" anchor="ctr" anchorCtr="0">
           <a:noAutofit/>
         </a:bodyPr>
         <a:lstStyle/>
         <a:p>
-          <a:pPr marL="0" lvl="0" indent="0" algn="ctr" defTabSz="800100">
+          <a:pPr marL="0" lvl="0" indent="0" algn="ctr" defTabSz="533400">
             <a:lnSpc>
               <a:spcPct val="90000"/>
             </a:lnSpc>
@@ -6236,15 +6442,15 @@
             <a:buNone/>
           </a:pPr>
           <a:r>
-            <a:rPr lang="en-US" sz="1800" kern="1200" dirty="0"/>
+            <a:rPr lang="en-US" sz="1200" kern="1200" dirty="0"/>
             <a:t>Junk</a:t>
           </a:r>
-          <a:endParaRPr lang="LID4096" sz="1800" kern="1200" dirty="0"/>
+          <a:endParaRPr lang="LID4096" sz="1200" kern="1200" dirty="0"/>
         </a:p>
       </dsp:txBody>
       <dsp:txXfrm>
-        <a:off x="9207470" y="2974651"/>
-        <a:ext cx="1044635" cy="682272"/>
+        <a:off x="9346125" y="2994350"/>
+        <a:ext cx="984313" cy="642875"/>
       </dsp:txXfrm>
     </dsp:sp>
     <dsp:sp modelId="{2E751865-6AD6-4026-8323-96EE5CA8856A}">
@@ -6254,8 +6460,8 @@
       </dsp:nvSpPr>
       <dsp:spPr>
         <a:xfrm>
-          <a:off x="10436394" y="2663535"/>
-          <a:ext cx="706606" cy="289889"/>
+          <a:off x="10504088" y="2701198"/>
+          <a:ext cx="665805" cy="273150"/>
         </a:xfrm>
         <a:custGeom>
           <a:avLst/>
@@ -6269,13 +6475,13 @@
                 <a:pt x="0" y="0"/>
               </a:moveTo>
               <a:lnTo>
-                <a:pt x="0" y="144944"/>
+                <a:pt x="0" y="136575"/>
               </a:lnTo>
               <a:lnTo>
-                <a:pt x="706606" y="144944"/>
+                <a:pt x="665805" y="136575"/>
               </a:lnTo>
               <a:lnTo>
-                <a:pt x="706606" y="289889"/>
+                <a:pt x="665805" y="273150"/>
               </a:lnTo>
             </a:path>
           </a:pathLst>
@@ -6316,8 +6522,8 @@
       </dsp:nvSpPr>
       <dsp:spPr>
         <a:xfrm>
-          <a:off x="10599458" y="2953425"/>
-          <a:ext cx="1087087" cy="724724"/>
+          <a:off x="10657735" y="2974349"/>
+          <a:ext cx="1024315" cy="682877"/>
         </a:xfrm>
         <a:prstGeom prst="roundRect">
           <a:avLst>
@@ -6361,12 +6567,12 @@
         </a:fontRef>
       </dsp:style>
       <dsp:txBody>
-        <a:bodyPr spcFirstLastPara="0" vert="horz" wrap="square" lIns="68580" tIns="68580" rIns="68580" bIns="68580" numCol="1" spcCol="1270" anchor="ctr" anchorCtr="0">
+        <a:bodyPr spcFirstLastPara="0" vert="horz" wrap="square" lIns="45720" tIns="45720" rIns="45720" bIns="45720" numCol="1" spcCol="1270" anchor="ctr" anchorCtr="0">
           <a:noAutofit/>
         </a:bodyPr>
         <a:lstStyle/>
         <a:p>
-          <a:pPr marL="0" lvl="0" indent="0" algn="ctr" defTabSz="800100">
+          <a:pPr marL="0" lvl="0" indent="0" algn="ctr" defTabSz="533400">
             <a:lnSpc>
               <a:spcPct val="90000"/>
             </a:lnSpc>
@@ -6379,15 +6585,15 @@
             <a:buNone/>
           </a:pPr>
           <a:r>
-            <a:rPr lang="en-US" sz="1800" kern="1200" dirty="0"/>
+            <a:rPr lang="en-US" sz="1200" kern="1200" dirty="0"/>
             <a:t>Water</a:t>
           </a:r>
-          <a:endParaRPr lang="LID4096" sz="1800" kern="1200" dirty="0"/>
+          <a:endParaRPr lang="LID4096" sz="1200" kern="1200" dirty="0"/>
         </a:p>
       </dsp:txBody>
       <dsp:txXfrm>
-        <a:off x="10620684" y="2974651"/>
-        <a:ext cx="1044635" cy="682272"/>
+        <a:off x="10677736" y="2994350"/>
+        <a:ext cx="984313" cy="642875"/>
       </dsp:txXfrm>
     </dsp:sp>
   </dsp:spTree>
@@ -11507,7 +11713,7 @@
           <a:p>
             <a:fld id="{88C45074-3B38-4A15-96C0-4753BD5C1F68}" type="datetimeFigureOut">
               <a:rPr lang="LID4096" smtClean="0"/>
-              <a:t>05/26/2020</a:t>
+              <a:t>05/31/2020</a:t>
             </a:fld>
             <a:endParaRPr lang="LID4096"/>
           </a:p>
@@ -11707,7 +11913,7 @@
           <a:p>
             <a:fld id="{88C45074-3B38-4A15-96C0-4753BD5C1F68}" type="datetimeFigureOut">
               <a:rPr lang="LID4096" smtClean="0"/>
-              <a:t>05/26/2020</a:t>
+              <a:t>05/31/2020</a:t>
             </a:fld>
             <a:endParaRPr lang="LID4096"/>
           </a:p>
@@ -11917,7 +12123,7 @@
           <a:p>
             <a:fld id="{88C45074-3B38-4A15-96C0-4753BD5C1F68}" type="datetimeFigureOut">
               <a:rPr lang="LID4096" smtClean="0"/>
-              <a:t>05/26/2020</a:t>
+              <a:t>05/31/2020</a:t>
             </a:fld>
             <a:endParaRPr lang="LID4096"/>
           </a:p>
@@ -12117,7 +12323,7 @@
           <a:p>
             <a:fld id="{88C45074-3B38-4A15-96C0-4753BD5C1F68}" type="datetimeFigureOut">
               <a:rPr lang="LID4096" smtClean="0"/>
-              <a:t>05/26/2020</a:t>
+              <a:t>05/31/2020</a:t>
             </a:fld>
             <a:endParaRPr lang="LID4096"/>
           </a:p>
@@ -12393,7 +12599,7 @@
           <a:p>
             <a:fld id="{88C45074-3B38-4A15-96C0-4753BD5C1F68}" type="datetimeFigureOut">
               <a:rPr lang="LID4096" smtClean="0"/>
-              <a:t>05/26/2020</a:t>
+              <a:t>05/31/2020</a:t>
             </a:fld>
             <a:endParaRPr lang="LID4096"/>
           </a:p>
@@ -12661,7 +12867,7 @@
           <a:p>
             <a:fld id="{88C45074-3B38-4A15-96C0-4753BD5C1F68}" type="datetimeFigureOut">
               <a:rPr lang="LID4096" smtClean="0"/>
-              <a:t>05/26/2020</a:t>
+              <a:t>05/31/2020</a:t>
             </a:fld>
             <a:endParaRPr lang="LID4096"/>
           </a:p>
@@ -13076,7 +13282,7 @@
           <a:p>
             <a:fld id="{88C45074-3B38-4A15-96C0-4753BD5C1F68}" type="datetimeFigureOut">
               <a:rPr lang="LID4096" smtClean="0"/>
-              <a:t>05/26/2020</a:t>
+              <a:t>05/31/2020</a:t>
             </a:fld>
             <a:endParaRPr lang="LID4096"/>
           </a:p>
@@ -13218,7 +13424,7 @@
           <a:p>
             <a:fld id="{88C45074-3B38-4A15-96C0-4753BD5C1F68}" type="datetimeFigureOut">
               <a:rPr lang="LID4096" smtClean="0"/>
-              <a:t>05/26/2020</a:t>
+              <a:t>05/31/2020</a:t>
             </a:fld>
             <a:endParaRPr lang="LID4096"/>
           </a:p>
@@ -13331,7 +13537,7 @@
           <a:p>
             <a:fld id="{88C45074-3B38-4A15-96C0-4753BD5C1F68}" type="datetimeFigureOut">
               <a:rPr lang="LID4096" smtClean="0"/>
-              <a:t>05/26/2020</a:t>
+              <a:t>05/31/2020</a:t>
             </a:fld>
             <a:endParaRPr lang="LID4096"/>
           </a:p>
@@ -13644,7 +13850,7 @@
           <a:p>
             <a:fld id="{88C45074-3B38-4A15-96C0-4753BD5C1F68}" type="datetimeFigureOut">
               <a:rPr lang="LID4096" smtClean="0"/>
-              <a:t>05/26/2020</a:t>
+              <a:t>05/31/2020</a:t>
             </a:fld>
             <a:endParaRPr lang="LID4096"/>
           </a:p>
@@ -13933,7 +14139,7 @@
           <a:p>
             <a:fld id="{88C45074-3B38-4A15-96C0-4753BD5C1F68}" type="datetimeFigureOut">
               <a:rPr lang="LID4096" smtClean="0"/>
-              <a:t>05/26/2020</a:t>
+              <a:t>05/31/2020</a:t>
             </a:fld>
             <a:endParaRPr lang="LID4096"/>
           </a:p>
@@ -14176,7 +14382,7 @@
           <a:p>
             <a:fld id="{88C45074-3B38-4A15-96C0-4753BD5C1F68}" type="datetimeFigureOut">
               <a:rPr lang="LID4096" smtClean="0"/>
-              <a:t>05/26/2020</a:t>
+              <a:t>05/31/2020</a:t>
             </a:fld>
             <a:endParaRPr lang="LID4096"/>
           </a:p>
@@ -15022,7 +15228,7 @@
           <p:nvPr>
             <p:extLst>
               <p:ext uri="{D42A27DB-BD31-4B8C-83A1-F6EECF244321}">
-                <p14:modId xmlns:p14="http://schemas.microsoft.com/office/powerpoint/2010/main" val="2519521066"/>
+                <p14:modId xmlns:p14="http://schemas.microsoft.com/office/powerpoint/2010/main" val="2109982955"/>
               </p:ext>
             </p:extLst>
           </p:nvPr>

</xml_diff>